<commit_message>
Add one useful Markdown example: Summary - Details
</commit_message>
<xml_diff>
--- a/05_es6_node/NodeJS_demo/02_nodejs/NodeJS.pptx
+++ b/05_es6_node/NodeJS_demo/02_nodejs/NodeJS.pptx
@@ -8071,7 +8071,7 @@
             </a:r>
             <a:r>
               <a:rPr lang="fi-FI" b="1" dirty="0"/>
-              <a:t> );</a:t>
+              <a:t>() );</a:t>
             </a:r>
             <a:r>
               <a:rPr lang="fi-FI" dirty="0"/>
@@ -8083,23 +8083,7 @@
             </a:r>
             <a:r>
               <a:rPr lang="fi-FI" dirty="0"/>
-              <a:t> </a:t>
-            </a:r>
-            <a:r>
-              <a:rPr lang="fi-FI" dirty="0" err="1"/>
-              <a:t>the</a:t>
-            </a:r>
-            <a:r>
-              <a:rPr lang="fi-FI" dirty="0"/>
-              <a:t> </a:t>
-            </a:r>
-            <a:r>
-              <a:rPr lang="fi-FI" dirty="0" err="1"/>
-              <a:t>express.json</a:t>
-            </a:r>
-            <a:r>
-              <a:rPr lang="fi-FI" dirty="0"/>
-              <a:t> </a:t>
+              <a:t> a </a:t>
             </a:r>
             <a:r>
               <a:rPr lang="fi-FI" dirty="0" err="1"/>
@@ -8107,7 +8091,31 @@
             </a:r>
             <a:r>
               <a:rPr lang="fi-FI" dirty="0"/>
-              <a:t> to </a:t>
+              <a:t> (</a:t>
+            </a:r>
+            <a:r>
+              <a:rPr lang="fi-FI" dirty="0" err="1"/>
+              <a:t>that</a:t>
+            </a:r>
+            <a:r>
+              <a:rPr lang="fi-FI"/>
+              <a:t> express</a:t>
+            </a:r>
+            <a:r>
+              <a:rPr lang="fi-FI" dirty="0" err="1"/>
+              <a:t>.json</a:t>
+            </a:r>
+            <a:r>
+              <a:rPr lang="fi-FI" dirty="0"/>
+              <a:t>() </a:t>
+            </a:r>
+            <a:r>
+              <a:rPr lang="fi-FI" dirty="0" err="1"/>
+              <a:t>returns</a:t>
+            </a:r>
+            <a:r>
+              <a:rPr lang="fi-FI" dirty="0"/>
+              <a:t>) to </a:t>
             </a:r>
             <a:r>
               <a:rPr lang="fi-FI" dirty="0" err="1"/>
@@ -18024,12 +18032,12 @@
 </file>
 
 <file path=customXml/item1.xml><?xml version="1.0" encoding="utf-8"?>
-<p:properties xmlns:p="http://schemas.microsoft.com/office/2006/metadata/properties" xmlns:xsi="http://www.w3.org/2001/XMLSchema-instance" xmlns:pc="http://schemas.microsoft.com/office/infopath/2007/PartnerControls">
-  <documentManagement>
-    <PublishingExpirationDate xmlns="http://schemas.microsoft.com/sharepoint/v3" xsi:nil="true"/>
-    <PublishingStartDate xmlns="http://schemas.microsoft.com/sharepoint/v3" xsi:nil="true"/>
-  </documentManagement>
-</p:properties>
+<?mso-contentType ?>
+<FormTemplates xmlns="http://schemas.microsoft.com/sharepoint/v3/contenttype/forms">
+  <Display>DocumentLibraryForm</Display>
+  <Edit>DocumentLibraryForm</Edit>
+  <New>DocumentLibraryForm</New>
+</FormTemplates>
 </file>
 
 <file path=customXml/item2.xml><?xml version="1.0" encoding="utf-8"?>
@@ -18165,26 +18173,18 @@
 </file>
 
 <file path=customXml/item3.xml><?xml version="1.0" encoding="utf-8"?>
-<?mso-contentType ?>
-<FormTemplates xmlns="http://schemas.microsoft.com/sharepoint/v3/contenttype/forms">
-  <Display>DocumentLibraryForm</Display>
-  <Edit>DocumentLibraryForm</Edit>
-  <New>DocumentLibraryForm</New>
-</FormTemplates>
+<p:properties xmlns:p="http://schemas.microsoft.com/office/2006/metadata/properties" xmlns:xsi="http://www.w3.org/2001/XMLSchema-instance" xmlns:pc="http://schemas.microsoft.com/office/infopath/2007/PartnerControls">
+  <documentManagement>
+    <PublishingExpirationDate xmlns="http://schemas.microsoft.com/sharepoint/v3" xsi:nil="true"/>
+    <PublishingStartDate xmlns="http://schemas.microsoft.com/sharepoint/v3" xsi:nil="true"/>
+  </documentManagement>
+</p:properties>
 </file>
 
 <file path=customXml/itemProps1.xml><?xml version="1.0" encoding="utf-8"?>
-<ds:datastoreItem xmlns:ds="http://schemas.openxmlformats.org/officeDocument/2006/customXml" ds:itemID="{DED4E12E-7268-4B03-A47B-0755D62B5E31}">
+<ds:datastoreItem xmlns:ds="http://schemas.openxmlformats.org/officeDocument/2006/customXml" ds:itemID="{D546C03B-CD3A-4EA0-AAA4-0E00E896454E}">
   <ds:schemaRefs>
-    <ds:schemaRef ds:uri="http://purl.org/dc/dcmitype/"/>
-    <ds:schemaRef ds:uri="http://schemas.microsoft.com/office/infopath/2007/PartnerControls"/>
-    <ds:schemaRef ds:uri="http://schemas.openxmlformats.org/package/2006/metadata/core-properties"/>
-    <ds:schemaRef ds:uri="http://schemas.microsoft.com/office/2006/documentManagement/types"/>
-    <ds:schemaRef ds:uri="http://purl.org/dc/terms/"/>
-    <ds:schemaRef ds:uri="http://www.w3.org/XML/1998/namespace"/>
-    <ds:schemaRef ds:uri="http://schemas.microsoft.com/sharepoint/v3"/>
-    <ds:schemaRef ds:uri="http://purl.org/dc/elements/1.1/"/>
-    <ds:schemaRef ds:uri="http://schemas.microsoft.com/office/2006/metadata/properties"/>
+    <ds:schemaRef ds:uri="http://schemas.microsoft.com/sharepoint/v3/contenttype/forms"/>
   </ds:schemaRefs>
 </ds:datastoreItem>
 </file>
@@ -18208,9 +18208,17 @@
 </file>
 
 <file path=customXml/itemProps3.xml><?xml version="1.0" encoding="utf-8"?>
-<ds:datastoreItem xmlns:ds="http://schemas.openxmlformats.org/officeDocument/2006/customXml" ds:itemID="{D546C03B-CD3A-4EA0-AAA4-0E00E896454E}">
+<ds:datastoreItem xmlns:ds="http://schemas.openxmlformats.org/officeDocument/2006/customXml" ds:itemID="{DED4E12E-7268-4B03-A47B-0755D62B5E31}">
   <ds:schemaRefs>
-    <ds:schemaRef ds:uri="http://schemas.microsoft.com/sharepoint/v3/contenttype/forms"/>
+    <ds:schemaRef ds:uri="http://purl.org/dc/dcmitype/"/>
+    <ds:schemaRef ds:uri="http://schemas.microsoft.com/office/infopath/2007/PartnerControls"/>
+    <ds:schemaRef ds:uri="http://schemas.openxmlformats.org/package/2006/metadata/core-properties"/>
+    <ds:schemaRef ds:uri="http://schemas.microsoft.com/office/2006/documentManagement/types"/>
+    <ds:schemaRef ds:uri="http://purl.org/dc/terms/"/>
+    <ds:schemaRef ds:uri="http://www.w3.org/XML/1998/namespace"/>
+    <ds:schemaRef ds:uri="http://schemas.microsoft.com/sharepoint/v3"/>
+    <ds:schemaRef ds:uri="http://purl.org/dc/elements/1.1/"/>
+    <ds:schemaRef ds:uri="http://schemas.microsoft.com/office/2006/metadata/properties"/>
   </ds:schemaRefs>
 </ds:datastoreItem>
 </file>
</xml_diff>

<commit_message>
Split NodeJs.pdf to three files, incl. Express and What else could be added to project. Additions
</commit_message>
<xml_diff>
--- a/05_es6_node/NodeJS_demo/02_nodejs/NodeJS.pptx
+++ b/05_es6_node/NodeJS_demo/02_nodejs/NodeJS.pptx
@@ -5,7 +5,7 @@
     <p:sldMasterId id="2147483648" r:id="rId4"/>
   </p:sldMasterIdLst>
   <p:notesMasterIdLst>
-    <p:notesMasterId r:id="rId17"/>
+    <p:notesMasterId r:id="rId13"/>
   </p:notesMasterIdLst>
   <p:sldIdLst>
     <p:sldId id="256" r:id="rId5"/>
@@ -16,10 +16,6 @@
     <p:sldId id="263" r:id="rId10"/>
     <p:sldId id="264" r:id="rId11"/>
     <p:sldId id="265" r:id="rId12"/>
-    <p:sldId id="266" r:id="rId13"/>
-    <p:sldId id="267" r:id="rId14"/>
-    <p:sldId id="268" r:id="rId15"/>
-    <p:sldId id="269" r:id="rId16"/>
   </p:sldIdLst>
   <p:sldSz cx="12192000" cy="6858000"/>
   <p:notesSz cx="6858000" cy="9144000"/>
@@ -1690,7 +1686,7 @@
           <a:p>
             <a:fld id="{5645C365-1C26-6946-87AF-75D6A7DF4277}" type="datetimeFigureOut">
               <a:rPr lang="en-GB" smtClean="0"/>
-              <a:t>09/02/2023</a:t>
+              <a:t>10/02/2023</a:t>
             </a:fld>
             <a:endParaRPr lang="en-GB"/>
           </a:p>
@@ -2189,7 +2185,7 @@
           <a:p>
             <a:fld id="{35B864B8-8D08-7B43-B4FB-B2FB41A5D9E3}" type="datetime1">
               <a:rPr lang="fi-FI" smtClean="0"/>
-              <a:t>9.2.2023</a:t>
+              <a:t>10.2.2023</a:t>
             </a:fld>
             <a:endParaRPr lang="en-GB" dirty="0"/>
           </a:p>
@@ -2516,7 +2512,7 @@
           <a:p>
             <a:fld id="{D5AEA85A-FC56-D34C-9AA6-ECC3D2586F37}" type="datetime1">
               <a:rPr lang="fi-FI" smtClean="0"/>
-              <a:t>9.2.2023</a:t>
+              <a:t>10.2.2023</a:t>
             </a:fld>
             <a:endParaRPr lang="en-GB" dirty="0"/>
           </a:p>
@@ -2726,7 +2722,7 @@
           <a:p>
             <a:fld id="{E6BC6EEF-E660-7844-8930-418AFF95EA40}" type="datetime1">
               <a:rPr lang="fi-FI" smtClean="0"/>
-              <a:t>9.2.2023</a:t>
+              <a:t>10.2.2023</a:t>
             </a:fld>
             <a:endParaRPr lang="en-GB" dirty="0"/>
           </a:p>
@@ -3035,7 +3031,7 @@
           <a:p>
             <a:fld id="{4E10C7EC-C1C1-9849-A573-7692478FCD52}" type="datetime1">
               <a:rPr lang="fi-FI" smtClean="0"/>
-              <a:t>9.2.2023</a:t>
+              <a:t>10.2.2023</a:t>
             </a:fld>
             <a:endParaRPr lang="en-GB" dirty="0"/>
           </a:p>
@@ -3308,7 +3304,7 @@
           <a:p>
             <a:fld id="{844FF3FE-30BE-2040-9151-6FBC4992BF4F}" type="datetime1">
               <a:rPr lang="fi-FI" smtClean="0"/>
-              <a:t>9.2.2023</a:t>
+              <a:t>10.2.2023</a:t>
             </a:fld>
             <a:endParaRPr lang="en-GB" dirty="0"/>
           </a:p>
@@ -3548,7 +3544,7 @@
           <a:p>
             <a:fld id="{11EDCD7B-6966-E249-89F2-D46BDFBF56BE}" type="datetime1">
               <a:rPr lang="fi-FI" smtClean="0"/>
-              <a:t>9.2.2023</a:t>
+              <a:t>10.2.2023</a:t>
             </a:fld>
             <a:endParaRPr lang="en-GB" dirty="0"/>
           </a:p>
@@ -3841,7 +3837,7 @@
           <a:p>
             <a:fld id="{11EDCD7B-6966-E249-89F2-D46BDFBF56BE}" type="datetime1">
               <a:rPr lang="fi-FI" smtClean="0"/>
-              <a:t>9.2.2023</a:t>
+              <a:t>10.2.2023</a:t>
             </a:fld>
             <a:endParaRPr lang="en-GB" dirty="0"/>
           </a:p>
@@ -4280,7 +4276,7 @@
           <a:p>
             <a:fld id="{844FF3FE-30BE-2040-9151-6FBC4992BF4F}" type="datetime1">
               <a:rPr lang="fi-FI" smtClean="0"/>
-              <a:t>9.2.2023</a:t>
+              <a:t>10.2.2023</a:t>
             </a:fld>
             <a:endParaRPr lang="en-GB" dirty="0"/>
           </a:p>
@@ -4508,7 +4504,7 @@
           <a:p>
             <a:fld id="{11EDCD7B-6966-E249-89F2-D46BDFBF56BE}" type="datetime1">
               <a:rPr lang="fi-FI" smtClean="0"/>
-              <a:t>9.2.2023</a:t>
+              <a:t>10.2.2023</a:t>
             </a:fld>
             <a:endParaRPr lang="en-GB" dirty="0"/>
           </a:p>
@@ -4923,7 +4919,7 @@
           <a:p>
             <a:fld id="{B62E192A-D52B-F541-B2AA-4AEB9388F1F7}" type="datetime1">
               <a:rPr lang="fi-FI" smtClean="0"/>
-              <a:t>9.2.2023</a:t>
+              <a:t>10.2.2023</a:t>
             </a:fld>
             <a:endParaRPr lang="en-GB" dirty="0"/>
           </a:p>
@@ -5223,7 +5219,7 @@
           <a:p>
             <a:fld id="{EEA4FAA2-2B3E-264C-A42F-2D6D3EF33A3C}" type="datetime1">
               <a:rPr lang="fi-FI" smtClean="0"/>
-              <a:t>9.2.2023</a:t>
+              <a:t>10.2.2023</a:t>
             </a:fld>
             <a:endParaRPr lang="en-GB" dirty="0"/>
           </a:p>
@@ -6126,7 +6122,7 @@
           <a:p>
             <a:fld id="{B3114A65-8017-1743-A85A-B2A4BB835AE9}" type="datetime1">
               <a:rPr lang="fi-FI" smtClean="0"/>
-              <a:t>9.2.2023</a:t>
+              <a:t>10.2.2023</a:t>
             </a:fld>
             <a:endParaRPr lang="en-GB" dirty="0"/>
           </a:p>
@@ -6354,7 +6350,7 @@
           <a:p>
             <a:fld id="{11EDCD7B-6966-E249-89F2-D46BDFBF56BE}" type="datetime1">
               <a:rPr lang="fi-FI" smtClean="0"/>
-              <a:t>9.2.2023</a:t>
+              <a:t>10.2.2023</a:t>
             </a:fld>
             <a:endParaRPr lang="en-GB" dirty="0"/>
           </a:p>
@@ -6646,7 +6642,7 @@
           <a:p>
             <a:fld id="{45F98643-D206-614D-B596-3C8548138211}" type="datetime1">
               <a:rPr lang="fi-FI" smtClean="0"/>
-              <a:t>9.2.2023</a:t>
+              <a:t>10.2.2023</a:t>
             </a:fld>
             <a:endParaRPr lang="en-GB" dirty="0"/>
           </a:p>
@@ -7295,7 +7291,7 @@
           <a:p>
             <a:fld id="{30BF63A1-919F-FB49-ABA8-182126D24C50}" type="datetime1">
               <a:rPr lang="fi-FI" smtClean="0"/>
-              <a:t>9.2.2023</a:t>
+              <a:t>10.2.2023</a:t>
             </a:fld>
             <a:endParaRPr lang="en-GB" dirty="0"/>
           </a:p>
@@ -7330,2530 +7326,6 @@
     <p:extLst>
       <p:ext uri="{BB962C8B-B14F-4D97-AF65-F5344CB8AC3E}">
         <p14:creationId xmlns:p14="http://schemas.microsoft.com/office/powerpoint/2010/main" val="3436236697"/>
-      </p:ext>
-    </p:extLst>
-  </p:cSld>
-  <p:clrMapOvr>
-    <a:masterClrMapping/>
-  </p:clrMapOvr>
-</p:sld>
-</file>
-
-<file path=ppt/slides/slide10.xml><?xml version="1.0" encoding="utf-8"?>
-<p:sld xmlns:a="http://schemas.openxmlformats.org/drawingml/2006/main" xmlns:r="http://schemas.openxmlformats.org/officeDocument/2006/relationships" xmlns:p="http://schemas.openxmlformats.org/presentationml/2006/main">
-  <p:cSld>
-    <p:spTree>
-      <p:nvGrpSpPr>
-        <p:cNvPr id="1" name=""/>
-        <p:cNvGrpSpPr/>
-        <p:nvPr/>
-      </p:nvGrpSpPr>
-      <p:grpSpPr>
-        <a:xfrm>
-          <a:off x="0" y="0"/>
-          <a:ext cx="0" cy="0"/>
-          <a:chOff x="0" y="0"/>
-          <a:chExt cx="0" cy="0"/>
-        </a:xfrm>
-      </p:grpSpPr>
-      <p:sp>
-        <p:nvSpPr>
-          <p:cNvPr id="8" name="Title 7">
-            <a:extLst>
-              <a:ext uri="{FF2B5EF4-FFF2-40B4-BE49-F238E27FC236}">
-                <a16:creationId xmlns:a16="http://schemas.microsoft.com/office/drawing/2014/main" id="{197044C3-CD23-D844-B780-26FABA91AD0F}"/>
-              </a:ext>
-            </a:extLst>
-          </p:cNvPr>
-          <p:cNvSpPr>
-            <a:spLocks noGrp="1"/>
-          </p:cNvSpPr>
-          <p:nvPr>
-            <p:ph type="title"/>
-          </p:nvPr>
-        </p:nvSpPr>
-        <p:spPr>
-          <a:xfrm>
-            <a:off x="550863" y="549276"/>
-            <a:ext cx="11125200" cy="610054"/>
-          </a:xfrm>
-        </p:spPr>
-        <p:txBody>
-          <a:bodyPr/>
-          <a:lstStyle/>
-          <a:p>
-            <a:r>
-              <a:rPr lang="fi-FI" dirty="0" err="1"/>
-              <a:t>Middleware</a:t>
-            </a:r>
-            <a:r>
-              <a:rPr lang="fi-FI" dirty="0"/>
-              <a:t>?  </a:t>
-            </a:r>
-            <a:r>
-              <a:rPr lang="fi-FI" dirty="0" err="1"/>
-              <a:t>Express.json</a:t>
-            </a:r>
-            <a:r>
-              <a:rPr lang="fi-FI" dirty="0"/>
-              <a:t>() as </a:t>
-            </a:r>
-            <a:r>
-              <a:rPr lang="fi-FI" dirty="0" err="1"/>
-              <a:t>example</a:t>
-            </a:r>
-            <a:endParaRPr lang="fi-FI" dirty="0"/>
-          </a:p>
-        </p:txBody>
-      </p:sp>
-      <p:sp>
-        <p:nvSpPr>
-          <p:cNvPr id="9" name="Content Placeholder 8">
-            <a:extLst>
-              <a:ext uri="{FF2B5EF4-FFF2-40B4-BE49-F238E27FC236}">
-                <a16:creationId xmlns:a16="http://schemas.microsoft.com/office/drawing/2014/main" id="{ACDE61D8-A75A-F94B-B57A-46F276C03311}"/>
-              </a:ext>
-            </a:extLst>
-          </p:cNvPr>
-          <p:cNvSpPr>
-            <a:spLocks noGrp="1"/>
-          </p:cNvSpPr>
-          <p:nvPr>
-            <p:ph sz="half" idx="2"/>
-          </p:nvPr>
-        </p:nvSpPr>
-        <p:spPr>
-          <a:xfrm>
-            <a:off x="550864" y="1159329"/>
-            <a:ext cx="11336336" cy="4996542"/>
-          </a:xfrm>
-        </p:spPr>
-        <p:txBody>
-          <a:bodyPr>
-            <a:noAutofit/>
-          </a:bodyPr>
-          <a:lstStyle/>
-          <a:p>
-            <a:r>
-              <a:rPr lang="fi-FI" dirty="0"/>
-              <a:t>Express </a:t>
-            </a:r>
-            <a:r>
-              <a:rPr lang="fi-FI" dirty="0" err="1"/>
-              <a:t>allows</a:t>
-            </a:r>
-            <a:r>
-              <a:rPr lang="fi-FI" dirty="0"/>
-              <a:t> </a:t>
-            </a:r>
-            <a:r>
-              <a:rPr lang="fi-FI" dirty="0" err="1"/>
-              <a:t>middleware</a:t>
-            </a:r>
-            <a:r>
-              <a:rPr lang="fi-FI" dirty="0"/>
-              <a:t> to </a:t>
-            </a:r>
-            <a:r>
-              <a:rPr lang="fi-FI" dirty="0" err="1"/>
-              <a:t>be</a:t>
-            </a:r>
-            <a:r>
-              <a:rPr lang="fi-FI" dirty="0"/>
-              <a:t> </a:t>
-            </a:r>
-            <a:r>
-              <a:rPr lang="fi-FI" dirty="0" err="1"/>
-              <a:t>used</a:t>
-            </a:r>
-            <a:r>
-              <a:rPr lang="fi-FI" dirty="0"/>
-              <a:t> in </a:t>
-            </a:r>
-            <a:r>
-              <a:rPr lang="fi-FI" dirty="0" err="1"/>
-              <a:t>the</a:t>
-            </a:r>
-            <a:r>
-              <a:rPr lang="fi-FI" dirty="0"/>
-              <a:t> </a:t>
-            </a:r>
-            <a:r>
-              <a:rPr lang="fi-FI" dirty="0" err="1"/>
-              <a:t>request</a:t>
-            </a:r>
-            <a:r>
-              <a:rPr lang="fi-FI" dirty="0"/>
-              <a:t> </a:t>
-            </a:r>
-            <a:r>
-              <a:rPr lang="fi-FI" dirty="0" err="1"/>
-              <a:t>handling</a:t>
-            </a:r>
-            <a:r>
-              <a:rPr lang="fi-FI" dirty="0"/>
-              <a:t> </a:t>
-            </a:r>
-            <a:r>
-              <a:rPr lang="fi-FI" dirty="0" err="1"/>
-              <a:t>loop</a:t>
-            </a:r>
-            <a:r>
-              <a:rPr lang="fi-FI" dirty="0"/>
-              <a:t>, </a:t>
-            </a:r>
-            <a:r>
-              <a:rPr lang="fi-FI" dirty="0" err="1"/>
-              <a:t>before</a:t>
-            </a:r>
-            <a:r>
-              <a:rPr lang="fi-FI" dirty="0"/>
-              <a:t> </a:t>
-            </a:r>
-            <a:r>
-              <a:rPr lang="fi-FI" dirty="0" err="1"/>
-              <a:t>the</a:t>
-            </a:r>
-            <a:r>
-              <a:rPr lang="fi-FI" dirty="0"/>
-              <a:t> </a:t>
-            </a:r>
-            <a:r>
-              <a:rPr lang="fi-FI" dirty="0" err="1"/>
-              <a:t>request</a:t>
-            </a:r>
-            <a:r>
-              <a:rPr lang="fi-FI" dirty="0"/>
-              <a:t> </a:t>
-            </a:r>
-            <a:r>
-              <a:rPr lang="fi-FI" dirty="0" err="1"/>
-              <a:t>comes</a:t>
-            </a:r>
-            <a:r>
-              <a:rPr lang="fi-FI" dirty="0"/>
-              <a:t> to </a:t>
-            </a:r>
-            <a:r>
-              <a:rPr lang="fi-FI" dirty="0" err="1"/>
-              <a:t>your</a:t>
-            </a:r>
-            <a:r>
-              <a:rPr lang="fi-FI" dirty="0"/>
-              <a:t> </a:t>
-            </a:r>
-            <a:r>
-              <a:rPr lang="fi-FI" dirty="0" err="1"/>
-              <a:t>own</a:t>
-            </a:r>
-            <a:r>
-              <a:rPr lang="fi-FI" dirty="0"/>
-              <a:t> </a:t>
-            </a:r>
-            <a:r>
-              <a:rPr lang="fi-FI" dirty="0" err="1"/>
-              <a:t>request</a:t>
-            </a:r>
-            <a:r>
-              <a:rPr lang="fi-FI" dirty="0"/>
-              <a:t> </a:t>
-            </a:r>
-            <a:r>
-              <a:rPr lang="fi-FI" dirty="0" err="1"/>
-              <a:t>handling</a:t>
-            </a:r>
-            <a:r>
-              <a:rPr lang="fi-FI" dirty="0"/>
-              <a:t> </a:t>
-            </a:r>
-            <a:r>
-              <a:rPr lang="fi-FI" dirty="0" err="1"/>
-              <a:t>code</a:t>
-            </a:r>
-            <a:r>
-              <a:rPr lang="fi-FI" dirty="0"/>
-              <a:t> in </a:t>
-            </a:r>
-            <a:r>
-              <a:rPr lang="fi-FI" dirty="0" err="1"/>
-              <a:t>the</a:t>
-            </a:r>
-            <a:r>
-              <a:rPr lang="fi-FI" dirty="0"/>
-              <a:t> </a:t>
-            </a:r>
-            <a:r>
-              <a:rPr lang="fi-FI" dirty="0" err="1"/>
-              <a:t>routes</a:t>
-            </a:r>
-            <a:r>
-              <a:rPr lang="fi-FI" dirty="0"/>
-              <a:t> </a:t>
-            </a:r>
-            <a:r>
-              <a:rPr lang="fi-FI" dirty="0" err="1"/>
-              <a:t>folder</a:t>
-            </a:r>
-            <a:endParaRPr lang="fi-FI" dirty="0"/>
-          </a:p>
-          <a:p>
-            <a:r>
-              <a:rPr lang="fi-FI" dirty="0" err="1"/>
-              <a:t>Middleware</a:t>
-            </a:r>
-            <a:r>
-              <a:rPr lang="fi-FI" dirty="0"/>
-              <a:t> </a:t>
-            </a:r>
-            <a:r>
-              <a:rPr lang="fi-FI" dirty="0" err="1"/>
-              <a:t>functions</a:t>
-            </a:r>
-            <a:r>
-              <a:rPr lang="fi-FI" dirty="0"/>
-              <a:t> </a:t>
-            </a:r>
-            <a:r>
-              <a:rPr lang="fi-FI" dirty="0" err="1"/>
-              <a:t>take</a:t>
-            </a:r>
-            <a:r>
-              <a:rPr lang="fi-FI" dirty="0"/>
-              <a:t> </a:t>
-            </a:r>
-            <a:r>
-              <a:rPr lang="fi-FI" dirty="0" err="1"/>
-              <a:t>the</a:t>
-            </a:r>
-            <a:r>
-              <a:rPr lang="fi-FI" dirty="0"/>
-              <a:t> </a:t>
-            </a:r>
-            <a:r>
-              <a:rPr lang="fi-FI" dirty="0" err="1"/>
-              <a:t>request</a:t>
-            </a:r>
-            <a:r>
-              <a:rPr lang="fi-FI" dirty="0"/>
-              <a:t> (</a:t>
-            </a:r>
-            <a:r>
-              <a:rPr lang="fi-FI" dirty="0" err="1"/>
-              <a:t>request-response</a:t>
-            </a:r>
-            <a:r>
-              <a:rPr lang="fi-FI" dirty="0"/>
-              <a:t> </a:t>
-            </a:r>
-            <a:r>
-              <a:rPr lang="fi-FI" dirty="0" err="1"/>
-              <a:t>object</a:t>
-            </a:r>
-            <a:r>
-              <a:rPr lang="fi-FI" dirty="0"/>
-              <a:t> </a:t>
-            </a:r>
-            <a:r>
-              <a:rPr lang="fi-FI" dirty="0" err="1"/>
-              <a:t>pair</a:t>
-            </a:r>
-            <a:r>
-              <a:rPr lang="fi-FI" dirty="0"/>
-              <a:t>), and </a:t>
-            </a:r>
-            <a:r>
-              <a:rPr lang="fi-FI" dirty="0" err="1"/>
-              <a:t>do</a:t>
-            </a:r>
-            <a:r>
-              <a:rPr lang="fi-FI" dirty="0"/>
-              <a:t> </a:t>
-            </a:r>
-            <a:r>
-              <a:rPr lang="fi-FI" dirty="0" err="1"/>
-              <a:t>something</a:t>
-            </a:r>
-            <a:r>
-              <a:rPr lang="fi-FI" dirty="0"/>
-              <a:t> to </a:t>
-            </a:r>
-            <a:r>
-              <a:rPr lang="fi-FI" dirty="0" err="1"/>
-              <a:t>them</a:t>
-            </a:r>
-            <a:r>
-              <a:rPr lang="fi-FI" dirty="0"/>
-              <a:t>, and </a:t>
-            </a:r>
-            <a:r>
-              <a:rPr lang="fi-FI" dirty="0" err="1"/>
-              <a:t>then</a:t>
-            </a:r>
-            <a:r>
-              <a:rPr lang="fi-FI" dirty="0"/>
-              <a:t> </a:t>
-            </a:r>
-            <a:r>
-              <a:rPr lang="fi-FI" dirty="0" err="1"/>
-              <a:t>ask</a:t>
-            </a:r>
-            <a:r>
-              <a:rPr lang="fi-FI" dirty="0"/>
-              <a:t> </a:t>
-            </a:r>
-            <a:r>
-              <a:rPr lang="fi-FI" dirty="0" err="1"/>
-              <a:t>next</a:t>
-            </a:r>
-            <a:r>
-              <a:rPr lang="fi-FI" dirty="0"/>
-              <a:t> </a:t>
-            </a:r>
-            <a:r>
-              <a:rPr lang="fi-FI" dirty="0" err="1"/>
-              <a:t>middleware</a:t>
-            </a:r>
-            <a:r>
-              <a:rPr lang="fi-FI" dirty="0"/>
-              <a:t> </a:t>
-            </a:r>
-            <a:r>
-              <a:rPr lang="fi-FI" dirty="0" err="1"/>
-              <a:t>function</a:t>
-            </a:r>
-            <a:r>
-              <a:rPr lang="fi-FI" dirty="0"/>
-              <a:t> to </a:t>
-            </a:r>
-            <a:r>
-              <a:rPr lang="fi-FI" dirty="0" err="1"/>
-              <a:t>continue</a:t>
-            </a:r>
-            <a:r>
-              <a:rPr lang="fi-FI" dirty="0"/>
-              <a:t>, </a:t>
-            </a:r>
-            <a:r>
-              <a:rPr lang="fi-FI" dirty="0" err="1"/>
-              <a:t>or</a:t>
-            </a:r>
-            <a:r>
-              <a:rPr lang="fi-FI" dirty="0"/>
-              <a:t> "</a:t>
-            </a:r>
-            <a:r>
-              <a:rPr lang="fi-FI" dirty="0" err="1"/>
-              <a:t>pass</a:t>
-            </a:r>
-            <a:r>
-              <a:rPr lang="fi-FI" dirty="0"/>
-              <a:t> </a:t>
-            </a:r>
-            <a:r>
-              <a:rPr lang="fi-FI" dirty="0" err="1"/>
-              <a:t>the</a:t>
-            </a:r>
-            <a:r>
-              <a:rPr lang="fi-FI" dirty="0"/>
-              <a:t> </a:t>
-            </a:r>
-            <a:r>
-              <a:rPr lang="fi-FI" dirty="0" err="1"/>
-              <a:t>control</a:t>
-            </a:r>
-            <a:r>
-              <a:rPr lang="fi-FI" dirty="0"/>
-              <a:t> to </a:t>
-            </a:r>
-            <a:r>
-              <a:rPr lang="fi-FI" dirty="0" err="1"/>
-              <a:t>the</a:t>
-            </a:r>
-            <a:r>
-              <a:rPr lang="fi-FI" dirty="0"/>
-              <a:t> </a:t>
-            </a:r>
-            <a:r>
-              <a:rPr lang="fi-FI" dirty="0" err="1"/>
-              <a:t>next</a:t>
-            </a:r>
-            <a:r>
-              <a:rPr lang="fi-FI" dirty="0"/>
-              <a:t> </a:t>
-            </a:r>
-            <a:r>
-              <a:rPr lang="fi-FI" dirty="0" err="1"/>
-              <a:t>middleware</a:t>
-            </a:r>
-            <a:r>
-              <a:rPr lang="fi-FI" dirty="0"/>
-              <a:t> </a:t>
-            </a:r>
-            <a:r>
-              <a:rPr lang="fi-FI" dirty="0" err="1"/>
-              <a:t>handler</a:t>
-            </a:r>
-            <a:r>
-              <a:rPr lang="fi-FI" dirty="0"/>
-              <a:t>". </a:t>
-            </a:r>
-            <a:r>
-              <a:rPr lang="fi-FI" dirty="0" err="1"/>
-              <a:t>That</a:t>
-            </a:r>
-            <a:r>
-              <a:rPr lang="fi-FI" dirty="0"/>
-              <a:t> is </a:t>
-            </a:r>
-            <a:r>
-              <a:rPr lang="fi-FI" dirty="0" err="1"/>
-              <a:t>they</a:t>
-            </a:r>
-            <a:r>
-              <a:rPr lang="fi-FI" dirty="0"/>
-              <a:t> </a:t>
-            </a:r>
-            <a:r>
-              <a:rPr lang="fi-FI" dirty="0" err="1"/>
-              <a:t>intervene</a:t>
-            </a:r>
-            <a:r>
-              <a:rPr lang="fi-FI" dirty="0"/>
-              <a:t> in </a:t>
-            </a:r>
-            <a:r>
-              <a:rPr lang="fi-FI" dirty="0" err="1"/>
-              <a:t>the</a:t>
-            </a:r>
-            <a:r>
-              <a:rPr lang="fi-FI" dirty="0"/>
-              <a:t> </a:t>
-            </a:r>
-            <a:r>
-              <a:rPr lang="fi-FI" dirty="0" err="1"/>
-              <a:t>request</a:t>
-            </a:r>
-            <a:r>
-              <a:rPr lang="fi-FI" dirty="0"/>
-              <a:t> </a:t>
-            </a:r>
-            <a:r>
-              <a:rPr lang="fi-FI" dirty="0" err="1"/>
-              <a:t>processing</a:t>
-            </a:r>
-            <a:r>
-              <a:rPr lang="fi-FI" dirty="0"/>
-              <a:t> </a:t>
-            </a:r>
-            <a:r>
-              <a:rPr lang="fi-FI" dirty="0" err="1"/>
-              <a:t>pipeline</a:t>
-            </a:r>
-            <a:r>
-              <a:rPr lang="fi-FI" dirty="0"/>
-              <a:t> for a single </a:t>
-            </a:r>
-            <a:r>
-              <a:rPr lang="fi-FI" dirty="0" err="1"/>
-              <a:t>request</a:t>
-            </a:r>
-            <a:r>
-              <a:rPr lang="fi-FI" dirty="0"/>
-              <a:t>. </a:t>
-            </a:r>
-            <a:r>
-              <a:rPr lang="fi-FI" dirty="0" err="1"/>
-              <a:t>Until</a:t>
-            </a:r>
-            <a:r>
-              <a:rPr lang="fi-FI" dirty="0"/>
-              <a:t> </a:t>
-            </a:r>
-            <a:r>
-              <a:rPr lang="fi-FI" dirty="0" err="1"/>
-              <a:t>the</a:t>
-            </a:r>
-            <a:r>
-              <a:rPr lang="fi-FI" dirty="0"/>
-              <a:t> </a:t>
-            </a:r>
-            <a:r>
-              <a:rPr lang="fi-FI" dirty="0" err="1"/>
-              <a:t>last</a:t>
-            </a:r>
-            <a:r>
-              <a:rPr lang="fi-FI" dirty="0"/>
-              <a:t> </a:t>
-            </a:r>
-            <a:r>
-              <a:rPr lang="fi-FI" dirty="0" err="1"/>
-              <a:t>function</a:t>
-            </a:r>
-            <a:r>
-              <a:rPr lang="fi-FI" dirty="0"/>
-              <a:t> is </a:t>
-            </a:r>
-            <a:r>
-              <a:rPr lang="fi-FI" dirty="0" err="1"/>
-              <a:t>your</a:t>
-            </a:r>
-            <a:r>
-              <a:rPr lang="fi-FI" dirty="0"/>
-              <a:t> </a:t>
-            </a:r>
-            <a:r>
-              <a:rPr lang="fi-FI" dirty="0" err="1"/>
-              <a:t>own</a:t>
-            </a:r>
-            <a:r>
-              <a:rPr lang="fi-FI" dirty="0"/>
-              <a:t> </a:t>
-            </a:r>
-            <a:r>
-              <a:rPr lang="fi-FI" dirty="0" err="1"/>
-              <a:t>request</a:t>
-            </a:r>
-            <a:r>
-              <a:rPr lang="fi-FI" dirty="0"/>
-              <a:t> </a:t>
-            </a:r>
-            <a:r>
-              <a:rPr lang="fi-FI" dirty="0" err="1"/>
-              <a:t>handler</a:t>
-            </a:r>
-            <a:r>
-              <a:rPr lang="fi-FI" dirty="0"/>
-              <a:t> .</a:t>
-            </a:r>
-            <a:r>
-              <a:rPr lang="fi-FI" dirty="0" err="1"/>
-              <a:t>get</a:t>
-            </a:r>
-            <a:r>
-              <a:rPr lang="fi-FI" dirty="0"/>
-              <a:t>() .</a:t>
-            </a:r>
-            <a:r>
-              <a:rPr lang="fi-FI" dirty="0" err="1"/>
-              <a:t>delete</a:t>
-            </a:r>
-            <a:r>
-              <a:rPr lang="fi-FI" dirty="0"/>
-              <a:t>() </a:t>
-            </a:r>
-            <a:r>
-              <a:rPr lang="fi-FI" dirty="0" err="1"/>
-              <a:t>or</a:t>
-            </a:r>
-            <a:r>
-              <a:rPr lang="fi-FI" dirty="0"/>
-              <a:t> so. </a:t>
-            </a:r>
-          </a:p>
-          <a:p>
-            <a:r>
-              <a:rPr lang="fi-FI" dirty="0" err="1"/>
-              <a:t>E.g</a:t>
-            </a:r>
-            <a:r>
-              <a:rPr lang="fi-FI" dirty="0"/>
-              <a:t>. inside: index.js in </a:t>
-            </a:r>
-            <a:r>
-              <a:rPr lang="fi-FI" dirty="0" err="1"/>
-              <a:t>root</a:t>
-            </a:r>
-            <a:r>
-              <a:rPr lang="fi-FI" dirty="0"/>
-              <a:t> </a:t>
-            </a:r>
-            <a:r>
-              <a:rPr lang="fi-FI" dirty="0" err="1"/>
-              <a:t>folder</a:t>
-            </a:r>
-            <a:r>
-              <a:rPr lang="fi-FI" dirty="0"/>
-              <a:t> (</a:t>
-            </a:r>
-            <a:r>
-              <a:rPr lang="fi-FI" dirty="0" err="1"/>
-              <a:t>the</a:t>
-            </a:r>
-            <a:r>
-              <a:rPr lang="fi-FI" dirty="0"/>
-              <a:t> </a:t>
-            </a:r>
-            <a:r>
-              <a:rPr lang="fi-FI" dirty="0" err="1"/>
-              <a:t>starting</a:t>
-            </a:r>
-            <a:r>
-              <a:rPr lang="fi-FI" dirty="0"/>
-              <a:t> </a:t>
-            </a:r>
-            <a:r>
-              <a:rPr lang="fi-FI" dirty="0" err="1"/>
-              <a:t>point</a:t>
-            </a:r>
-            <a:r>
-              <a:rPr lang="fi-FI" dirty="0"/>
-              <a:t> of </a:t>
-            </a:r>
-            <a:r>
-              <a:rPr lang="fi-FI" dirty="0" err="1"/>
-              <a:t>the</a:t>
-            </a:r>
-            <a:r>
-              <a:rPr lang="fi-FI" dirty="0"/>
-              <a:t> </a:t>
-            </a:r>
-            <a:r>
-              <a:rPr lang="fi-FI" dirty="0" err="1"/>
-              <a:t>backend</a:t>
-            </a:r>
-            <a:r>
-              <a:rPr lang="fi-FI" dirty="0"/>
-              <a:t> </a:t>
-            </a:r>
-            <a:r>
-              <a:rPr lang="fi-FI" dirty="0" err="1"/>
-              <a:t>app</a:t>
-            </a:r>
-            <a:r>
-              <a:rPr lang="fi-FI" dirty="0"/>
-              <a:t>)</a:t>
-            </a:r>
-          </a:p>
-          <a:p>
-            <a:pPr lvl="1"/>
-            <a:r>
-              <a:rPr lang="fi-FI" dirty="0"/>
-              <a:t>import express </a:t>
-            </a:r>
-            <a:r>
-              <a:rPr lang="fi-FI" dirty="0" err="1"/>
-              <a:t>from</a:t>
-            </a:r>
-            <a:r>
-              <a:rPr lang="fi-FI" dirty="0"/>
-              <a:t> "express";</a:t>
-            </a:r>
-          </a:p>
-          <a:p>
-            <a:pPr marL="504000" lvl="1" indent="0">
-              <a:buNone/>
-            </a:pPr>
-            <a:endParaRPr lang="fi-FI" dirty="0"/>
-          </a:p>
-          <a:p>
-            <a:pPr lvl="1"/>
-            <a:r>
-              <a:rPr lang="fi-FI" dirty="0" err="1"/>
-              <a:t>const</a:t>
-            </a:r>
-            <a:r>
-              <a:rPr lang="fi-FI" dirty="0"/>
-              <a:t> </a:t>
-            </a:r>
-            <a:r>
-              <a:rPr lang="fi-FI" dirty="0" err="1"/>
-              <a:t>app</a:t>
-            </a:r>
-            <a:r>
-              <a:rPr lang="fi-FI" dirty="0"/>
-              <a:t> = express();</a:t>
-            </a:r>
-          </a:p>
-          <a:p>
-            <a:pPr lvl="1"/>
-            <a:r>
-              <a:rPr lang="fi-FI" b="1" dirty="0" err="1"/>
-              <a:t>app.use</a:t>
-            </a:r>
-            <a:r>
-              <a:rPr lang="fi-FI" b="1" dirty="0"/>
-              <a:t>( </a:t>
-            </a:r>
-            <a:r>
-              <a:rPr lang="fi-FI" b="1" dirty="0" err="1"/>
-              <a:t>express.json</a:t>
-            </a:r>
-            <a:r>
-              <a:rPr lang="fi-FI" b="1" dirty="0"/>
-              <a:t>() );</a:t>
-            </a:r>
-            <a:r>
-              <a:rPr lang="fi-FI" dirty="0"/>
-              <a:t>     // </a:t>
-            </a:r>
-            <a:r>
-              <a:rPr lang="fi-FI" dirty="0" err="1"/>
-              <a:t>adds</a:t>
-            </a:r>
-            <a:r>
-              <a:rPr lang="fi-FI" dirty="0"/>
-              <a:t> a </a:t>
-            </a:r>
-            <a:r>
-              <a:rPr lang="fi-FI" dirty="0" err="1"/>
-              <a:t>function</a:t>
-            </a:r>
-            <a:r>
-              <a:rPr lang="fi-FI" dirty="0"/>
-              <a:t> (</a:t>
-            </a:r>
-            <a:r>
-              <a:rPr lang="fi-FI" dirty="0" err="1"/>
-              <a:t>that</a:t>
-            </a:r>
-            <a:r>
-              <a:rPr lang="fi-FI" dirty="0"/>
-              <a:t> </a:t>
-            </a:r>
-            <a:r>
-              <a:rPr lang="fi-FI" dirty="0" err="1"/>
-              <a:t>express.json</a:t>
-            </a:r>
-            <a:r>
-              <a:rPr lang="fi-FI" dirty="0"/>
-              <a:t>() </a:t>
-            </a:r>
-            <a:r>
-              <a:rPr lang="fi-FI" dirty="0" err="1"/>
-              <a:t>returns</a:t>
-            </a:r>
-            <a:r>
-              <a:rPr lang="fi-FI" dirty="0"/>
-              <a:t>) to </a:t>
-            </a:r>
-            <a:r>
-              <a:rPr lang="fi-FI" dirty="0" err="1"/>
-              <a:t>the</a:t>
-            </a:r>
-            <a:r>
-              <a:rPr lang="fi-FI" dirty="0"/>
-              <a:t> </a:t>
-            </a:r>
-            <a:r>
-              <a:rPr lang="fi-FI" dirty="0" err="1"/>
-              <a:t>request</a:t>
-            </a:r>
-            <a:r>
-              <a:rPr lang="fi-FI" dirty="0"/>
-              <a:t> </a:t>
-            </a:r>
-            <a:r>
-              <a:rPr lang="fi-FI" dirty="0" err="1"/>
-              <a:t>handling</a:t>
-            </a:r>
-            <a:r>
-              <a:rPr lang="fi-FI" dirty="0"/>
-              <a:t> </a:t>
-            </a:r>
-            <a:r>
-              <a:rPr lang="fi-FI" dirty="0" err="1"/>
-              <a:t>loop</a:t>
-            </a:r>
-            <a:endParaRPr lang="fi-FI" dirty="0"/>
-          </a:p>
-          <a:p>
-            <a:r>
-              <a:rPr lang="fi-FI" dirty="0"/>
-              <a:t>… </a:t>
-            </a:r>
-            <a:r>
-              <a:rPr lang="fi-FI" dirty="0" err="1"/>
-              <a:t>then</a:t>
-            </a:r>
-            <a:r>
-              <a:rPr lang="fi-FI" dirty="0"/>
-              <a:t> in </a:t>
-            </a:r>
-            <a:r>
-              <a:rPr lang="fi-FI" dirty="0" err="1"/>
-              <a:t>e.g</a:t>
-            </a:r>
-            <a:r>
-              <a:rPr lang="fi-FI" dirty="0"/>
-              <a:t>. /</a:t>
-            </a:r>
-            <a:r>
-              <a:rPr lang="fi-FI" dirty="0" err="1"/>
-              <a:t>routes</a:t>
-            </a:r>
-            <a:r>
-              <a:rPr lang="fi-FI" dirty="0"/>
-              <a:t>/category.js</a:t>
-            </a:r>
-          </a:p>
-          <a:p>
-            <a:pPr lvl="1"/>
-            <a:r>
-              <a:rPr lang="fi-FI" dirty="0" err="1"/>
-              <a:t>if</a:t>
-            </a:r>
-            <a:r>
-              <a:rPr lang="fi-FI" dirty="0"/>
-              <a:t>( </a:t>
-            </a:r>
-            <a:r>
-              <a:rPr lang="fi-FI" b="1" dirty="0"/>
-              <a:t>req.body</a:t>
-            </a:r>
-            <a:r>
-              <a:rPr lang="fi-FI" b="1"/>
-              <a:t>.</a:t>
-            </a:r>
-            <a:r>
-              <a:rPr lang="fi-FI"/>
-              <a:t>name.length </a:t>
-            </a:r>
-            <a:r>
-              <a:rPr lang="fi-FI" dirty="0"/>
-              <a:t>&gt; 2)     // </a:t>
-            </a:r>
-            <a:r>
-              <a:rPr lang="fi-FI" dirty="0" err="1"/>
-              <a:t>express.json</a:t>
-            </a:r>
-            <a:r>
-              <a:rPr lang="fi-FI" dirty="0"/>
-              <a:t> </a:t>
-            </a:r>
-            <a:r>
-              <a:rPr lang="fi-FI" dirty="0" err="1"/>
-              <a:t>has</a:t>
-            </a:r>
-            <a:r>
-              <a:rPr lang="fi-FI" dirty="0"/>
-              <a:t> </a:t>
-            </a:r>
-            <a:r>
-              <a:rPr lang="fi-FI" dirty="0" err="1"/>
-              <a:t>parsed</a:t>
-            </a:r>
-            <a:r>
-              <a:rPr lang="fi-FI" dirty="0"/>
-              <a:t> </a:t>
-            </a:r>
-            <a:r>
-              <a:rPr lang="fi-FI" dirty="0" err="1"/>
-              <a:t>the</a:t>
-            </a:r>
-            <a:r>
-              <a:rPr lang="fi-FI" dirty="0"/>
-              <a:t> </a:t>
-            </a:r>
-            <a:r>
-              <a:rPr lang="fi-FI" dirty="0" err="1"/>
-              <a:t>body</a:t>
-            </a:r>
-            <a:r>
-              <a:rPr lang="fi-FI" dirty="0"/>
-              <a:t> JSON </a:t>
-            </a:r>
-            <a:r>
-              <a:rPr lang="fi-FI" dirty="0" err="1"/>
-              <a:t>text</a:t>
-            </a:r>
-            <a:r>
-              <a:rPr lang="fi-FI" dirty="0"/>
-              <a:t> as a JS </a:t>
-            </a:r>
-            <a:r>
-              <a:rPr lang="fi-FI" dirty="0" err="1"/>
-              <a:t>object</a:t>
-            </a:r>
-            <a:r>
-              <a:rPr lang="fi-FI" dirty="0"/>
-              <a:t> </a:t>
-            </a:r>
-            <a:r>
-              <a:rPr lang="fi-FI" dirty="0" err="1"/>
-              <a:t>automatically</a:t>
-            </a:r>
-            <a:r>
-              <a:rPr lang="fi-FI" dirty="0"/>
-              <a:t>.</a:t>
-            </a:r>
-          </a:p>
-        </p:txBody>
-      </p:sp>
-      <p:sp>
-        <p:nvSpPr>
-          <p:cNvPr id="5" name="Date Placeholder 4">
-            <a:extLst>
-              <a:ext uri="{FF2B5EF4-FFF2-40B4-BE49-F238E27FC236}">
-                <a16:creationId xmlns:a16="http://schemas.microsoft.com/office/drawing/2014/main" id="{976244E2-AA76-2742-B2EC-FEC79276155C}"/>
-              </a:ext>
-            </a:extLst>
-          </p:cNvPr>
-          <p:cNvSpPr>
-            <a:spLocks noGrp="1"/>
-          </p:cNvSpPr>
-          <p:nvPr>
-            <p:ph type="dt" sz="half" idx="10"/>
-          </p:nvPr>
-        </p:nvSpPr>
-        <p:spPr/>
-        <p:txBody>
-          <a:bodyPr/>
-          <a:lstStyle/>
-          <a:p>
-            <a:fld id="{202E1EC2-47B8-044B-A09E-6A63B4D80C87}" type="datetime1">
-              <a:rPr lang="fi-FI" smtClean="0"/>
-              <a:t>9.2.2023</a:t>
-            </a:fld>
-            <a:endParaRPr lang="en-GB"/>
-          </a:p>
-        </p:txBody>
-      </p:sp>
-      <p:sp>
-        <p:nvSpPr>
-          <p:cNvPr id="6" name="Footer Placeholder 5">
-            <a:extLst>
-              <a:ext uri="{FF2B5EF4-FFF2-40B4-BE49-F238E27FC236}">
-                <a16:creationId xmlns:a16="http://schemas.microsoft.com/office/drawing/2014/main" id="{588CE607-4137-8840-8FEA-42EAC857E3A3}"/>
-              </a:ext>
-            </a:extLst>
-          </p:cNvPr>
-          <p:cNvSpPr>
-            <a:spLocks noGrp="1"/>
-          </p:cNvSpPr>
-          <p:nvPr>
-            <p:ph type="ftr" sz="quarter" idx="11"/>
-          </p:nvPr>
-        </p:nvSpPr>
-        <p:spPr/>
-        <p:txBody>
-          <a:bodyPr/>
-          <a:lstStyle/>
-          <a:p>
-            <a:endParaRPr lang="en-GB"/>
-          </a:p>
-        </p:txBody>
-      </p:sp>
-      <p:sp>
-        <p:nvSpPr>
-          <p:cNvPr id="7" name="Slide Number Placeholder 6">
-            <a:extLst>
-              <a:ext uri="{FF2B5EF4-FFF2-40B4-BE49-F238E27FC236}">
-                <a16:creationId xmlns:a16="http://schemas.microsoft.com/office/drawing/2014/main" id="{2E133A96-6C73-0844-B8CB-27C2B5F4CFB1}"/>
-              </a:ext>
-            </a:extLst>
-          </p:cNvPr>
-          <p:cNvSpPr>
-            <a:spLocks noGrp="1"/>
-          </p:cNvSpPr>
-          <p:nvPr>
-            <p:ph type="sldNum" sz="quarter" idx="12"/>
-          </p:nvPr>
-        </p:nvSpPr>
-        <p:spPr/>
-        <p:txBody>
-          <a:bodyPr/>
-          <a:lstStyle/>
-          <a:p>
-            <a:fld id="{76BAB7ED-EDE9-4D4B-9A2D-30E18C47C16E}" type="slidenum">
-              <a:rPr lang="en-GB" smtClean="0"/>
-              <a:t>10</a:t>
-            </a:fld>
-            <a:endParaRPr lang="en-GB"/>
-          </a:p>
-        </p:txBody>
-      </p:sp>
-    </p:spTree>
-    <p:extLst>
-      <p:ext uri="{BB962C8B-B14F-4D97-AF65-F5344CB8AC3E}">
-        <p14:creationId xmlns:p14="http://schemas.microsoft.com/office/powerpoint/2010/main" val="2487180626"/>
-      </p:ext>
-    </p:extLst>
-  </p:cSld>
-  <p:clrMapOvr>
-    <a:masterClrMapping/>
-  </p:clrMapOvr>
-</p:sld>
-</file>
-
-<file path=ppt/slides/slide11.xml><?xml version="1.0" encoding="utf-8"?>
-<p:sld xmlns:a="http://schemas.openxmlformats.org/drawingml/2006/main" xmlns:r="http://schemas.openxmlformats.org/officeDocument/2006/relationships" xmlns:p="http://schemas.openxmlformats.org/presentationml/2006/main">
-  <p:cSld>
-    <p:spTree>
-      <p:nvGrpSpPr>
-        <p:cNvPr id="1" name=""/>
-        <p:cNvGrpSpPr/>
-        <p:nvPr/>
-      </p:nvGrpSpPr>
-      <p:grpSpPr>
-        <a:xfrm>
-          <a:off x="0" y="0"/>
-          <a:ext cx="0" cy="0"/>
-          <a:chOff x="0" y="0"/>
-          <a:chExt cx="0" cy="0"/>
-        </a:xfrm>
-      </p:grpSpPr>
-      <p:sp>
-        <p:nvSpPr>
-          <p:cNvPr id="8" name="Title 7">
-            <a:extLst>
-              <a:ext uri="{FF2B5EF4-FFF2-40B4-BE49-F238E27FC236}">
-                <a16:creationId xmlns:a16="http://schemas.microsoft.com/office/drawing/2014/main" id="{197044C3-CD23-D844-B780-26FABA91AD0F}"/>
-              </a:ext>
-            </a:extLst>
-          </p:cNvPr>
-          <p:cNvSpPr>
-            <a:spLocks noGrp="1"/>
-          </p:cNvSpPr>
-          <p:nvPr>
-            <p:ph type="title"/>
-          </p:nvPr>
-        </p:nvSpPr>
-        <p:spPr>
-          <a:xfrm>
-            <a:off x="550863" y="549276"/>
-            <a:ext cx="11125200" cy="610054"/>
-          </a:xfrm>
-        </p:spPr>
-        <p:txBody>
-          <a:bodyPr/>
-          <a:lstStyle/>
-          <a:p>
-            <a:r>
-              <a:rPr lang="fi-FI" dirty="0" err="1"/>
-              <a:t>Another</a:t>
-            </a:r>
-            <a:r>
-              <a:rPr lang="fi-FI" dirty="0"/>
-              <a:t> </a:t>
-            </a:r>
-            <a:r>
-              <a:rPr lang="fi-FI" dirty="0" err="1"/>
-              <a:t>example</a:t>
-            </a:r>
-            <a:r>
-              <a:rPr lang="fi-FI" dirty="0"/>
-              <a:t> of </a:t>
-            </a:r>
-            <a:r>
-              <a:rPr lang="fi-FI" dirty="0" err="1"/>
-              <a:t>Middleware</a:t>
-            </a:r>
-            <a:r>
-              <a:rPr lang="fi-FI" dirty="0"/>
-              <a:t> - CORS</a:t>
-            </a:r>
-          </a:p>
-        </p:txBody>
-      </p:sp>
-      <p:sp>
-        <p:nvSpPr>
-          <p:cNvPr id="9" name="Content Placeholder 8">
-            <a:extLst>
-              <a:ext uri="{FF2B5EF4-FFF2-40B4-BE49-F238E27FC236}">
-                <a16:creationId xmlns:a16="http://schemas.microsoft.com/office/drawing/2014/main" id="{ACDE61D8-A75A-F94B-B57A-46F276C03311}"/>
-              </a:ext>
-            </a:extLst>
-          </p:cNvPr>
-          <p:cNvSpPr>
-            <a:spLocks noGrp="1"/>
-          </p:cNvSpPr>
-          <p:nvPr>
-            <p:ph sz="half" idx="2"/>
-          </p:nvPr>
-        </p:nvSpPr>
-        <p:spPr>
-          <a:xfrm>
-            <a:off x="550864" y="1159329"/>
-            <a:ext cx="11336336" cy="4996542"/>
-          </a:xfrm>
-        </p:spPr>
-        <p:txBody>
-          <a:bodyPr>
-            <a:noAutofit/>
-          </a:bodyPr>
-          <a:lstStyle/>
-          <a:p>
-            <a:r>
-              <a:rPr lang="fi-FI" dirty="0"/>
-              <a:t>CORS = Cross-</a:t>
-            </a:r>
-            <a:r>
-              <a:rPr lang="fi-FI" dirty="0" err="1"/>
-              <a:t>origin</a:t>
-            </a:r>
-            <a:r>
-              <a:rPr lang="fi-FI" dirty="0"/>
-              <a:t> Resource </a:t>
-            </a:r>
-            <a:r>
-              <a:rPr lang="fi-FI" dirty="0" err="1"/>
-              <a:t>Sharing</a:t>
-            </a:r>
-            <a:endParaRPr lang="fi-FI" dirty="0"/>
-          </a:p>
-          <a:p>
-            <a:r>
-              <a:rPr lang="fi-FI" dirty="0" err="1"/>
-              <a:t>Protection</a:t>
-            </a:r>
-            <a:r>
-              <a:rPr lang="fi-FI" dirty="0"/>
-              <a:t> </a:t>
-            </a:r>
-            <a:r>
-              <a:rPr lang="fi-FI" dirty="0" err="1"/>
-              <a:t>mechanism</a:t>
-            </a:r>
-            <a:r>
-              <a:rPr lang="fi-FI" dirty="0"/>
-              <a:t>. </a:t>
-            </a:r>
-            <a:r>
-              <a:rPr lang="fi-FI" dirty="0" err="1"/>
-              <a:t>Trying</a:t>
-            </a:r>
-            <a:r>
-              <a:rPr lang="fi-FI" dirty="0"/>
-              <a:t> to stop </a:t>
-            </a:r>
-            <a:r>
-              <a:rPr lang="fi-FI" dirty="0" err="1"/>
-              <a:t>illegal</a:t>
-            </a:r>
-            <a:r>
-              <a:rPr lang="fi-FI" dirty="0"/>
-              <a:t> </a:t>
-            </a:r>
-            <a:r>
-              <a:rPr lang="fi-FI" dirty="0" err="1"/>
-              <a:t>injection</a:t>
-            </a:r>
-            <a:r>
-              <a:rPr lang="fi-FI" dirty="0"/>
-              <a:t> of </a:t>
-            </a:r>
-            <a:r>
-              <a:rPr lang="fi-FI" dirty="0" err="1"/>
-              <a:t>content</a:t>
-            </a:r>
-            <a:r>
-              <a:rPr lang="fi-FI" dirty="0"/>
-              <a:t> </a:t>
-            </a:r>
-            <a:r>
-              <a:rPr lang="fi-FI" dirty="0" err="1"/>
-              <a:t>from</a:t>
-            </a:r>
-            <a:r>
-              <a:rPr lang="fi-FI" dirty="0"/>
-              <a:t> </a:t>
-            </a:r>
-            <a:r>
-              <a:rPr lang="fi-FI" dirty="0" err="1"/>
-              <a:t>another</a:t>
-            </a:r>
-            <a:r>
-              <a:rPr lang="fi-FI" dirty="0"/>
-              <a:t> </a:t>
-            </a:r>
-            <a:r>
-              <a:rPr lang="fi-FI" dirty="0" err="1"/>
-              <a:t>server</a:t>
-            </a:r>
-            <a:r>
-              <a:rPr lang="fi-FI" dirty="0"/>
-              <a:t>.</a:t>
-            </a:r>
-          </a:p>
-          <a:p>
-            <a:r>
-              <a:rPr lang="fi-FI" dirty="0" err="1"/>
-              <a:t>With</a:t>
-            </a:r>
-            <a:r>
-              <a:rPr lang="fi-FI" dirty="0"/>
-              <a:t> </a:t>
-            </a:r>
-            <a:r>
-              <a:rPr lang="fi-FI" dirty="0" err="1"/>
-              <a:t>the</a:t>
-            </a:r>
-            <a:r>
-              <a:rPr lang="fi-FI" dirty="0"/>
-              <a:t> CORS </a:t>
-            </a:r>
-            <a:r>
-              <a:rPr lang="fi-FI" dirty="0" err="1"/>
-              <a:t>app</a:t>
-            </a:r>
-            <a:r>
-              <a:rPr lang="fi-FI" dirty="0"/>
-              <a:t> </a:t>
-            </a:r>
-            <a:r>
-              <a:rPr lang="fi-FI" dirty="0" err="1"/>
-              <a:t>developer</a:t>
-            </a:r>
-            <a:r>
-              <a:rPr lang="fi-FI" dirty="0"/>
-              <a:t> </a:t>
-            </a:r>
-            <a:r>
-              <a:rPr lang="fi-FI" dirty="0" err="1"/>
-              <a:t>can</a:t>
-            </a:r>
-            <a:r>
-              <a:rPr lang="fi-FI" dirty="0"/>
-              <a:t> </a:t>
-            </a:r>
-            <a:r>
-              <a:rPr lang="fi-FI" dirty="0" err="1"/>
-              <a:t>configure</a:t>
-            </a:r>
-            <a:r>
-              <a:rPr lang="fi-FI" dirty="0"/>
-              <a:t> </a:t>
-            </a:r>
-            <a:r>
-              <a:rPr lang="fi-FI" dirty="0" err="1"/>
-              <a:t>what</a:t>
-            </a:r>
-            <a:r>
-              <a:rPr lang="fi-FI" dirty="0"/>
-              <a:t> is </a:t>
-            </a:r>
-            <a:r>
-              <a:rPr lang="fi-FI" dirty="0" err="1"/>
-              <a:t>allowed</a:t>
-            </a:r>
-            <a:endParaRPr lang="fi-FI" dirty="0"/>
-          </a:p>
-          <a:p>
-            <a:r>
-              <a:rPr lang="fi-FI" dirty="0" err="1"/>
-              <a:t>E.g</a:t>
-            </a:r>
-            <a:r>
-              <a:rPr lang="fi-FI" dirty="0"/>
-              <a:t>. inside: index.js in </a:t>
-            </a:r>
-            <a:r>
-              <a:rPr lang="fi-FI" dirty="0" err="1"/>
-              <a:t>root</a:t>
-            </a:r>
-            <a:r>
-              <a:rPr lang="fi-FI" dirty="0"/>
-              <a:t> </a:t>
-            </a:r>
-            <a:r>
-              <a:rPr lang="fi-FI" dirty="0" err="1"/>
-              <a:t>folder</a:t>
-            </a:r>
-            <a:r>
-              <a:rPr lang="fi-FI" dirty="0"/>
-              <a:t> (</a:t>
-            </a:r>
-            <a:r>
-              <a:rPr lang="fi-FI" dirty="0" err="1"/>
-              <a:t>the</a:t>
-            </a:r>
-            <a:r>
-              <a:rPr lang="fi-FI" dirty="0"/>
-              <a:t> </a:t>
-            </a:r>
-            <a:r>
-              <a:rPr lang="fi-FI" dirty="0" err="1"/>
-              <a:t>starting</a:t>
-            </a:r>
-            <a:r>
-              <a:rPr lang="fi-FI" dirty="0"/>
-              <a:t> </a:t>
-            </a:r>
-            <a:r>
-              <a:rPr lang="fi-FI" dirty="0" err="1"/>
-              <a:t>point</a:t>
-            </a:r>
-            <a:r>
-              <a:rPr lang="fi-FI" dirty="0"/>
-              <a:t> of </a:t>
-            </a:r>
-            <a:r>
-              <a:rPr lang="fi-FI" dirty="0" err="1"/>
-              <a:t>the</a:t>
-            </a:r>
-            <a:r>
-              <a:rPr lang="fi-FI" dirty="0"/>
-              <a:t> </a:t>
-            </a:r>
-            <a:r>
-              <a:rPr lang="fi-FI" dirty="0" err="1"/>
-              <a:t>backend</a:t>
-            </a:r>
-            <a:r>
-              <a:rPr lang="fi-FI" dirty="0"/>
-              <a:t> </a:t>
-            </a:r>
-            <a:r>
-              <a:rPr lang="fi-FI" dirty="0" err="1"/>
-              <a:t>app</a:t>
-            </a:r>
-            <a:r>
-              <a:rPr lang="fi-FI" dirty="0"/>
-              <a:t>)</a:t>
-            </a:r>
-          </a:p>
-          <a:p>
-            <a:pPr lvl="1"/>
-            <a:r>
-              <a:rPr lang="fi-FI" dirty="0"/>
-              <a:t>import express </a:t>
-            </a:r>
-            <a:r>
-              <a:rPr lang="fi-FI" dirty="0" err="1"/>
-              <a:t>from</a:t>
-            </a:r>
-            <a:r>
-              <a:rPr lang="fi-FI" dirty="0"/>
-              <a:t> "express";</a:t>
-            </a:r>
-          </a:p>
-          <a:p>
-            <a:pPr lvl="1"/>
-            <a:r>
-              <a:rPr lang="fi-FI" dirty="0"/>
-              <a:t>import </a:t>
-            </a:r>
-            <a:r>
-              <a:rPr lang="fi-FI" dirty="0" err="1"/>
-              <a:t>cors</a:t>
-            </a:r>
-            <a:r>
-              <a:rPr lang="fi-FI" dirty="0"/>
-              <a:t> </a:t>
-            </a:r>
-            <a:r>
-              <a:rPr lang="fi-FI" dirty="0" err="1"/>
-              <a:t>from</a:t>
-            </a:r>
-            <a:r>
-              <a:rPr lang="fi-FI" dirty="0"/>
-              <a:t> "</a:t>
-            </a:r>
-            <a:r>
-              <a:rPr lang="fi-FI" dirty="0" err="1"/>
-              <a:t>cors</a:t>
-            </a:r>
-            <a:r>
-              <a:rPr lang="fi-FI" dirty="0"/>
-              <a:t>";</a:t>
-            </a:r>
-          </a:p>
-          <a:p>
-            <a:pPr lvl="1"/>
-            <a:endParaRPr lang="fi-FI" dirty="0"/>
-          </a:p>
-          <a:p>
-            <a:pPr lvl="1"/>
-            <a:r>
-              <a:rPr lang="fi-FI" dirty="0" err="1"/>
-              <a:t>const</a:t>
-            </a:r>
-            <a:r>
-              <a:rPr lang="fi-FI" dirty="0"/>
-              <a:t> </a:t>
-            </a:r>
-            <a:r>
-              <a:rPr lang="fi-FI" dirty="0" err="1"/>
-              <a:t>app</a:t>
-            </a:r>
-            <a:r>
-              <a:rPr lang="fi-FI" dirty="0"/>
-              <a:t> = express();</a:t>
-            </a:r>
-          </a:p>
-          <a:p>
-            <a:pPr lvl="1"/>
-            <a:r>
-              <a:rPr lang="en-US" dirty="0" err="1"/>
-              <a:t>app.use</a:t>
-            </a:r>
-            <a:r>
-              <a:rPr lang="en-US" dirty="0"/>
-              <a:t>(</a:t>
-            </a:r>
-            <a:r>
-              <a:rPr lang="en-US" dirty="0" err="1"/>
-              <a:t>cors</a:t>
-            </a:r>
-            <a:r>
-              <a:rPr lang="en-US" dirty="0"/>
-              <a:t>()); // Merely disabling the cross-origin resource sharing safety mechanism! Allowing all. Hazardous!</a:t>
-            </a:r>
-          </a:p>
-          <a:p>
-            <a:r>
-              <a:rPr lang="fi-FI" dirty="0"/>
-              <a:t>… </a:t>
-            </a:r>
-            <a:r>
-              <a:rPr lang="fi-FI" dirty="0" err="1"/>
-              <a:t>then</a:t>
-            </a:r>
-            <a:r>
-              <a:rPr lang="fi-FI" dirty="0"/>
-              <a:t> in </a:t>
-            </a:r>
-            <a:r>
-              <a:rPr lang="fi-FI" dirty="0" err="1"/>
-              <a:t>all</a:t>
-            </a:r>
-            <a:r>
-              <a:rPr lang="fi-FI" dirty="0"/>
-              <a:t> </a:t>
-            </a:r>
-            <a:r>
-              <a:rPr lang="fi-FI" dirty="0" err="1"/>
-              <a:t>the</a:t>
-            </a:r>
-            <a:r>
-              <a:rPr lang="fi-FI" dirty="0"/>
-              <a:t> </a:t>
-            </a:r>
-            <a:r>
-              <a:rPr lang="fi-FI" dirty="0" err="1"/>
-              <a:t>rest</a:t>
-            </a:r>
-            <a:r>
-              <a:rPr lang="fi-FI" dirty="0"/>
-              <a:t> </a:t>
-            </a:r>
-            <a:r>
-              <a:rPr lang="fi-FI" dirty="0" err="1"/>
-              <a:t>api</a:t>
-            </a:r>
-            <a:r>
-              <a:rPr lang="fi-FI" dirty="0"/>
-              <a:t> </a:t>
-            </a:r>
-            <a:r>
-              <a:rPr lang="fi-FI" dirty="0" err="1"/>
-              <a:t>endpoints</a:t>
-            </a:r>
-            <a:r>
-              <a:rPr lang="fi-FI" dirty="0"/>
-              <a:t>, </a:t>
-            </a:r>
-            <a:r>
-              <a:rPr lang="fi-FI" dirty="0" err="1"/>
-              <a:t>the</a:t>
-            </a:r>
-            <a:r>
-              <a:rPr lang="fi-FI" dirty="0"/>
-              <a:t> CORS </a:t>
-            </a:r>
-            <a:r>
-              <a:rPr lang="fi-FI" dirty="0" err="1"/>
-              <a:t>allows</a:t>
-            </a:r>
-            <a:r>
-              <a:rPr lang="fi-FI" dirty="0"/>
-              <a:t>, in </a:t>
-            </a:r>
-            <a:r>
-              <a:rPr lang="fi-FI" dirty="0" err="1"/>
-              <a:t>this</a:t>
-            </a:r>
-            <a:r>
-              <a:rPr lang="fi-FI" dirty="0"/>
-              <a:t> </a:t>
-            </a:r>
-            <a:r>
-              <a:rPr lang="fi-FI" dirty="0" err="1"/>
-              <a:t>example</a:t>
-            </a:r>
-            <a:r>
-              <a:rPr lang="fi-FI" dirty="0"/>
-              <a:t>, </a:t>
-            </a:r>
-            <a:r>
-              <a:rPr lang="fi-FI" dirty="0" err="1"/>
-              <a:t>any</a:t>
-            </a:r>
-            <a:r>
-              <a:rPr lang="fi-FI" dirty="0"/>
-              <a:t> cross-</a:t>
-            </a:r>
-            <a:r>
-              <a:rPr lang="fi-FI" dirty="0" err="1"/>
-              <a:t>origin</a:t>
-            </a:r>
-            <a:r>
-              <a:rPr lang="fi-FI" dirty="0"/>
-              <a:t> </a:t>
-            </a:r>
-            <a:r>
-              <a:rPr lang="fi-FI" dirty="0" err="1"/>
-              <a:t>sharing</a:t>
-            </a:r>
-            <a:endParaRPr lang="fi-FI" dirty="0"/>
-          </a:p>
-          <a:p>
-            <a:r>
-              <a:rPr lang="fi-FI" dirty="0"/>
-              <a:t>In </a:t>
-            </a:r>
-            <a:r>
-              <a:rPr lang="fi-FI" dirty="0" err="1"/>
-              <a:t>production</a:t>
-            </a:r>
-            <a:r>
-              <a:rPr lang="fi-FI" dirty="0"/>
-              <a:t> </a:t>
-            </a:r>
-            <a:r>
-              <a:rPr lang="fi-FI" dirty="0" err="1"/>
-              <a:t>we</a:t>
-            </a:r>
-            <a:r>
-              <a:rPr lang="fi-FI" dirty="0"/>
-              <a:t> </a:t>
-            </a:r>
-            <a:r>
-              <a:rPr lang="fi-FI" dirty="0" err="1"/>
-              <a:t>should</a:t>
-            </a:r>
-            <a:r>
-              <a:rPr lang="fi-FI" dirty="0"/>
-              <a:t> of </a:t>
-            </a:r>
-            <a:r>
-              <a:rPr lang="fi-FI" dirty="0" err="1"/>
-              <a:t>course</a:t>
-            </a:r>
-            <a:r>
-              <a:rPr lang="fi-FI" dirty="0"/>
-              <a:t> </a:t>
-            </a:r>
-            <a:r>
-              <a:rPr lang="fi-FI" dirty="0" err="1"/>
-              <a:t>use</a:t>
-            </a:r>
-            <a:r>
-              <a:rPr lang="fi-FI" dirty="0"/>
-              <a:t> </a:t>
-            </a:r>
-            <a:r>
-              <a:rPr lang="fi-FI" dirty="0" err="1"/>
-              <a:t>whitelists</a:t>
-            </a:r>
-            <a:r>
-              <a:rPr lang="fi-FI" dirty="0"/>
-              <a:t> of </a:t>
-            </a:r>
-            <a:r>
-              <a:rPr lang="fi-FI" dirty="0" err="1"/>
-              <a:t>allowed</a:t>
-            </a:r>
-            <a:r>
-              <a:rPr lang="fi-FI" dirty="0"/>
-              <a:t> </a:t>
-            </a:r>
-            <a:r>
-              <a:rPr lang="fi-FI" dirty="0" err="1"/>
-              <a:t>connections</a:t>
-            </a:r>
-            <a:r>
-              <a:rPr lang="fi-FI" dirty="0"/>
-              <a:t> </a:t>
-            </a:r>
-            <a:r>
-              <a:rPr lang="fi-FI" dirty="0" err="1"/>
-              <a:t>between</a:t>
-            </a:r>
-            <a:r>
-              <a:rPr lang="fi-FI" dirty="0"/>
-              <a:t> </a:t>
-            </a:r>
-            <a:r>
-              <a:rPr lang="fi-FI" dirty="0" err="1"/>
-              <a:t>servers</a:t>
-            </a:r>
-            <a:r>
-              <a:rPr lang="fi-FI" dirty="0"/>
-              <a:t>, and </a:t>
-            </a:r>
-            <a:r>
-              <a:rPr lang="fi-FI" dirty="0" err="1"/>
-              <a:t>configure</a:t>
-            </a:r>
-            <a:r>
-              <a:rPr lang="fi-FI" dirty="0"/>
-              <a:t> CORS to </a:t>
-            </a:r>
-            <a:r>
-              <a:rPr lang="fi-FI" dirty="0" err="1"/>
-              <a:t>allow</a:t>
-            </a:r>
-            <a:r>
-              <a:rPr lang="fi-FI" dirty="0"/>
-              <a:t> </a:t>
-            </a:r>
-            <a:r>
-              <a:rPr lang="fi-FI" dirty="0" err="1"/>
-              <a:t>only</a:t>
-            </a:r>
-            <a:r>
-              <a:rPr lang="fi-FI" dirty="0"/>
-              <a:t> </a:t>
-            </a:r>
-            <a:r>
-              <a:rPr lang="fi-FI" dirty="0" err="1"/>
-              <a:t>them</a:t>
-            </a:r>
-            <a:r>
-              <a:rPr lang="fi-FI" dirty="0"/>
-              <a:t>.</a:t>
-            </a:r>
-          </a:p>
-        </p:txBody>
-      </p:sp>
-      <p:sp>
-        <p:nvSpPr>
-          <p:cNvPr id="5" name="Date Placeholder 4">
-            <a:extLst>
-              <a:ext uri="{FF2B5EF4-FFF2-40B4-BE49-F238E27FC236}">
-                <a16:creationId xmlns:a16="http://schemas.microsoft.com/office/drawing/2014/main" id="{976244E2-AA76-2742-B2EC-FEC79276155C}"/>
-              </a:ext>
-            </a:extLst>
-          </p:cNvPr>
-          <p:cNvSpPr>
-            <a:spLocks noGrp="1"/>
-          </p:cNvSpPr>
-          <p:nvPr>
-            <p:ph type="dt" sz="half" idx="10"/>
-          </p:nvPr>
-        </p:nvSpPr>
-        <p:spPr/>
-        <p:txBody>
-          <a:bodyPr/>
-          <a:lstStyle/>
-          <a:p>
-            <a:fld id="{202E1EC2-47B8-044B-A09E-6A63B4D80C87}" type="datetime1">
-              <a:rPr lang="fi-FI" smtClean="0"/>
-              <a:t>9.2.2023</a:t>
-            </a:fld>
-            <a:endParaRPr lang="en-GB"/>
-          </a:p>
-        </p:txBody>
-      </p:sp>
-      <p:sp>
-        <p:nvSpPr>
-          <p:cNvPr id="6" name="Footer Placeholder 5">
-            <a:extLst>
-              <a:ext uri="{FF2B5EF4-FFF2-40B4-BE49-F238E27FC236}">
-                <a16:creationId xmlns:a16="http://schemas.microsoft.com/office/drawing/2014/main" id="{588CE607-4137-8840-8FEA-42EAC857E3A3}"/>
-              </a:ext>
-            </a:extLst>
-          </p:cNvPr>
-          <p:cNvSpPr>
-            <a:spLocks noGrp="1"/>
-          </p:cNvSpPr>
-          <p:nvPr>
-            <p:ph type="ftr" sz="quarter" idx="11"/>
-          </p:nvPr>
-        </p:nvSpPr>
-        <p:spPr/>
-        <p:txBody>
-          <a:bodyPr/>
-          <a:lstStyle/>
-          <a:p>
-            <a:endParaRPr lang="en-GB"/>
-          </a:p>
-        </p:txBody>
-      </p:sp>
-      <p:sp>
-        <p:nvSpPr>
-          <p:cNvPr id="7" name="Slide Number Placeholder 6">
-            <a:extLst>
-              <a:ext uri="{FF2B5EF4-FFF2-40B4-BE49-F238E27FC236}">
-                <a16:creationId xmlns:a16="http://schemas.microsoft.com/office/drawing/2014/main" id="{2E133A96-6C73-0844-B8CB-27C2B5F4CFB1}"/>
-              </a:ext>
-            </a:extLst>
-          </p:cNvPr>
-          <p:cNvSpPr>
-            <a:spLocks noGrp="1"/>
-          </p:cNvSpPr>
-          <p:nvPr>
-            <p:ph type="sldNum" sz="quarter" idx="12"/>
-          </p:nvPr>
-        </p:nvSpPr>
-        <p:spPr/>
-        <p:txBody>
-          <a:bodyPr/>
-          <a:lstStyle/>
-          <a:p>
-            <a:fld id="{76BAB7ED-EDE9-4D4B-9A2D-30E18C47C16E}" type="slidenum">
-              <a:rPr lang="en-GB" smtClean="0"/>
-              <a:t>11</a:t>
-            </a:fld>
-            <a:endParaRPr lang="en-GB"/>
-          </a:p>
-        </p:txBody>
-      </p:sp>
-    </p:spTree>
-    <p:extLst>
-      <p:ext uri="{BB962C8B-B14F-4D97-AF65-F5344CB8AC3E}">
-        <p14:creationId xmlns:p14="http://schemas.microsoft.com/office/powerpoint/2010/main" val="2126271972"/>
-      </p:ext>
-    </p:extLst>
-  </p:cSld>
-  <p:clrMapOvr>
-    <a:masterClrMapping/>
-  </p:clrMapOvr>
-</p:sld>
-</file>
-
-<file path=ppt/slides/slide12.xml><?xml version="1.0" encoding="utf-8"?>
-<p:sld xmlns:a="http://schemas.openxmlformats.org/drawingml/2006/main" xmlns:r="http://schemas.openxmlformats.org/officeDocument/2006/relationships" xmlns:p="http://schemas.openxmlformats.org/presentationml/2006/main">
-  <p:cSld>
-    <p:spTree>
-      <p:nvGrpSpPr>
-        <p:cNvPr id="1" name=""/>
-        <p:cNvGrpSpPr/>
-        <p:nvPr/>
-      </p:nvGrpSpPr>
-      <p:grpSpPr>
-        <a:xfrm>
-          <a:off x="0" y="0"/>
-          <a:ext cx="0" cy="0"/>
-          <a:chOff x="0" y="0"/>
-          <a:chExt cx="0" cy="0"/>
-        </a:xfrm>
-      </p:grpSpPr>
-      <p:sp>
-        <p:nvSpPr>
-          <p:cNvPr id="8" name="Title 7">
-            <a:extLst>
-              <a:ext uri="{FF2B5EF4-FFF2-40B4-BE49-F238E27FC236}">
-                <a16:creationId xmlns:a16="http://schemas.microsoft.com/office/drawing/2014/main" id="{197044C3-CD23-D844-B780-26FABA91AD0F}"/>
-              </a:ext>
-            </a:extLst>
-          </p:cNvPr>
-          <p:cNvSpPr>
-            <a:spLocks noGrp="1"/>
-          </p:cNvSpPr>
-          <p:nvPr>
-            <p:ph type="title"/>
-          </p:nvPr>
-        </p:nvSpPr>
-        <p:spPr>
-          <a:xfrm>
-            <a:off x="550863" y="549276"/>
-            <a:ext cx="11125200" cy="610054"/>
-          </a:xfrm>
-        </p:spPr>
-        <p:txBody>
-          <a:bodyPr/>
-          <a:lstStyle/>
-          <a:p>
-            <a:r>
-              <a:rPr lang="fi-FI" u="sng" dirty="0"/>
-              <a:t>More</a:t>
-            </a:r>
-            <a:r>
-              <a:rPr lang="fi-FI" dirty="0"/>
-              <a:t> </a:t>
-            </a:r>
-            <a:r>
-              <a:rPr lang="fi-FI" dirty="0" err="1"/>
-              <a:t>could</a:t>
-            </a:r>
-            <a:r>
-              <a:rPr lang="fi-FI" dirty="0"/>
-              <a:t> </a:t>
-            </a:r>
-            <a:r>
-              <a:rPr lang="fi-FI" dirty="0" err="1"/>
-              <a:t>be</a:t>
-            </a:r>
-            <a:r>
-              <a:rPr lang="fi-FI" dirty="0"/>
-              <a:t> </a:t>
-            </a:r>
-            <a:r>
-              <a:rPr lang="fi-FI" dirty="0" err="1"/>
-              <a:t>added</a:t>
-            </a:r>
-            <a:r>
-              <a:rPr lang="fi-FI" dirty="0"/>
-              <a:t> </a:t>
-            </a:r>
-            <a:r>
-              <a:rPr lang="fi-FI" dirty="0" err="1"/>
-              <a:t>with</a:t>
-            </a:r>
-            <a:r>
-              <a:rPr lang="fi-FI" dirty="0"/>
-              <a:t> Express + </a:t>
-            </a:r>
-            <a:r>
-              <a:rPr lang="fi-FI" dirty="0" err="1"/>
-              <a:t>Middleware</a:t>
-            </a:r>
-            <a:endParaRPr lang="fi-FI" dirty="0"/>
-          </a:p>
-        </p:txBody>
-      </p:sp>
-      <p:sp>
-        <p:nvSpPr>
-          <p:cNvPr id="9" name="Content Placeholder 8">
-            <a:extLst>
-              <a:ext uri="{FF2B5EF4-FFF2-40B4-BE49-F238E27FC236}">
-                <a16:creationId xmlns:a16="http://schemas.microsoft.com/office/drawing/2014/main" id="{ACDE61D8-A75A-F94B-B57A-46F276C03311}"/>
-              </a:ext>
-            </a:extLst>
-          </p:cNvPr>
-          <p:cNvSpPr>
-            <a:spLocks noGrp="1"/>
-          </p:cNvSpPr>
-          <p:nvPr>
-            <p:ph sz="half" idx="2"/>
-          </p:nvPr>
-        </p:nvSpPr>
-        <p:spPr>
-          <a:xfrm>
-            <a:off x="550864" y="1159329"/>
-            <a:ext cx="11336336" cy="4996542"/>
-          </a:xfrm>
-        </p:spPr>
-        <p:txBody>
-          <a:bodyPr>
-            <a:noAutofit/>
-          </a:bodyPr>
-          <a:lstStyle/>
-          <a:p>
-            <a:r>
-              <a:rPr lang="fi-FI" b="1" dirty="0" err="1"/>
-              <a:t>Schema-based</a:t>
-            </a:r>
-            <a:r>
-              <a:rPr lang="fi-FI" b="1" dirty="0"/>
-              <a:t> </a:t>
-            </a:r>
-            <a:r>
-              <a:rPr lang="fi-FI" b="1" dirty="0" err="1"/>
-              <a:t>validation</a:t>
-            </a:r>
-            <a:r>
-              <a:rPr lang="fi-FI" dirty="0"/>
-              <a:t> of input data </a:t>
-            </a:r>
-            <a:r>
-              <a:rPr lang="fi-FI" dirty="0" err="1"/>
-              <a:t>objects</a:t>
-            </a:r>
-            <a:r>
-              <a:rPr lang="fi-FI" dirty="0"/>
-              <a:t>. </a:t>
-            </a:r>
-            <a:r>
-              <a:rPr lang="fi-FI" dirty="0" err="1"/>
-              <a:t>E.g</a:t>
-            </a:r>
-            <a:r>
-              <a:rPr lang="fi-FI" dirty="0"/>
-              <a:t>. Joi</a:t>
-            </a:r>
-          </a:p>
-          <a:p>
-            <a:r>
-              <a:rPr lang="fi-FI" b="1" dirty="0" err="1"/>
-              <a:t>Centralized</a:t>
-            </a:r>
-            <a:r>
-              <a:rPr lang="fi-FI" dirty="0"/>
-              <a:t> and ”</a:t>
-            </a:r>
-            <a:r>
-              <a:rPr lang="fi-FI" dirty="0" err="1"/>
-              <a:t>automatic</a:t>
-            </a:r>
-            <a:r>
-              <a:rPr lang="fi-FI" dirty="0"/>
-              <a:t>” </a:t>
-            </a:r>
-            <a:r>
-              <a:rPr lang="fi-FI" b="1" dirty="0" err="1"/>
-              <a:t>error-handling</a:t>
-            </a:r>
-            <a:r>
-              <a:rPr lang="fi-FI" dirty="0"/>
-              <a:t> / </a:t>
-            </a:r>
-            <a:r>
-              <a:rPr lang="fi-FI" dirty="0" err="1"/>
-              <a:t>exception</a:t>
-            </a:r>
-            <a:r>
-              <a:rPr lang="fi-FI" dirty="0"/>
-              <a:t> </a:t>
-            </a:r>
-            <a:r>
-              <a:rPr lang="fi-FI" dirty="0" err="1"/>
-              <a:t>handling</a:t>
-            </a:r>
-            <a:r>
-              <a:rPr lang="fi-FI" dirty="0"/>
-              <a:t>. </a:t>
-            </a:r>
-            <a:r>
-              <a:rPr lang="fi-FI" dirty="0" err="1"/>
-              <a:t>Directing</a:t>
-            </a:r>
-            <a:r>
-              <a:rPr lang="fi-FI" dirty="0"/>
-              <a:t> Express </a:t>
-            </a:r>
-            <a:r>
-              <a:rPr lang="fi-FI" dirty="0" err="1"/>
-              <a:t>errors</a:t>
-            </a:r>
-            <a:r>
-              <a:rPr lang="fi-FI" dirty="0"/>
-              <a:t> </a:t>
-            </a:r>
-            <a:r>
-              <a:rPr lang="fi-FI" dirty="0" err="1"/>
-              <a:t>automatically</a:t>
-            </a:r>
-            <a:r>
-              <a:rPr lang="fi-FI" dirty="0"/>
-              <a:t> to </a:t>
-            </a:r>
-            <a:r>
-              <a:rPr lang="fi-FI" dirty="0" err="1"/>
-              <a:t>log</a:t>
-            </a:r>
-            <a:r>
-              <a:rPr lang="fi-FI" dirty="0"/>
-              <a:t>, </a:t>
-            </a:r>
-            <a:r>
-              <a:rPr lang="fi-FI" dirty="0" err="1"/>
-              <a:t>cutting</a:t>
-            </a:r>
-            <a:r>
-              <a:rPr lang="fi-FI" dirty="0"/>
-              <a:t> </a:t>
-            </a:r>
-            <a:r>
-              <a:rPr lang="fi-FI" dirty="0" err="1"/>
-              <a:t>the</a:t>
-            </a:r>
-            <a:r>
-              <a:rPr lang="fi-FI" dirty="0"/>
-              <a:t> </a:t>
-            </a:r>
-            <a:r>
-              <a:rPr lang="fi-FI" dirty="0" err="1"/>
-              <a:t>handling</a:t>
-            </a:r>
-            <a:r>
-              <a:rPr lang="fi-FI" dirty="0"/>
-              <a:t> of </a:t>
-            </a:r>
-            <a:r>
-              <a:rPr lang="fi-FI" dirty="0" err="1"/>
-              <a:t>that</a:t>
-            </a:r>
-            <a:r>
-              <a:rPr lang="fi-FI" dirty="0"/>
-              <a:t> </a:t>
-            </a:r>
-            <a:r>
-              <a:rPr lang="fi-FI" dirty="0" err="1"/>
-              <a:t>request</a:t>
-            </a:r>
-            <a:r>
-              <a:rPr lang="fi-FI" dirty="0"/>
-              <a:t> </a:t>
-            </a:r>
-            <a:r>
-              <a:rPr lang="fi-FI" dirty="0" err="1"/>
-              <a:t>automatically</a:t>
-            </a:r>
-            <a:endParaRPr lang="fi-FI" dirty="0"/>
-          </a:p>
-          <a:p>
-            <a:r>
-              <a:rPr lang="fi-FI" b="1" dirty="0" err="1"/>
-              <a:t>Authentication</a:t>
-            </a:r>
-            <a:r>
-              <a:rPr lang="fi-FI" b="1" dirty="0"/>
-              <a:t> and </a:t>
-            </a:r>
-            <a:r>
-              <a:rPr lang="fi-FI" b="1" dirty="0" err="1"/>
-              <a:t>authorization</a:t>
-            </a:r>
-            <a:r>
-              <a:rPr lang="fi-FI" dirty="0"/>
-              <a:t>. Using some </a:t>
-            </a:r>
-            <a:r>
-              <a:rPr lang="fi-FI" dirty="0" err="1"/>
-              <a:t>token</a:t>
-            </a:r>
-            <a:r>
-              <a:rPr lang="fi-FI" dirty="0"/>
-              <a:t> </a:t>
-            </a:r>
-            <a:r>
-              <a:rPr lang="fi-FI" dirty="0" err="1"/>
-              <a:t>based</a:t>
-            </a:r>
-            <a:r>
-              <a:rPr lang="fi-FI" dirty="0"/>
-              <a:t> </a:t>
-            </a:r>
-            <a:r>
-              <a:rPr lang="fi-FI" dirty="0" err="1"/>
-              <a:t>authorization</a:t>
-            </a:r>
-            <a:r>
-              <a:rPr lang="fi-FI" dirty="0"/>
-              <a:t> </a:t>
-            </a:r>
-            <a:r>
-              <a:rPr lang="fi-FI" dirty="0" err="1"/>
-              <a:t>framework</a:t>
-            </a:r>
-            <a:r>
-              <a:rPr lang="fi-FI" dirty="0"/>
-              <a:t>, </a:t>
-            </a:r>
-            <a:r>
-              <a:rPr lang="fi-FI" dirty="0" err="1"/>
-              <a:t>mostly</a:t>
-            </a:r>
-            <a:r>
-              <a:rPr lang="fi-FI" dirty="0"/>
-              <a:t> </a:t>
-            </a:r>
-            <a:r>
-              <a:rPr lang="fi-FI" dirty="0" err="1"/>
-              <a:t>OAuth-based</a:t>
-            </a:r>
-            <a:r>
-              <a:rPr lang="fi-FI" dirty="0"/>
-              <a:t>.</a:t>
-            </a:r>
-          </a:p>
-          <a:p>
-            <a:r>
-              <a:rPr lang="fi-FI" b="1" dirty="0" err="1"/>
-              <a:t>Role-based</a:t>
-            </a:r>
-            <a:r>
-              <a:rPr lang="fi-FI" b="1" dirty="0"/>
-              <a:t> </a:t>
-            </a:r>
-            <a:r>
-              <a:rPr lang="fi-FI" b="1" dirty="0" err="1"/>
-              <a:t>method-level</a:t>
-            </a:r>
-            <a:r>
-              <a:rPr lang="fi-FI" b="1" dirty="0"/>
-              <a:t> </a:t>
-            </a:r>
-            <a:r>
-              <a:rPr lang="fi-FI" b="1" dirty="0" err="1"/>
-              <a:t>authorization</a:t>
-            </a:r>
-            <a:r>
-              <a:rPr lang="fi-FI" dirty="0"/>
-              <a:t>. (</a:t>
-            </a:r>
-            <a:r>
-              <a:rPr lang="fi-FI" dirty="0" err="1"/>
-              <a:t>You</a:t>
-            </a:r>
-            <a:r>
-              <a:rPr lang="fi-FI" dirty="0"/>
-              <a:t> </a:t>
-            </a:r>
-            <a:r>
-              <a:rPr lang="fi-FI" dirty="0" err="1"/>
-              <a:t>can</a:t>
-            </a:r>
-            <a:r>
-              <a:rPr lang="fi-FI" dirty="0"/>
-              <a:t> </a:t>
-            </a:r>
-            <a:r>
-              <a:rPr lang="fi-FI" dirty="0" err="1"/>
-              <a:t>run</a:t>
-            </a:r>
-            <a:r>
-              <a:rPr lang="fi-FI" dirty="0"/>
-              <a:t> </a:t>
-            </a:r>
-            <a:r>
-              <a:rPr lang="fi-FI" dirty="0" err="1"/>
-              <a:t>this</a:t>
-            </a:r>
-            <a:r>
-              <a:rPr lang="fi-FI" dirty="0"/>
-              <a:t> </a:t>
-            </a:r>
-            <a:r>
-              <a:rPr lang="fi-FI" dirty="0" err="1"/>
-              <a:t>following</a:t>
-            </a:r>
-            <a:r>
-              <a:rPr lang="fi-FI" dirty="0"/>
-              <a:t> </a:t>
-            </a:r>
-            <a:r>
-              <a:rPr lang="fi-FI" dirty="0" err="1"/>
-              <a:t>method</a:t>
-            </a:r>
-            <a:r>
-              <a:rPr lang="fi-FI" dirty="0"/>
-              <a:t>/</a:t>
-            </a:r>
-            <a:r>
-              <a:rPr lang="fi-FI" dirty="0" err="1"/>
-              <a:t>endpoint</a:t>
-            </a:r>
-            <a:r>
-              <a:rPr lang="fi-FI" dirty="0"/>
-              <a:t> </a:t>
-            </a:r>
-            <a:r>
-              <a:rPr lang="fi-FI" dirty="0" err="1"/>
-              <a:t>only</a:t>
-            </a:r>
-            <a:r>
-              <a:rPr lang="fi-FI" dirty="0"/>
-              <a:t> </a:t>
-            </a:r>
-            <a:r>
-              <a:rPr lang="fi-FI" dirty="0" err="1"/>
-              <a:t>if</a:t>
-            </a:r>
-            <a:r>
-              <a:rPr lang="fi-FI" dirty="0"/>
-              <a:t> </a:t>
-            </a:r>
-            <a:r>
-              <a:rPr lang="fi-FI" dirty="0" err="1"/>
-              <a:t>your</a:t>
-            </a:r>
-            <a:r>
-              <a:rPr lang="fi-FI" dirty="0"/>
-              <a:t> </a:t>
-            </a:r>
-            <a:r>
-              <a:rPr lang="fi-FI" dirty="0" err="1"/>
-              <a:t>user</a:t>
-            </a:r>
-            <a:r>
-              <a:rPr lang="fi-FI" dirty="0"/>
-              <a:t> </a:t>
-            </a:r>
-            <a:r>
-              <a:rPr lang="fi-FI" dirty="0" err="1"/>
-              <a:t>account</a:t>
-            </a:r>
-            <a:r>
-              <a:rPr lang="fi-FI" dirty="0"/>
-              <a:t> </a:t>
-            </a:r>
-            <a:r>
-              <a:rPr lang="fi-FI" dirty="0" err="1"/>
-              <a:t>has</a:t>
-            </a:r>
-            <a:r>
-              <a:rPr lang="fi-FI" dirty="0"/>
-              <a:t> </a:t>
-            </a:r>
-            <a:r>
-              <a:rPr lang="fi-FI" dirty="0" err="1"/>
-              <a:t>the</a:t>
-            </a:r>
-            <a:r>
-              <a:rPr lang="fi-FI" dirty="0"/>
-              <a:t> </a:t>
-            </a:r>
-            <a:r>
-              <a:rPr lang="fi-FI" dirty="0" err="1"/>
-              <a:t>role</a:t>
-            </a:r>
-            <a:r>
-              <a:rPr lang="fi-FI" dirty="0"/>
-              <a:t> </a:t>
-            </a:r>
-            <a:r>
-              <a:rPr lang="fi-FI" dirty="0" err="1"/>
-              <a:t>annotated</a:t>
-            </a:r>
-            <a:r>
-              <a:rPr lang="fi-FI" dirty="0"/>
-              <a:t> </a:t>
-            </a:r>
-            <a:r>
-              <a:rPr lang="fi-FI" dirty="0" err="1"/>
-              <a:t>before</a:t>
-            </a:r>
-            <a:r>
-              <a:rPr lang="fi-FI" dirty="0"/>
-              <a:t> </a:t>
-            </a:r>
-            <a:r>
-              <a:rPr lang="fi-FI" dirty="0" err="1"/>
-              <a:t>this</a:t>
-            </a:r>
-            <a:r>
-              <a:rPr lang="fi-FI" dirty="0"/>
-              <a:t> </a:t>
-            </a:r>
-            <a:r>
-              <a:rPr lang="fi-FI" dirty="0" err="1"/>
-              <a:t>method</a:t>
-            </a:r>
-            <a:r>
-              <a:rPr lang="fi-FI" dirty="0"/>
-              <a:t>)</a:t>
-            </a:r>
-            <a:endParaRPr lang="fi-FI" b="1" dirty="0"/>
-          </a:p>
-          <a:p>
-            <a:r>
-              <a:rPr lang="fi-FI" dirty="0" err="1"/>
-              <a:t>Enabling</a:t>
-            </a:r>
-            <a:r>
-              <a:rPr lang="fi-FI" dirty="0"/>
-              <a:t>/</a:t>
-            </a:r>
-            <a:r>
-              <a:rPr lang="fi-FI" dirty="0" err="1"/>
-              <a:t>disabling</a:t>
-            </a:r>
-            <a:r>
-              <a:rPr lang="fi-FI" dirty="0"/>
-              <a:t>, </a:t>
-            </a:r>
-            <a:r>
-              <a:rPr lang="fi-FI" dirty="0" err="1"/>
-              <a:t>changing</a:t>
-            </a:r>
-            <a:r>
-              <a:rPr lang="fi-FI" dirty="0"/>
-              <a:t> </a:t>
-            </a:r>
-            <a:r>
-              <a:rPr lang="fi-FI" dirty="0" err="1"/>
-              <a:t>things</a:t>
-            </a:r>
-            <a:r>
-              <a:rPr lang="fi-FI" dirty="0"/>
-              <a:t> </a:t>
-            </a:r>
-            <a:r>
-              <a:rPr lang="fi-FI" dirty="0" err="1"/>
-              <a:t>between</a:t>
-            </a:r>
-            <a:r>
-              <a:rPr lang="fi-FI" dirty="0"/>
-              <a:t> </a:t>
-            </a:r>
-            <a:r>
-              <a:rPr lang="fi-FI" b="1" dirty="0" err="1"/>
-              <a:t>development</a:t>
-            </a:r>
-            <a:r>
-              <a:rPr lang="fi-FI" b="1" dirty="0"/>
-              <a:t> and </a:t>
-            </a:r>
-            <a:r>
-              <a:rPr lang="fi-FI" b="1" dirty="0" err="1"/>
-              <a:t>production</a:t>
-            </a:r>
-            <a:r>
-              <a:rPr lang="fi-FI" b="1" dirty="0"/>
-              <a:t> </a:t>
-            </a:r>
-            <a:r>
-              <a:rPr lang="fi-FI" b="1" dirty="0" err="1"/>
-              <a:t>enviroments</a:t>
-            </a:r>
-            <a:r>
-              <a:rPr lang="fi-FI" dirty="0"/>
-              <a:t>. </a:t>
-            </a:r>
-            <a:r>
-              <a:rPr lang="fi-FI" dirty="0" err="1"/>
-              <a:t>E.g</a:t>
-            </a:r>
-            <a:r>
-              <a:rPr lang="fi-FI" dirty="0"/>
-              <a:t>. </a:t>
-            </a:r>
-            <a:r>
-              <a:rPr lang="fi-FI" dirty="0" err="1"/>
-              <a:t>logging</a:t>
-            </a:r>
-            <a:r>
-              <a:rPr lang="fi-FI" dirty="0"/>
-              <a:t>, </a:t>
-            </a:r>
-            <a:r>
-              <a:rPr lang="fi-FI" dirty="0" err="1"/>
-              <a:t>debug</a:t>
-            </a:r>
-            <a:r>
-              <a:rPr lang="fi-FI" dirty="0"/>
-              <a:t> </a:t>
-            </a:r>
-            <a:r>
-              <a:rPr lang="fi-FI" dirty="0" err="1"/>
-              <a:t>information</a:t>
-            </a:r>
-            <a:r>
-              <a:rPr lang="fi-FI" dirty="0"/>
-              <a:t>. </a:t>
-            </a:r>
-            <a:r>
-              <a:rPr lang="fi-FI" dirty="0" err="1"/>
-              <a:t>Settings</a:t>
-            </a:r>
-            <a:r>
-              <a:rPr lang="fi-FI" dirty="0"/>
-              <a:t>. </a:t>
-            </a:r>
-            <a:r>
-              <a:rPr lang="fi-FI" dirty="0" err="1"/>
-              <a:t>Test</a:t>
-            </a:r>
-            <a:r>
-              <a:rPr lang="fi-FI" dirty="0"/>
-              <a:t> data.</a:t>
-            </a:r>
-          </a:p>
-          <a:p>
-            <a:r>
-              <a:rPr lang="fi-FI" b="1" dirty="0" err="1"/>
-              <a:t>Testing</a:t>
-            </a:r>
-            <a:r>
-              <a:rPr lang="fi-FI" dirty="0"/>
-              <a:t> </a:t>
-            </a:r>
-          </a:p>
-          <a:p>
-            <a:endParaRPr lang="fi-FI" dirty="0"/>
-          </a:p>
-          <a:p>
-            <a:endParaRPr lang="fi-FI" dirty="0"/>
-          </a:p>
-          <a:p>
-            <a:endParaRPr lang="fi-FI" dirty="0"/>
-          </a:p>
-          <a:p>
-            <a:endParaRPr lang="fi-FI" dirty="0"/>
-          </a:p>
-        </p:txBody>
-      </p:sp>
-      <p:sp>
-        <p:nvSpPr>
-          <p:cNvPr id="5" name="Date Placeholder 4">
-            <a:extLst>
-              <a:ext uri="{FF2B5EF4-FFF2-40B4-BE49-F238E27FC236}">
-                <a16:creationId xmlns:a16="http://schemas.microsoft.com/office/drawing/2014/main" id="{976244E2-AA76-2742-B2EC-FEC79276155C}"/>
-              </a:ext>
-            </a:extLst>
-          </p:cNvPr>
-          <p:cNvSpPr>
-            <a:spLocks noGrp="1"/>
-          </p:cNvSpPr>
-          <p:nvPr>
-            <p:ph type="dt" sz="half" idx="10"/>
-          </p:nvPr>
-        </p:nvSpPr>
-        <p:spPr/>
-        <p:txBody>
-          <a:bodyPr/>
-          <a:lstStyle/>
-          <a:p>
-            <a:fld id="{202E1EC2-47B8-044B-A09E-6A63B4D80C87}" type="datetime1">
-              <a:rPr lang="fi-FI" smtClean="0"/>
-              <a:t>9.2.2023</a:t>
-            </a:fld>
-            <a:endParaRPr lang="en-GB"/>
-          </a:p>
-        </p:txBody>
-      </p:sp>
-      <p:sp>
-        <p:nvSpPr>
-          <p:cNvPr id="6" name="Footer Placeholder 5">
-            <a:extLst>
-              <a:ext uri="{FF2B5EF4-FFF2-40B4-BE49-F238E27FC236}">
-                <a16:creationId xmlns:a16="http://schemas.microsoft.com/office/drawing/2014/main" id="{588CE607-4137-8840-8FEA-42EAC857E3A3}"/>
-              </a:ext>
-            </a:extLst>
-          </p:cNvPr>
-          <p:cNvSpPr>
-            <a:spLocks noGrp="1"/>
-          </p:cNvSpPr>
-          <p:nvPr>
-            <p:ph type="ftr" sz="quarter" idx="11"/>
-          </p:nvPr>
-        </p:nvSpPr>
-        <p:spPr/>
-        <p:txBody>
-          <a:bodyPr/>
-          <a:lstStyle/>
-          <a:p>
-            <a:endParaRPr lang="en-GB"/>
-          </a:p>
-        </p:txBody>
-      </p:sp>
-      <p:sp>
-        <p:nvSpPr>
-          <p:cNvPr id="7" name="Slide Number Placeholder 6">
-            <a:extLst>
-              <a:ext uri="{FF2B5EF4-FFF2-40B4-BE49-F238E27FC236}">
-                <a16:creationId xmlns:a16="http://schemas.microsoft.com/office/drawing/2014/main" id="{2E133A96-6C73-0844-B8CB-27C2B5F4CFB1}"/>
-              </a:ext>
-            </a:extLst>
-          </p:cNvPr>
-          <p:cNvSpPr>
-            <a:spLocks noGrp="1"/>
-          </p:cNvSpPr>
-          <p:nvPr>
-            <p:ph type="sldNum" sz="quarter" idx="12"/>
-          </p:nvPr>
-        </p:nvSpPr>
-        <p:spPr/>
-        <p:txBody>
-          <a:bodyPr/>
-          <a:lstStyle/>
-          <a:p>
-            <a:fld id="{76BAB7ED-EDE9-4D4B-9A2D-30E18C47C16E}" type="slidenum">
-              <a:rPr lang="en-GB" smtClean="0"/>
-              <a:t>12</a:t>
-            </a:fld>
-            <a:endParaRPr lang="en-GB"/>
-          </a:p>
-        </p:txBody>
-      </p:sp>
-    </p:spTree>
-    <p:extLst>
-      <p:ext uri="{BB962C8B-B14F-4D97-AF65-F5344CB8AC3E}">
-        <p14:creationId xmlns:p14="http://schemas.microsoft.com/office/powerpoint/2010/main" val="2488153930"/>
       </p:ext>
     </p:extLst>
   </p:cSld>
@@ -10035,7 +7507,7 @@
           <a:p>
             <a:fld id="{202E1EC2-47B8-044B-A09E-6A63B4D80C87}" type="datetime1">
               <a:rPr lang="fi-FI" smtClean="0"/>
-              <a:t>9.2.2023</a:t>
+              <a:t>10.2.2023</a:t>
             </a:fld>
             <a:endParaRPr lang="en-GB"/>
           </a:p>
@@ -10315,7 +7787,7 @@
           <a:p>
             <a:fld id="{202E1EC2-47B8-044B-A09E-6A63B4D80C87}" type="datetime1">
               <a:rPr lang="fi-FI" smtClean="0"/>
-              <a:t>9.2.2023</a:t>
+              <a:t>10.2.2023</a:t>
             </a:fld>
             <a:endParaRPr lang="en-GB"/>
           </a:p>
@@ -11118,7 +8590,7 @@
           <a:p>
             <a:fld id="{202E1EC2-47B8-044B-A09E-6A63B4D80C87}" type="datetime1">
               <a:rPr lang="fi-FI" smtClean="0"/>
-              <a:t>9.2.2023</a:t>
+              <a:t>10.2.2023</a:t>
             </a:fld>
             <a:endParaRPr lang="en-GB"/>
           </a:p>
@@ -11575,7 +9047,7 @@
           <a:p>
             <a:fld id="{202E1EC2-47B8-044B-A09E-6A63B4D80C87}" type="datetime1">
               <a:rPr lang="fi-FI" smtClean="0"/>
-              <a:t>9.2.2023</a:t>
+              <a:t>10.2.2023</a:t>
             </a:fld>
             <a:endParaRPr lang="en-GB"/>
           </a:p>
@@ -12337,7 +9809,7 @@
           <a:p>
             <a:fld id="{202E1EC2-47B8-044B-A09E-6A63B4D80C87}" type="datetime1">
               <a:rPr lang="fi-FI" smtClean="0"/>
-              <a:t>9.2.2023</a:t>
+              <a:t>10.2.2023</a:t>
             </a:fld>
             <a:endParaRPr lang="en-GB"/>
           </a:p>
@@ -15498,7 +12970,7 @@
           <a:p>
             <a:fld id="{202E1EC2-47B8-044B-A09E-6A63B4D80C87}" type="datetime1">
               <a:rPr lang="fi-FI" smtClean="0"/>
-              <a:t>9.2.2023</a:t>
+              <a:t>10.2.2023</a:t>
             </a:fld>
             <a:endParaRPr lang="en-GB"/>
           </a:p>
@@ -16551,7 +14023,7 @@
           <a:p>
             <a:fld id="{202E1EC2-47B8-044B-A09E-6A63B4D80C87}" type="datetime1">
               <a:rPr lang="fi-FI" smtClean="0"/>
-              <a:t>9.2.2023</a:t>
+              <a:t>10.2.2023</a:t>
             </a:fld>
             <a:endParaRPr lang="en-GB"/>
           </a:p>
@@ -16615,874 +14087,6 @@
     <p:extLst>
       <p:ext uri="{BB962C8B-B14F-4D97-AF65-F5344CB8AC3E}">
         <p14:creationId xmlns:p14="http://schemas.microsoft.com/office/powerpoint/2010/main" val="3282751043"/>
-      </p:ext>
-    </p:extLst>
-  </p:cSld>
-  <p:clrMapOvr>
-    <a:masterClrMapping/>
-  </p:clrMapOvr>
-</p:sld>
-</file>
-
-<file path=ppt/slides/slide9.xml><?xml version="1.0" encoding="utf-8"?>
-<p:sld xmlns:a="http://schemas.openxmlformats.org/drawingml/2006/main" xmlns:r="http://schemas.openxmlformats.org/officeDocument/2006/relationships" xmlns:p="http://schemas.openxmlformats.org/presentationml/2006/main">
-  <p:cSld>
-    <p:spTree>
-      <p:nvGrpSpPr>
-        <p:cNvPr id="1" name=""/>
-        <p:cNvGrpSpPr/>
-        <p:nvPr/>
-      </p:nvGrpSpPr>
-      <p:grpSpPr>
-        <a:xfrm>
-          <a:off x="0" y="0"/>
-          <a:ext cx="0" cy="0"/>
-          <a:chOff x="0" y="0"/>
-          <a:chExt cx="0" cy="0"/>
-        </a:xfrm>
-      </p:grpSpPr>
-      <p:sp>
-        <p:nvSpPr>
-          <p:cNvPr id="8" name="Title 7">
-            <a:extLst>
-              <a:ext uri="{FF2B5EF4-FFF2-40B4-BE49-F238E27FC236}">
-                <a16:creationId xmlns:a16="http://schemas.microsoft.com/office/drawing/2014/main" id="{197044C3-CD23-D844-B780-26FABA91AD0F}"/>
-              </a:ext>
-            </a:extLst>
-          </p:cNvPr>
-          <p:cNvSpPr>
-            <a:spLocks noGrp="1"/>
-          </p:cNvSpPr>
-          <p:nvPr>
-            <p:ph type="title"/>
-          </p:nvPr>
-        </p:nvSpPr>
-        <p:spPr>
-          <a:xfrm>
-            <a:off x="550863" y="549276"/>
-            <a:ext cx="11125200" cy="610054"/>
-          </a:xfrm>
-        </p:spPr>
-        <p:txBody>
-          <a:bodyPr/>
-          <a:lstStyle/>
-          <a:p>
-            <a:r>
-              <a:rPr lang="fi-FI" dirty="0"/>
-              <a:t>Express </a:t>
-            </a:r>
-            <a:r>
-              <a:rPr lang="fi-FI" dirty="0" err="1"/>
-              <a:t>framework</a:t>
-            </a:r>
-            <a:r>
-              <a:rPr lang="fi-FI" dirty="0"/>
-              <a:t> for </a:t>
-            </a:r>
-            <a:r>
-              <a:rPr lang="fi-FI" dirty="0" err="1"/>
-              <a:t>building</a:t>
-            </a:r>
-            <a:r>
-              <a:rPr lang="fi-FI" dirty="0"/>
-              <a:t> REST API </a:t>
-            </a:r>
-            <a:r>
-              <a:rPr lang="fi-FI" dirty="0" err="1"/>
-              <a:t>backend</a:t>
-            </a:r>
-            <a:endParaRPr lang="fi-FI" dirty="0"/>
-          </a:p>
-        </p:txBody>
-      </p:sp>
-      <p:sp>
-        <p:nvSpPr>
-          <p:cNvPr id="9" name="Content Placeholder 8">
-            <a:extLst>
-              <a:ext uri="{FF2B5EF4-FFF2-40B4-BE49-F238E27FC236}">
-                <a16:creationId xmlns:a16="http://schemas.microsoft.com/office/drawing/2014/main" id="{ACDE61D8-A75A-F94B-B57A-46F276C03311}"/>
-              </a:ext>
-            </a:extLst>
-          </p:cNvPr>
-          <p:cNvSpPr>
-            <a:spLocks noGrp="1"/>
-          </p:cNvSpPr>
-          <p:nvPr>
-            <p:ph sz="half" idx="2"/>
-          </p:nvPr>
-        </p:nvSpPr>
-        <p:spPr>
-          <a:xfrm>
-            <a:off x="550864" y="1159329"/>
-            <a:ext cx="11336336" cy="4996542"/>
-          </a:xfrm>
-        </p:spPr>
-        <p:txBody>
-          <a:bodyPr>
-            <a:noAutofit/>
-          </a:bodyPr>
-          <a:lstStyle/>
-          <a:p>
-            <a:r>
-              <a:rPr lang="fi-FI" dirty="0" err="1"/>
-              <a:t>You</a:t>
-            </a:r>
-            <a:r>
-              <a:rPr lang="fi-FI" dirty="0"/>
-              <a:t> </a:t>
-            </a:r>
-            <a:r>
-              <a:rPr lang="fi-FI" dirty="0" err="1"/>
-              <a:t>use</a:t>
-            </a:r>
-            <a:r>
-              <a:rPr lang="fi-FI" dirty="0"/>
-              <a:t> Express </a:t>
-            </a:r>
-            <a:r>
-              <a:rPr lang="fi-FI" dirty="0" err="1"/>
-              <a:t>object</a:t>
-            </a:r>
-            <a:r>
-              <a:rPr lang="fi-FI" dirty="0"/>
-              <a:t> and </a:t>
-            </a:r>
-            <a:r>
-              <a:rPr lang="fi-FI" dirty="0" err="1"/>
-              <a:t>functions</a:t>
-            </a:r>
-            <a:r>
-              <a:rPr lang="fi-FI" dirty="0"/>
-              <a:t> =&gt; Express </a:t>
-            </a:r>
-            <a:r>
-              <a:rPr lang="fi-FI" dirty="0" err="1"/>
-              <a:t>uses</a:t>
-            </a:r>
-            <a:r>
-              <a:rPr lang="fi-FI" dirty="0"/>
-              <a:t> </a:t>
-            </a:r>
-            <a:r>
-              <a:rPr lang="fi-FI" dirty="0" err="1"/>
-              <a:t>the</a:t>
-            </a:r>
-            <a:r>
-              <a:rPr lang="fi-FI" dirty="0"/>
-              <a:t> </a:t>
-            </a:r>
-            <a:r>
-              <a:rPr lang="fi-FI" dirty="0" err="1"/>
-              <a:t>services</a:t>
-            </a:r>
-            <a:r>
-              <a:rPr lang="fi-FI" dirty="0"/>
-              <a:t> of </a:t>
-            </a:r>
-            <a:r>
-              <a:rPr lang="fi-FI" dirty="0" err="1"/>
-              <a:t>the</a:t>
-            </a:r>
-            <a:r>
-              <a:rPr lang="fi-FI" dirty="0"/>
-              <a:t> Node.js </a:t>
-            </a:r>
-            <a:r>
-              <a:rPr lang="fi-FI" dirty="0" err="1"/>
-              <a:t>itself</a:t>
-            </a:r>
-            <a:r>
-              <a:rPr lang="fi-FI" dirty="0"/>
-              <a:t> </a:t>
-            </a:r>
-            <a:r>
-              <a:rPr lang="fi-FI" dirty="0" err="1"/>
-              <a:t>behind</a:t>
-            </a:r>
-            <a:r>
-              <a:rPr lang="fi-FI" dirty="0"/>
-              <a:t> </a:t>
-            </a:r>
-            <a:r>
-              <a:rPr lang="fi-FI" dirty="0" err="1"/>
-              <a:t>the</a:t>
-            </a:r>
-            <a:r>
-              <a:rPr lang="fi-FI" dirty="0"/>
-              <a:t> </a:t>
-            </a:r>
-            <a:r>
-              <a:rPr lang="fi-FI" dirty="0" err="1"/>
-              <a:t>scenes</a:t>
-            </a:r>
-            <a:r>
-              <a:rPr lang="fi-FI" dirty="0"/>
-              <a:t>.</a:t>
-            </a:r>
-          </a:p>
-          <a:p>
-            <a:r>
-              <a:rPr lang="fi-FI" dirty="0"/>
-              <a:t>”Write </a:t>
-            </a:r>
-            <a:r>
-              <a:rPr lang="fi-FI" dirty="0" err="1"/>
-              <a:t>less</a:t>
-            </a:r>
-            <a:r>
-              <a:rPr lang="fi-FI" dirty="0"/>
-              <a:t> and </a:t>
-            </a:r>
-            <a:r>
-              <a:rPr lang="fi-FI" dirty="0" err="1"/>
-              <a:t>get</a:t>
-            </a:r>
-            <a:r>
-              <a:rPr lang="fi-FI" dirty="0"/>
-              <a:t> </a:t>
-            </a:r>
-            <a:r>
-              <a:rPr lang="fi-FI" dirty="0" err="1"/>
-              <a:t>more</a:t>
-            </a:r>
-            <a:r>
-              <a:rPr lang="fi-FI" dirty="0"/>
-              <a:t> </a:t>
-            </a:r>
-            <a:r>
-              <a:rPr lang="fi-FI" dirty="0" err="1"/>
-              <a:t>done</a:t>
-            </a:r>
-            <a:r>
-              <a:rPr lang="fi-FI" dirty="0"/>
-              <a:t>”</a:t>
-            </a:r>
-          </a:p>
-          <a:p>
-            <a:r>
-              <a:rPr lang="fi-FI" dirty="0"/>
-              <a:t>Express </a:t>
-            </a:r>
-            <a:r>
-              <a:rPr lang="fi-FI" dirty="0" err="1"/>
-              <a:t>we</a:t>
-            </a:r>
-            <a:r>
-              <a:rPr lang="fi-FI" dirty="0"/>
-              <a:t> </a:t>
-            </a:r>
-            <a:r>
-              <a:rPr lang="fi-FI" dirty="0" err="1"/>
-              <a:t>use</a:t>
-            </a:r>
-            <a:r>
-              <a:rPr lang="fi-FI" dirty="0"/>
-              <a:t> to:</a:t>
-            </a:r>
-          </a:p>
-          <a:p>
-            <a:pPr lvl="1"/>
-            <a:r>
-              <a:rPr lang="fi-FI" dirty="0" err="1"/>
-              <a:t>Configure</a:t>
-            </a:r>
-            <a:r>
-              <a:rPr lang="fi-FI" dirty="0"/>
-              <a:t> </a:t>
-            </a:r>
-            <a:r>
-              <a:rPr lang="fi-FI" dirty="0" err="1"/>
-              <a:t>the</a:t>
-            </a:r>
-            <a:r>
-              <a:rPr lang="fi-FI" dirty="0"/>
-              <a:t> </a:t>
-            </a:r>
-            <a:r>
-              <a:rPr lang="fi-FI" dirty="0" err="1"/>
-              <a:t>backend</a:t>
-            </a:r>
-            <a:r>
-              <a:rPr lang="fi-FI" dirty="0"/>
-              <a:t> </a:t>
-            </a:r>
-            <a:r>
-              <a:rPr lang="fi-FI" dirty="0" err="1"/>
-              <a:t>server</a:t>
-            </a:r>
-            <a:endParaRPr lang="fi-FI" dirty="0"/>
-          </a:p>
-          <a:p>
-            <a:pPr lvl="1"/>
-            <a:r>
-              <a:rPr lang="fi-FI" dirty="0"/>
-              <a:t>Setup </a:t>
-            </a:r>
-            <a:r>
-              <a:rPr lang="fi-FI" dirty="0" err="1"/>
-              <a:t>the</a:t>
-            </a:r>
-            <a:r>
-              <a:rPr lang="fi-FI" dirty="0"/>
-              <a:t> </a:t>
-            </a:r>
-            <a:r>
-              <a:rPr lang="fi-FI" dirty="0" err="1"/>
-              <a:t>backend</a:t>
-            </a:r>
-            <a:r>
-              <a:rPr lang="fi-FI" dirty="0"/>
-              <a:t> </a:t>
-            </a:r>
-            <a:r>
-              <a:rPr lang="fi-FI" dirty="0" err="1"/>
-              <a:t>routing</a:t>
-            </a:r>
-            <a:r>
-              <a:rPr lang="fi-FI" dirty="0"/>
-              <a:t>, </a:t>
-            </a:r>
-            <a:r>
-              <a:rPr lang="fi-FI" dirty="0" err="1"/>
-              <a:t>certain</a:t>
-            </a:r>
-            <a:r>
-              <a:rPr lang="fi-FI" dirty="0"/>
-              <a:t> </a:t>
-            </a:r>
-            <a:r>
-              <a:rPr lang="fi-FI" dirty="0" err="1"/>
-              <a:t>request</a:t>
-            </a:r>
-            <a:r>
-              <a:rPr lang="fi-FI" dirty="0"/>
-              <a:t> URL </a:t>
-            </a:r>
-            <a:r>
-              <a:rPr lang="fi-FI" dirty="0" err="1"/>
-              <a:t>pattern</a:t>
-            </a:r>
-            <a:r>
-              <a:rPr lang="fi-FI" dirty="0"/>
-              <a:t> to a </a:t>
-            </a:r>
-            <a:r>
-              <a:rPr lang="fi-FI" dirty="0" err="1"/>
-              <a:t>certain</a:t>
-            </a:r>
-            <a:r>
-              <a:rPr lang="fi-FI" dirty="0"/>
-              <a:t> </a:t>
-            </a:r>
-            <a:r>
-              <a:rPr lang="fi-FI" dirty="0" err="1"/>
-              <a:t>handler</a:t>
-            </a:r>
-            <a:r>
-              <a:rPr lang="fi-FI" dirty="0"/>
-              <a:t> </a:t>
-            </a:r>
-            <a:r>
-              <a:rPr lang="fi-FI" dirty="0" err="1"/>
-              <a:t>function</a:t>
-            </a:r>
-            <a:endParaRPr lang="fi-FI" dirty="0"/>
-          </a:p>
-          <a:p>
-            <a:pPr lvl="1"/>
-            <a:r>
-              <a:rPr lang="fi-FI" dirty="0"/>
-              <a:t>To </a:t>
-            </a:r>
-            <a:r>
-              <a:rPr lang="fi-FI" dirty="0" err="1"/>
-              <a:t>add</a:t>
-            </a:r>
-            <a:r>
-              <a:rPr lang="fi-FI" dirty="0"/>
-              <a:t> </a:t>
-            </a:r>
-            <a:r>
-              <a:rPr lang="fi-FI" dirty="0" err="1"/>
-              <a:t>middleware</a:t>
-            </a:r>
-            <a:r>
-              <a:rPr lang="fi-FI" dirty="0"/>
-              <a:t> to </a:t>
-            </a:r>
-            <a:r>
-              <a:rPr lang="fi-FI" dirty="0" err="1"/>
-              <a:t>the</a:t>
-            </a:r>
-            <a:r>
-              <a:rPr lang="fi-FI" dirty="0"/>
-              <a:t> </a:t>
-            </a:r>
-            <a:r>
-              <a:rPr lang="fi-FI" dirty="0" err="1"/>
-              <a:t>request</a:t>
-            </a:r>
-            <a:r>
-              <a:rPr lang="fi-FI" dirty="0"/>
-              <a:t> </a:t>
-            </a:r>
-            <a:r>
-              <a:rPr lang="fi-FI" dirty="0" err="1"/>
-              <a:t>handling</a:t>
-            </a:r>
-            <a:r>
-              <a:rPr lang="fi-FI" dirty="0"/>
-              <a:t> </a:t>
-            </a:r>
-            <a:r>
-              <a:rPr lang="fi-FI" dirty="0" err="1"/>
-              <a:t>loop</a:t>
-            </a:r>
-            <a:endParaRPr lang="fi-FI" dirty="0"/>
-          </a:p>
-          <a:p>
-            <a:pPr lvl="1"/>
-            <a:r>
-              <a:rPr lang="fi-FI" dirty="0"/>
-              <a:t>To </a:t>
-            </a:r>
-            <a:r>
-              <a:rPr lang="fi-FI" dirty="0" err="1"/>
-              <a:t>get</a:t>
-            </a:r>
-            <a:r>
-              <a:rPr lang="fi-FI" dirty="0"/>
-              <a:t> URL </a:t>
-            </a:r>
-            <a:r>
-              <a:rPr lang="fi-FI" dirty="0" err="1"/>
-              <a:t>parameters</a:t>
-            </a:r>
-            <a:r>
-              <a:rPr lang="fi-FI" dirty="0"/>
-              <a:t>, GET </a:t>
-            </a:r>
-            <a:r>
-              <a:rPr lang="fi-FI" dirty="0" err="1"/>
-              <a:t>parameters</a:t>
-            </a:r>
-            <a:r>
-              <a:rPr lang="fi-FI" dirty="0"/>
-              <a:t> </a:t>
-            </a:r>
-            <a:r>
-              <a:rPr lang="fi-FI" dirty="0" err="1"/>
-              <a:t>or</a:t>
-            </a:r>
-            <a:r>
-              <a:rPr lang="fi-FI" dirty="0"/>
-              <a:t> POST data to </a:t>
-            </a:r>
-            <a:r>
-              <a:rPr lang="fi-FI" dirty="0" err="1"/>
-              <a:t>our</a:t>
-            </a:r>
-            <a:r>
-              <a:rPr lang="fi-FI" dirty="0"/>
-              <a:t> </a:t>
-            </a:r>
-            <a:r>
-              <a:rPr lang="fi-FI" dirty="0" err="1"/>
-              <a:t>handler</a:t>
-            </a:r>
-            <a:r>
-              <a:rPr lang="fi-FI" dirty="0"/>
-              <a:t> </a:t>
-            </a:r>
-            <a:r>
-              <a:rPr lang="fi-FI" dirty="0" err="1"/>
-              <a:t>program</a:t>
-            </a:r>
-            <a:r>
-              <a:rPr lang="fi-FI" dirty="0"/>
-              <a:t> </a:t>
-            </a:r>
-            <a:r>
-              <a:rPr lang="fi-FI" dirty="0" err="1"/>
-              <a:t>easily</a:t>
-            </a:r>
-            <a:endParaRPr lang="fi-FI" dirty="0"/>
-          </a:p>
-          <a:p>
-            <a:pPr lvl="2"/>
-            <a:r>
-              <a:rPr lang="fi-FI" dirty="0" err="1"/>
-              <a:t>req.query.yourGetQueryParameterHere</a:t>
-            </a:r>
-            <a:r>
-              <a:rPr lang="fi-FI" dirty="0"/>
-              <a:t>   (</a:t>
-            </a:r>
-            <a:r>
-              <a:rPr lang="fi-FI" dirty="0" err="1"/>
-              <a:t>The</a:t>
-            </a:r>
-            <a:r>
-              <a:rPr lang="fi-FI" dirty="0"/>
-              <a:t> </a:t>
-            </a:r>
-            <a:r>
-              <a:rPr lang="fi-FI" dirty="0" err="1"/>
-              <a:t>Get</a:t>
-            </a:r>
-            <a:r>
-              <a:rPr lang="fi-FI" dirty="0"/>
-              <a:t> </a:t>
-            </a:r>
-            <a:r>
-              <a:rPr lang="fi-FI" dirty="0" err="1"/>
-              <a:t>parameters</a:t>
-            </a:r>
-            <a:r>
-              <a:rPr lang="fi-FI" dirty="0"/>
-              <a:t> of </a:t>
-            </a:r>
-            <a:r>
-              <a:rPr lang="fi-FI" dirty="0" err="1"/>
-              <a:t>the</a:t>
-            </a:r>
-            <a:r>
-              <a:rPr lang="fi-FI" dirty="0"/>
-              <a:t> URL, </a:t>
-            </a:r>
-            <a:r>
-              <a:rPr lang="fi-FI" dirty="0" err="1"/>
-              <a:t>with</a:t>
-            </a:r>
-            <a:r>
-              <a:rPr lang="fi-FI" dirty="0"/>
-              <a:t> ?</a:t>
-            </a:r>
-            <a:r>
-              <a:rPr lang="fi-FI" dirty="0" err="1"/>
-              <a:t>name</a:t>
-            </a:r>
-            <a:r>
-              <a:rPr lang="fi-FI" dirty="0"/>
-              <a:t>="Joe"&amp;</a:t>
-            </a:r>
-            <a:r>
-              <a:rPr lang="fi-FI" dirty="0" err="1"/>
-              <a:t>age</a:t>
-            </a:r>
-            <a:r>
-              <a:rPr lang="fi-FI" dirty="0"/>
-              <a:t>=13 )</a:t>
-            </a:r>
-          </a:p>
-          <a:p>
-            <a:pPr lvl="2"/>
-            <a:r>
-              <a:rPr lang="fi-FI" dirty="0" err="1"/>
-              <a:t>req.params.yourUrlParameterHere</a:t>
-            </a:r>
-            <a:r>
-              <a:rPr lang="fi-FI" dirty="0"/>
-              <a:t>    (</a:t>
-            </a:r>
-            <a:r>
-              <a:rPr lang="fi-FI" dirty="0" err="1"/>
-              <a:t>The</a:t>
-            </a:r>
-            <a:r>
-              <a:rPr lang="fi-FI" dirty="0"/>
-              <a:t> : </a:t>
-            </a:r>
-            <a:r>
-              <a:rPr lang="fi-FI" dirty="0" err="1"/>
-              <a:t>marked</a:t>
-            </a:r>
-            <a:r>
-              <a:rPr lang="fi-FI" dirty="0"/>
-              <a:t> </a:t>
-            </a:r>
-            <a:r>
-              <a:rPr lang="fi-FI" dirty="0" err="1"/>
-              <a:t>parts</a:t>
-            </a:r>
-            <a:r>
-              <a:rPr lang="fi-FI" dirty="0"/>
-              <a:t> of </a:t>
-            </a:r>
-            <a:r>
-              <a:rPr lang="fi-FI" dirty="0" err="1"/>
-              <a:t>the</a:t>
-            </a:r>
-            <a:r>
-              <a:rPr lang="fi-FI" dirty="0"/>
-              <a:t> URL, </a:t>
-            </a:r>
-            <a:r>
-              <a:rPr lang="fi-FI" dirty="0" err="1"/>
-              <a:t>like</a:t>
-            </a:r>
-            <a:r>
-              <a:rPr lang="fi-FI" dirty="0"/>
-              <a:t> /</a:t>
-            </a:r>
-            <a:r>
-              <a:rPr lang="fi-FI" dirty="0" err="1"/>
-              <a:t>category</a:t>
-            </a:r>
-            <a:r>
-              <a:rPr lang="fi-FI" dirty="0"/>
-              <a:t>/:id )</a:t>
-            </a:r>
-          </a:p>
-          <a:p>
-            <a:pPr lvl="2"/>
-            <a:r>
-              <a:rPr lang="fi-FI" dirty="0" err="1"/>
-              <a:t>req.body.somePropertyOfTheJsonObjectInBody</a:t>
-            </a:r>
-            <a:r>
-              <a:rPr lang="fi-FI" dirty="0"/>
-              <a:t>       (</a:t>
-            </a:r>
-            <a:r>
-              <a:rPr lang="fi-FI" dirty="0" err="1"/>
-              <a:t>Middleware</a:t>
-            </a:r>
-            <a:r>
-              <a:rPr lang="fi-FI" dirty="0"/>
-              <a:t> </a:t>
-            </a:r>
-            <a:r>
-              <a:rPr lang="fi-FI" dirty="0" err="1"/>
-              <a:t>function</a:t>
-            </a:r>
-            <a:r>
-              <a:rPr lang="fi-FI" dirty="0"/>
-              <a:t> </a:t>
-            </a:r>
-            <a:r>
-              <a:rPr lang="fi-FI" dirty="0" err="1"/>
-              <a:t>express.json</a:t>
-            </a:r>
-            <a:r>
-              <a:rPr lang="fi-FI" dirty="0"/>
-              <a:t> </a:t>
-            </a:r>
-            <a:r>
-              <a:rPr lang="fi-FI" dirty="0" err="1"/>
-              <a:t>did</a:t>
-            </a:r>
-            <a:r>
-              <a:rPr lang="fi-FI" dirty="0"/>
-              <a:t> </a:t>
-            </a:r>
-            <a:r>
-              <a:rPr lang="fi-FI" dirty="0" err="1"/>
-              <a:t>parse</a:t>
-            </a:r>
-            <a:r>
-              <a:rPr lang="fi-FI" dirty="0"/>
-              <a:t> </a:t>
-            </a:r>
-            <a:r>
-              <a:rPr lang="fi-FI" dirty="0" err="1"/>
-              <a:t>the</a:t>
-            </a:r>
-            <a:r>
-              <a:rPr lang="fi-FI" dirty="0"/>
-              <a:t> </a:t>
-            </a:r>
-            <a:r>
-              <a:rPr lang="fi-FI" dirty="0" err="1"/>
-              <a:t>request</a:t>
-            </a:r>
-            <a:r>
-              <a:rPr lang="fi-FI" dirty="0"/>
-              <a:t> </a:t>
-            </a:r>
-            <a:r>
-              <a:rPr lang="fi-FI" dirty="0" err="1"/>
-              <a:t>body</a:t>
-            </a:r>
-            <a:r>
-              <a:rPr lang="fi-FI" dirty="0"/>
-              <a:t> </a:t>
-            </a:r>
-            <a:r>
-              <a:rPr lang="fi-FI" dirty="0" err="1"/>
-              <a:t>Json</a:t>
-            </a:r>
-            <a:r>
-              <a:rPr lang="fi-FI" dirty="0"/>
-              <a:t> and </a:t>
-            </a:r>
-            <a:r>
-              <a:rPr lang="fi-FI" dirty="0" err="1"/>
-              <a:t>offers</a:t>
-            </a:r>
-            <a:r>
-              <a:rPr lang="fi-FI" dirty="0"/>
-              <a:t> it in </a:t>
-            </a:r>
-            <a:r>
-              <a:rPr lang="fi-FI" dirty="0" err="1"/>
-              <a:t>req.body</a:t>
-            </a:r>
-            <a:r>
-              <a:rPr lang="fi-FI" dirty="0"/>
-              <a:t> to </a:t>
-            </a:r>
-            <a:r>
-              <a:rPr lang="fi-FI" dirty="0" err="1"/>
-              <a:t>you</a:t>
-            </a:r>
-            <a:r>
-              <a:rPr lang="fi-FI" dirty="0"/>
-              <a:t>)</a:t>
-            </a:r>
-          </a:p>
-          <a:p>
-            <a:pPr lvl="1"/>
-            <a:r>
-              <a:rPr lang="fi-FI" dirty="0" err="1"/>
-              <a:t>Possibly</a:t>
-            </a:r>
-            <a:r>
-              <a:rPr lang="fi-FI" dirty="0"/>
-              <a:t> for </a:t>
-            </a:r>
-            <a:r>
-              <a:rPr lang="fi-FI" dirty="0" err="1"/>
-              <a:t>validation</a:t>
-            </a:r>
-            <a:r>
-              <a:rPr lang="fi-FI" dirty="0"/>
-              <a:t> and </a:t>
-            </a:r>
-            <a:r>
-              <a:rPr lang="fi-FI" dirty="0" err="1"/>
-              <a:t>common</a:t>
-            </a:r>
-            <a:r>
-              <a:rPr lang="fi-FI" dirty="0"/>
-              <a:t> </a:t>
-            </a:r>
-            <a:r>
-              <a:rPr lang="fi-FI" dirty="0" err="1"/>
-              <a:t>error-handling</a:t>
-            </a:r>
-            <a:r>
-              <a:rPr lang="fi-FI" dirty="0"/>
-              <a:t> and </a:t>
-            </a:r>
-            <a:r>
-              <a:rPr lang="fi-FI" dirty="0" err="1"/>
-              <a:t>logging</a:t>
-            </a:r>
-            <a:endParaRPr lang="fi-FI" dirty="0"/>
-          </a:p>
-          <a:p>
-            <a:pPr marL="864000" lvl="2" indent="0">
-              <a:buNone/>
-            </a:pPr>
-            <a:endParaRPr lang="fi-FI" dirty="0"/>
-          </a:p>
-          <a:p>
-            <a:pPr lvl="1"/>
-            <a:endParaRPr lang="fi-FI" dirty="0"/>
-          </a:p>
-          <a:p>
-            <a:endParaRPr lang="fi-FI" dirty="0"/>
-          </a:p>
-        </p:txBody>
-      </p:sp>
-      <p:sp>
-        <p:nvSpPr>
-          <p:cNvPr id="5" name="Date Placeholder 4">
-            <a:extLst>
-              <a:ext uri="{FF2B5EF4-FFF2-40B4-BE49-F238E27FC236}">
-                <a16:creationId xmlns:a16="http://schemas.microsoft.com/office/drawing/2014/main" id="{976244E2-AA76-2742-B2EC-FEC79276155C}"/>
-              </a:ext>
-            </a:extLst>
-          </p:cNvPr>
-          <p:cNvSpPr>
-            <a:spLocks noGrp="1"/>
-          </p:cNvSpPr>
-          <p:nvPr>
-            <p:ph type="dt" sz="half" idx="10"/>
-          </p:nvPr>
-        </p:nvSpPr>
-        <p:spPr/>
-        <p:txBody>
-          <a:bodyPr/>
-          <a:lstStyle/>
-          <a:p>
-            <a:fld id="{202E1EC2-47B8-044B-A09E-6A63B4D80C87}" type="datetime1">
-              <a:rPr lang="fi-FI" smtClean="0"/>
-              <a:t>9.2.2023</a:t>
-            </a:fld>
-            <a:endParaRPr lang="en-GB"/>
-          </a:p>
-        </p:txBody>
-      </p:sp>
-      <p:sp>
-        <p:nvSpPr>
-          <p:cNvPr id="6" name="Footer Placeholder 5">
-            <a:extLst>
-              <a:ext uri="{FF2B5EF4-FFF2-40B4-BE49-F238E27FC236}">
-                <a16:creationId xmlns:a16="http://schemas.microsoft.com/office/drawing/2014/main" id="{588CE607-4137-8840-8FEA-42EAC857E3A3}"/>
-              </a:ext>
-            </a:extLst>
-          </p:cNvPr>
-          <p:cNvSpPr>
-            <a:spLocks noGrp="1"/>
-          </p:cNvSpPr>
-          <p:nvPr>
-            <p:ph type="ftr" sz="quarter" idx="11"/>
-          </p:nvPr>
-        </p:nvSpPr>
-        <p:spPr/>
-        <p:txBody>
-          <a:bodyPr/>
-          <a:lstStyle/>
-          <a:p>
-            <a:endParaRPr lang="en-GB"/>
-          </a:p>
-        </p:txBody>
-      </p:sp>
-      <p:sp>
-        <p:nvSpPr>
-          <p:cNvPr id="7" name="Slide Number Placeholder 6">
-            <a:extLst>
-              <a:ext uri="{FF2B5EF4-FFF2-40B4-BE49-F238E27FC236}">
-                <a16:creationId xmlns:a16="http://schemas.microsoft.com/office/drawing/2014/main" id="{2E133A96-6C73-0844-B8CB-27C2B5F4CFB1}"/>
-              </a:ext>
-            </a:extLst>
-          </p:cNvPr>
-          <p:cNvSpPr>
-            <a:spLocks noGrp="1"/>
-          </p:cNvSpPr>
-          <p:nvPr>
-            <p:ph type="sldNum" sz="quarter" idx="12"/>
-          </p:nvPr>
-        </p:nvSpPr>
-        <p:spPr/>
-        <p:txBody>
-          <a:bodyPr/>
-          <a:lstStyle/>
-          <a:p>
-            <a:fld id="{76BAB7ED-EDE9-4D4B-9A2D-30E18C47C16E}" type="slidenum">
-              <a:rPr lang="en-GB" smtClean="0"/>
-              <a:t>9</a:t>
-            </a:fld>
-            <a:endParaRPr lang="en-GB"/>
-          </a:p>
-        </p:txBody>
-      </p:sp>
-    </p:spTree>
-    <p:extLst>
-      <p:ext uri="{BB962C8B-B14F-4D97-AF65-F5344CB8AC3E}">
-        <p14:creationId xmlns:p14="http://schemas.microsoft.com/office/powerpoint/2010/main" val="662929930"/>
       </p:ext>
     </p:extLst>
   </p:cSld>

</xml_diff>

<commit_message>
Writing the minimalistic REST API URL patterns explicitly to the doc
</commit_message>
<xml_diff>
--- a/05_es6_node/NodeJS_demo/02_nodejs/NodeJS.pptx
+++ b/05_es6_node/NodeJS_demo/02_nodejs/NodeJS.pptx
@@ -5,7 +5,7 @@
     <p:sldMasterId id="2147483648" r:id="rId4"/>
   </p:sldMasterIdLst>
   <p:notesMasterIdLst>
-    <p:notesMasterId r:id="rId13"/>
+    <p:notesMasterId r:id="rId14"/>
   </p:notesMasterIdLst>
   <p:sldIdLst>
     <p:sldId id="256" r:id="rId5"/>
@@ -15,7 +15,8 @@
     <p:sldId id="261" r:id="rId9"/>
     <p:sldId id="263" r:id="rId10"/>
     <p:sldId id="264" r:id="rId11"/>
-    <p:sldId id="265" r:id="rId12"/>
+    <p:sldId id="266" r:id="rId12"/>
+    <p:sldId id="265" r:id="rId13"/>
   </p:sldIdLst>
   <p:sldSz cx="12192000" cy="6858000"/>
   <p:notesSz cx="6858000" cy="9144000"/>
@@ -1686,7 +1687,7 @@
           <a:p>
             <a:fld id="{5645C365-1C26-6946-87AF-75D6A7DF4277}" type="datetimeFigureOut">
               <a:rPr lang="en-GB" smtClean="0"/>
-              <a:t>10/02/2023</a:t>
+              <a:t>03/04/2023</a:t>
             </a:fld>
             <a:endParaRPr lang="en-GB"/>
           </a:p>
@@ -2185,7 +2186,7 @@
           <a:p>
             <a:fld id="{35B864B8-8D08-7B43-B4FB-B2FB41A5D9E3}" type="datetime1">
               <a:rPr lang="fi-FI" smtClean="0"/>
-              <a:t>10.2.2023</a:t>
+              <a:t>3.4.2023</a:t>
             </a:fld>
             <a:endParaRPr lang="en-GB" dirty="0"/>
           </a:p>
@@ -2512,7 +2513,7 @@
           <a:p>
             <a:fld id="{D5AEA85A-FC56-D34C-9AA6-ECC3D2586F37}" type="datetime1">
               <a:rPr lang="fi-FI" smtClean="0"/>
-              <a:t>10.2.2023</a:t>
+              <a:t>3.4.2023</a:t>
             </a:fld>
             <a:endParaRPr lang="en-GB" dirty="0"/>
           </a:p>
@@ -2722,7 +2723,7 @@
           <a:p>
             <a:fld id="{E6BC6EEF-E660-7844-8930-418AFF95EA40}" type="datetime1">
               <a:rPr lang="fi-FI" smtClean="0"/>
-              <a:t>10.2.2023</a:t>
+              <a:t>3.4.2023</a:t>
             </a:fld>
             <a:endParaRPr lang="en-GB" dirty="0"/>
           </a:p>
@@ -3031,7 +3032,7 @@
           <a:p>
             <a:fld id="{4E10C7EC-C1C1-9849-A573-7692478FCD52}" type="datetime1">
               <a:rPr lang="fi-FI" smtClean="0"/>
-              <a:t>10.2.2023</a:t>
+              <a:t>3.4.2023</a:t>
             </a:fld>
             <a:endParaRPr lang="en-GB" dirty="0"/>
           </a:p>
@@ -3304,7 +3305,7 @@
           <a:p>
             <a:fld id="{844FF3FE-30BE-2040-9151-6FBC4992BF4F}" type="datetime1">
               <a:rPr lang="fi-FI" smtClean="0"/>
-              <a:t>10.2.2023</a:t>
+              <a:t>3.4.2023</a:t>
             </a:fld>
             <a:endParaRPr lang="en-GB" dirty="0"/>
           </a:p>
@@ -3544,7 +3545,7 @@
           <a:p>
             <a:fld id="{11EDCD7B-6966-E249-89F2-D46BDFBF56BE}" type="datetime1">
               <a:rPr lang="fi-FI" smtClean="0"/>
-              <a:t>10.2.2023</a:t>
+              <a:t>3.4.2023</a:t>
             </a:fld>
             <a:endParaRPr lang="en-GB" dirty="0"/>
           </a:p>
@@ -3837,7 +3838,7 @@
           <a:p>
             <a:fld id="{11EDCD7B-6966-E249-89F2-D46BDFBF56BE}" type="datetime1">
               <a:rPr lang="fi-FI" smtClean="0"/>
-              <a:t>10.2.2023</a:t>
+              <a:t>3.4.2023</a:t>
             </a:fld>
             <a:endParaRPr lang="en-GB" dirty="0"/>
           </a:p>
@@ -4276,7 +4277,7 @@
           <a:p>
             <a:fld id="{844FF3FE-30BE-2040-9151-6FBC4992BF4F}" type="datetime1">
               <a:rPr lang="fi-FI" smtClean="0"/>
-              <a:t>10.2.2023</a:t>
+              <a:t>3.4.2023</a:t>
             </a:fld>
             <a:endParaRPr lang="en-GB" dirty="0"/>
           </a:p>
@@ -4504,7 +4505,7 @@
           <a:p>
             <a:fld id="{11EDCD7B-6966-E249-89F2-D46BDFBF56BE}" type="datetime1">
               <a:rPr lang="fi-FI" smtClean="0"/>
-              <a:t>10.2.2023</a:t>
+              <a:t>3.4.2023</a:t>
             </a:fld>
             <a:endParaRPr lang="en-GB" dirty="0"/>
           </a:p>
@@ -4919,7 +4920,7 @@
           <a:p>
             <a:fld id="{B62E192A-D52B-F541-B2AA-4AEB9388F1F7}" type="datetime1">
               <a:rPr lang="fi-FI" smtClean="0"/>
-              <a:t>10.2.2023</a:t>
+              <a:t>3.4.2023</a:t>
             </a:fld>
             <a:endParaRPr lang="en-GB" dirty="0"/>
           </a:p>
@@ -5219,7 +5220,7 @@
           <a:p>
             <a:fld id="{EEA4FAA2-2B3E-264C-A42F-2D6D3EF33A3C}" type="datetime1">
               <a:rPr lang="fi-FI" smtClean="0"/>
-              <a:t>10.2.2023</a:t>
+              <a:t>3.4.2023</a:t>
             </a:fld>
             <a:endParaRPr lang="en-GB" dirty="0"/>
           </a:p>
@@ -6122,7 +6123,7 @@
           <a:p>
             <a:fld id="{B3114A65-8017-1743-A85A-B2A4BB835AE9}" type="datetime1">
               <a:rPr lang="fi-FI" smtClean="0"/>
-              <a:t>10.2.2023</a:t>
+              <a:t>3.4.2023</a:t>
             </a:fld>
             <a:endParaRPr lang="en-GB" dirty="0"/>
           </a:p>
@@ -6350,7 +6351,7 @@
           <a:p>
             <a:fld id="{11EDCD7B-6966-E249-89F2-D46BDFBF56BE}" type="datetime1">
               <a:rPr lang="fi-FI" smtClean="0"/>
-              <a:t>10.2.2023</a:t>
+              <a:t>3.4.2023</a:t>
             </a:fld>
             <a:endParaRPr lang="en-GB" dirty="0"/>
           </a:p>
@@ -6642,7 +6643,7 @@
           <a:p>
             <a:fld id="{45F98643-D206-614D-B596-3C8548138211}" type="datetime1">
               <a:rPr lang="fi-FI" smtClean="0"/>
-              <a:t>10.2.2023</a:t>
+              <a:t>3.4.2023</a:t>
             </a:fld>
             <a:endParaRPr lang="en-GB" dirty="0"/>
           </a:p>
@@ -7291,7 +7292,7 @@
           <a:p>
             <a:fld id="{30BF63A1-919F-FB49-ABA8-182126D24C50}" type="datetime1">
               <a:rPr lang="fi-FI" smtClean="0"/>
-              <a:t>10.2.2023</a:t>
+              <a:t>3.4.2023</a:t>
             </a:fld>
             <a:endParaRPr lang="en-GB" dirty="0"/>
           </a:p>
@@ -7507,7 +7508,7 @@
           <a:p>
             <a:fld id="{202E1EC2-47B8-044B-A09E-6A63B4D80C87}" type="datetime1">
               <a:rPr lang="fi-FI" smtClean="0"/>
-              <a:t>10.2.2023</a:t>
+              <a:t>3.4.2023</a:t>
             </a:fld>
             <a:endParaRPr lang="en-GB"/>
           </a:p>
@@ -7787,7 +7788,7 @@
           <a:p>
             <a:fld id="{202E1EC2-47B8-044B-A09E-6A63B4D80C87}" type="datetime1">
               <a:rPr lang="fi-FI" smtClean="0"/>
-              <a:t>10.2.2023</a:t>
+              <a:t>3.4.2023</a:t>
             </a:fld>
             <a:endParaRPr lang="en-GB"/>
           </a:p>
@@ -8590,7 +8591,7 @@
           <a:p>
             <a:fld id="{202E1EC2-47B8-044B-A09E-6A63B4D80C87}" type="datetime1">
               <a:rPr lang="fi-FI" smtClean="0"/>
-              <a:t>10.2.2023</a:t>
+              <a:t>3.4.2023</a:t>
             </a:fld>
             <a:endParaRPr lang="en-GB"/>
           </a:p>
@@ -9047,7 +9048,7 @@
           <a:p>
             <a:fld id="{202E1EC2-47B8-044B-A09E-6A63B4D80C87}" type="datetime1">
               <a:rPr lang="fi-FI" smtClean="0"/>
-              <a:t>10.2.2023</a:t>
+              <a:t>3.4.2023</a:t>
             </a:fld>
             <a:endParaRPr lang="en-GB"/>
           </a:p>
@@ -9809,7 +9810,7 @@
           <a:p>
             <a:fld id="{202E1EC2-47B8-044B-A09E-6A63B4D80C87}" type="datetime1">
               <a:rPr lang="fi-FI" smtClean="0"/>
-              <a:t>10.2.2023</a:t>
+              <a:t>3.4.2023</a:t>
             </a:fld>
             <a:endParaRPr lang="en-GB"/>
           </a:p>
@@ -12970,7 +12971,7 @@
           <a:p>
             <a:fld id="{202E1EC2-47B8-044B-A09E-6A63B4D80C87}" type="datetime1">
               <a:rPr lang="fi-FI" smtClean="0"/>
-              <a:t>10.2.2023</a:t>
+              <a:t>3.4.2023</a:t>
             </a:fld>
             <a:endParaRPr lang="en-GB"/>
           </a:p>
@@ -13094,6 +13095,30 @@
               <a:rPr lang="fi-FI" dirty="0" err="1"/>
               <a:t>endpoints</a:t>
             </a:r>
+            <a:r>
+              <a:rPr lang="fi-FI" dirty="0"/>
+              <a:t> – HTTP </a:t>
+            </a:r>
+            <a:r>
+              <a:rPr lang="fi-FI" dirty="0" err="1"/>
+              <a:t>methods</a:t>
+            </a:r>
+            <a:r>
+              <a:rPr lang="fi-FI" dirty="0"/>
+              <a:t> </a:t>
+            </a:r>
+            <a:r>
+              <a:rPr lang="fi-FI" dirty="0" err="1"/>
+              <a:t>we</a:t>
+            </a:r>
+            <a:r>
+              <a:rPr lang="fi-FI" dirty="0"/>
+              <a:t> </a:t>
+            </a:r>
+            <a:r>
+              <a:rPr lang="fi-FI" dirty="0" err="1"/>
+              <a:t>use</a:t>
+            </a:r>
             <a:endParaRPr lang="fi-FI" dirty="0"/>
           </a:p>
         </p:txBody>
@@ -13127,12 +13152,63 @@
           <a:lstStyle/>
           <a:p>
             <a:r>
-              <a:rPr lang="fi-FI" dirty="0" err="1"/>
-              <a:t>Use</a:t>
-            </a:r>
-            <a:r>
-              <a:rPr lang="fi-FI" dirty="0"/>
-              <a:t> </a:t>
+              <a:rPr lang="fi-FI" dirty="0"/>
+              <a:t>HTTP </a:t>
+            </a:r>
+            <a:r>
+              <a:rPr lang="fi-FI" dirty="0" err="1"/>
+              <a:t>Methods</a:t>
+            </a:r>
+            <a:r>
+              <a:rPr lang="fi-FI" dirty="0"/>
+              <a:t> </a:t>
+            </a:r>
+            <a:r>
+              <a:rPr lang="fi-FI" dirty="0" err="1"/>
+              <a:t>we</a:t>
+            </a:r>
+            <a:r>
+              <a:rPr lang="fi-FI" dirty="0"/>
+              <a:t> </a:t>
+            </a:r>
+            <a:r>
+              <a:rPr lang="fi-FI" dirty="0" err="1"/>
+              <a:t>use</a:t>
+            </a:r>
+            <a:r>
+              <a:rPr lang="fi-FI" dirty="0"/>
+              <a:t>:</a:t>
+            </a:r>
+          </a:p>
+          <a:p>
+            <a:pPr lvl="1"/>
+            <a:r>
+              <a:rPr lang="fi-FI" dirty="0"/>
+              <a:t>POST: </a:t>
+            </a:r>
+            <a:r>
+              <a:rPr lang="fi-FI" dirty="0" err="1"/>
+              <a:t>create</a:t>
+            </a:r>
+            <a:r>
+              <a:rPr lang="fi-FI" dirty="0"/>
+              <a:t> </a:t>
+            </a:r>
+            <a:r>
+              <a:rPr lang="fi-FI" dirty="0" err="1"/>
+              <a:t>new</a:t>
+            </a:r>
+            <a:r>
+              <a:rPr lang="fi-FI" dirty="0"/>
+              <a:t> </a:t>
+            </a:r>
+            <a:r>
+              <a:rPr lang="fi-FI" dirty="0" err="1"/>
+              <a:t>resource</a:t>
+            </a:r>
+            <a:r>
+              <a:rPr lang="fi-FI" dirty="0"/>
+              <a:t>(s) to </a:t>
             </a:r>
             <a:r>
               <a:rPr lang="fi-FI" dirty="0" err="1"/>
@@ -13140,200 +13216,269 @@
             </a:r>
             <a:r>
               <a:rPr lang="fi-FI" dirty="0"/>
-              <a:t> minimalistic URL </a:t>
-            </a:r>
-            <a:r>
-              <a:rPr lang="fi-FI" dirty="0" err="1"/>
-              <a:t>patterns</a:t>
-            </a:r>
-            <a:r>
-              <a:rPr lang="fi-FI" dirty="0"/>
-              <a:t>:</a:t>
+              <a:t> </a:t>
+            </a:r>
+            <a:r>
+              <a:rPr lang="fi-FI" dirty="0" err="1"/>
+              <a:t>backend</a:t>
+            </a:r>
+            <a:r>
+              <a:rPr lang="fi-FI" dirty="0"/>
+              <a:t> (in case of auto-</a:t>
+            </a:r>
+            <a:r>
+              <a:rPr lang="fi-FI" dirty="0" err="1"/>
+              <a:t>increment</a:t>
+            </a:r>
+            <a:r>
+              <a:rPr lang="fi-FI" dirty="0"/>
+              <a:t> id, id is </a:t>
+            </a:r>
+            <a:r>
+              <a:rPr lang="fi-FI" dirty="0" err="1"/>
+              <a:t>not</a:t>
+            </a:r>
+            <a:r>
+              <a:rPr lang="fi-FI" dirty="0"/>
+              <a:t> </a:t>
+            </a:r>
+            <a:r>
+              <a:rPr lang="fi-FI" dirty="0" err="1"/>
+              <a:t>provided</a:t>
+            </a:r>
+            <a:r>
+              <a:rPr lang="fi-FI" dirty="0"/>
+              <a:t> in </a:t>
+            </a:r>
+            <a:r>
+              <a:rPr lang="fi-FI" dirty="0" err="1"/>
+              <a:t>request</a:t>
+            </a:r>
+            <a:r>
+              <a:rPr lang="fi-FI" dirty="0"/>
+              <a:t>)</a:t>
             </a:r>
           </a:p>
           <a:p>
             <a:pPr lvl="1"/>
             <a:r>
               <a:rPr lang="fi-FI" dirty="0"/>
-              <a:t>GET /</a:t>
-            </a:r>
-            <a:r>
-              <a:rPr lang="fi-FI" dirty="0" err="1"/>
-              <a:t>product</a:t>
-            </a:r>
-            <a:r>
-              <a:rPr lang="fi-FI" dirty="0"/>
-              <a:t>                         =&gt; no id </a:t>
-            </a:r>
-            <a:r>
-              <a:rPr lang="fi-FI" dirty="0" err="1"/>
-              <a:t>or</a:t>
-            </a:r>
-            <a:r>
-              <a:rPr lang="fi-FI" dirty="0"/>
-              <a:t> </a:t>
-            </a:r>
-            <a:r>
-              <a:rPr lang="fi-FI" dirty="0" err="1"/>
-              <a:t>name</a:t>
-            </a:r>
-            <a:r>
-              <a:rPr lang="fi-FI" dirty="0"/>
-              <a:t> </a:t>
-            </a:r>
-            <a:r>
-              <a:rPr lang="fi-FI" dirty="0" err="1"/>
-              <a:t>given</a:t>
-            </a:r>
-            <a:r>
-              <a:rPr lang="fi-FI" dirty="0"/>
-              <a:t>, </a:t>
-            </a:r>
-            <a:r>
-              <a:rPr lang="fi-FI" dirty="0" err="1"/>
-              <a:t>thus</a:t>
-            </a:r>
-            <a:r>
-              <a:rPr lang="fi-FI" dirty="0"/>
-              <a:t>: </a:t>
-            </a:r>
-            <a:r>
-              <a:rPr lang="fi-FI" dirty="0" err="1"/>
-              <a:t>get</a:t>
-            </a:r>
-            <a:r>
-              <a:rPr lang="fi-FI" dirty="0"/>
-              <a:t> </a:t>
-            </a:r>
-            <a:r>
-              <a:rPr lang="fi-FI" u="sng" dirty="0" err="1"/>
-              <a:t>all</a:t>
-            </a:r>
-            <a:r>
-              <a:rPr lang="fi-FI" dirty="0"/>
-              <a:t> Products</a:t>
+              <a:t>PUT: </a:t>
+            </a:r>
+            <a:r>
+              <a:rPr lang="fi-FI" dirty="0" err="1"/>
+              <a:t>update</a:t>
+            </a:r>
+            <a:r>
+              <a:rPr lang="fi-FI" dirty="0"/>
+              <a:t> an </a:t>
+            </a:r>
+            <a:r>
+              <a:rPr lang="fi-FI" dirty="0" err="1"/>
+              <a:t>existing</a:t>
+            </a:r>
+            <a:r>
+              <a:rPr lang="fi-FI" dirty="0"/>
+              <a:t> </a:t>
+            </a:r>
+            <a:r>
+              <a:rPr lang="fi-FI" dirty="0" err="1"/>
+              <a:t>resource</a:t>
+            </a:r>
+            <a:r>
+              <a:rPr lang="fi-FI" dirty="0"/>
+              <a:t> </a:t>
+            </a:r>
+            <a:r>
+              <a:rPr lang="fi-FI" dirty="0" err="1"/>
+              <a:t>by</a:t>
+            </a:r>
+            <a:r>
+              <a:rPr lang="fi-FI" dirty="0"/>
+              <a:t> </a:t>
+            </a:r>
+            <a:r>
+              <a:rPr lang="fi-FI" dirty="0" err="1"/>
+              <a:t>replacing</a:t>
+            </a:r>
+            <a:r>
+              <a:rPr lang="fi-FI" dirty="0"/>
+              <a:t> it </a:t>
+            </a:r>
+            <a:r>
+              <a:rPr lang="fi-FI" dirty="0" err="1"/>
+              <a:t>with</a:t>
+            </a:r>
+            <a:r>
+              <a:rPr lang="fi-FI" dirty="0"/>
+              <a:t> </a:t>
+            </a:r>
+            <a:r>
+              <a:rPr lang="fi-FI" dirty="0" err="1"/>
+              <a:t>the</a:t>
+            </a:r>
+            <a:r>
+              <a:rPr lang="fi-FI" dirty="0"/>
+              <a:t> </a:t>
+            </a:r>
+            <a:r>
+              <a:rPr lang="fi-FI" dirty="0" err="1"/>
+              <a:t>new</a:t>
+            </a:r>
+            <a:r>
+              <a:rPr lang="fi-FI" dirty="0"/>
+              <a:t> version of it (</a:t>
+            </a:r>
+            <a:r>
+              <a:rPr lang="fi-FI" dirty="0" err="1"/>
+              <a:t>even</a:t>
+            </a:r>
+            <a:r>
+              <a:rPr lang="fi-FI" dirty="0"/>
+              <a:t> </a:t>
+            </a:r>
+            <a:r>
+              <a:rPr lang="fi-FI" dirty="0" err="1"/>
+              <a:t>with</a:t>
+            </a:r>
+            <a:r>
+              <a:rPr lang="fi-FI" dirty="0"/>
+              <a:t> auto-</a:t>
+            </a:r>
+            <a:r>
+              <a:rPr lang="fi-FI" dirty="0" err="1"/>
+              <a:t>increment</a:t>
+            </a:r>
+            <a:r>
+              <a:rPr lang="fi-FI" dirty="0"/>
+              <a:t> </a:t>
+            </a:r>
+            <a:r>
+              <a:rPr lang="fi-FI" dirty="0" err="1"/>
+              <a:t>ids</a:t>
+            </a:r>
+            <a:r>
+              <a:rPr lang="fi-FI" dirty="0"/>
+              <a:t>, id is </a:t>
+            </a:r>
+            <a:r>
+              <a:rPr lang="fi-FI" dirty="0" err="1"/>
+              <a:t>needed</a:t>
+            </a:r>
+            <a:r>
+              <a:rPr lang="fi-FI" dirty="0"/>
+              <a:t> and </a:t>
+            </a:r>
+            <a:r>
+              <a:rPr lang="fi-FI" dirty="0" err="1"/>
+              <a:t>provided</a:t>
+            </a:r>
+            <a:r>
+              <a:rPr lang="fi-FI" dirty="0"/>
+              <a:t> in </a:t>
+            </a:r>
+            <a:r>
+              <a:rPr lang="fi-FI" dirty="0" err="1"/>
+              <a:t>the</a:t>
+            </a:r>
+            <a:r>
+              <a:rPr lang="fi-FI" dirty="0"/>
+              <a:t> </a:t>
+            </a:r>
+            <a:r>
+              <a:rPr lang="fi-FI" dirty="0" err="1"/>
+              <a:t>request</a:t>
+            </a:r>
+            <a:r>
+              <a:rPr lang="fi-FI" dirty="0"/>
+              <a:t>, to </a:t>
+            </a:r>
+            <a:r>
+              <a:rPr lang="fi-FI" dirty="0" err="1"/>
+              <a:t>know</a:t>
+            </a:r>
+            <a:r>
+              <a:rPr lang="fi-FI" dirty="0"/>
+              <a:t> </a:t>
+            </a:r>
+            <a:r>
+              <a:rPr lang="fi-FI" dirty="0" err="1"/>
+              <a:t>which</a:t>
+            </a:r>
+            <a:r>
+              <a:rPr lang="fi-FI" dirty="0"/>
+              <a:t> </a:t>
+            </a:r>
+            <a:r>
+              <a:rPr lang="fi-FI" dirty="0" err="1"/>
+              <a:t>resource</a:t>
+            </a:r>
+            <a:r>
+              <a:rPr lang="fi-FI" dirty="0"/>
+              <a:t> to </a:t>
+            </a:r>
+            <a:r>
+              <a:rPr lang="fi-FI" dirty="0" err="1"/>
+              <a:t>update</a:t>
+            </a:r>
+            <a:r>
+              <a:rPr lang="fi-FI" dirty="0"/>
+              <a:t>)</a:t>
             </a:r>
           </a:p>
           <a:p>
             <a:pPr lvl="1"/>
             <a:r>
               <a:rPr lang="fi-FI" dirty="0"/>
-              <a:t>GET /</a:t>
-            </a:r>
-            <a:r>
-              <a:rPr lang="fi-FI" dirty="0" err="1"/>
-              <a:t>product</a:t>
-            </a:r>
-            <a:r>
-              <a:rPr lang="fi-FI" dirty="0"/>
-              <a:t>/:id                   =&gt; </a:t>
-            </a:r>
-            <a:r>
-              <a:rPr lang="fi-FI" dirty="0" err="1"/>
-              <a:t>now</a:t>
-            </a:r>
-            <a:r>
-              <a:rPr lang="fi-FI" dirty="0"/>
-              <a:t> id </a:t>
-            </a:r>
-            <a:r>
-              <a:rPr lang="fi-FI" dirty="0" err="1"/>
-              <a:t>given</a:t>
-            </a:r>
-            <a:r>
-              <a:rPr lang="fi-FI" dirty="0"/>
-              <a:t>, </a:t>
-            </a:r>
-            <a:r>
-              <a:rPr lang="fi-FI" dirty="0" err="1"/>
-              <a:t>thus</a:t>
-            </a:r>
-            <a:r>
-              <a:rPr lang="fi-FI" dirty="0"/>
-              <a:t> </a:t>
-            </a:r>
-            <a:r>
-              <a:rPr lang="fi-FI" dirty="0" err="1"/>
-              <a:t>get</a:t>
-            </a:r>
-            <a:r>
-              <a:rPr lang="fi-FI" dirty="0"/>
-              <a:t> </a:t>
-            </a:r>
-            <a:r>
-              <a:rPr lang="fi-FI" dirty="0" err="1"/>
-              <a:t>one</a:t>
-            </a:r>
-            <a:r>
-              <a:rPr lang="fi-FI" dirty="0"/>
-              <a:t> </a:t>
-            </a:r>
-            <a:r>
-              <a:rPr lang="fi-FI" dirty="0" err="1"/>
-              <a:t>product</a:t>
-            </a:r>
-            <a:r>
-              <a:rPr lang="fi-FI" dirty="0"/>
-              <a:t> </a:t>
-            </a:r>
-            <a:r>
-              <a:rPr lang="fi-FI" dirty="0" err="1"/>
-              <a:t>by</a:t>
-            </a:r>
-            <a:r>
-              <a:rPr lang="fi-FI" dirty="0"/>
-              <a:t> id</a:t>
-            </a:r>
+              <a:t>GET: </a:t>
+            </a:r>
+            <a:r>
+              <a:rPr lang="fi-FI" dirty="0" err="1"/>
+              <a:t>fetch</a:t>
+            </a:r>
+            <a:r>
+              <a:rPr lang="fi-FI" dirty="0"/>
+              <a:t> </a:t>
+            </a:r>
+            <a:r>
+              <a:rPr lang="fi-FI" dirty="0" err="1"/>
+              <a:t>the</a:t>
+            </a:r>
+            <a:r>
+              <a:rPr lang="fi-FI" dirty="0"/>
+              <a:t> </a:t>
+            </a:r>
+            <a:r>
+              <a:rPr lang="fi-FI" dirty="0" err="1"/>
+              <a:t>resource</a:t>
+            </a:r>
+            <a:r>
+              <a:rPr lang="fi-FI" dirty="0"/>
+              <a:t>(s) </a:t>
+            </a:r>
+            <a:r>
+              <a:rPr lang="fi-FI" dirty="0" err="1"/>
+              <a:t>from</a:t>
+            </a:r>
+            <a:r>
+              <a:rPr lang="fi-FI" dirty="0"/>
+              <a:t> </a:t>
+            </a:r>
+            <a:r>
+              <a:rPr lang="fi-FI" dirty="0" err="1"/>
+              <a:t>backend</a:t>
+            </a:r>
+            <a:endParaRPr lang="fi-FI" dirty="0"/>
           </a:p>
           <a:p>
             <a:pPr lvl="1"/>
             <a:r>
               <a:rPr lang="fi-FI" dirty="0"/>
-              <a:t>DELETE /</a:t>
-            </a:r>
-            <a:r>
-              <a:rPr lang="fi-FI" dirty="0" err="1"/>
-              <a:t>product</a:t>
-            </a:r>
-            <a:r>
-              <a:rPr lang="fi-FI" dirty="0"/>
-              <a:t>/:id             =&gt; </a:t>
-            </a:r>
-            <a:r>
-              <a:rPr lang="fi-FI" dirty="0" err="1"/>
-              <a:t>notice</a:t>
-            </a:r>
-            <a:r>
-              <a:rPr lang="fi-FI" dirty="0"/>
-              <a:t> </a:t>
-            </a:r>
-            <a:r>
-              <a:rPr lang="fi-FI" dirty="0" err="1"/>
-              <a:t>how</a:t>
-            </a:r>
-            <a:r>
-              <a:rPr lang="fi-FI" dirty="0"/>
-              <a:t> URL </a:t>
-            </a:r>
-            <a:r>
-              <a:rPr lang="fi-FI" dirty="0" err="1"/>
-              <a:t>pattern</a:t>
-            </a:r>
-            <a:r>
-              <a:rPr lang="fi-FI" dirty="0"/>
-              <a:t> is 100% </a:t>
-            </a:r>
-            <a:r>
-              <a:rPr lang="fi-FI" dirty="0" err="1"/>
-              <a:t>same</a:t>
-            </a:r>
-            <a:r>
-              <a:rPr lang="fi-FI" dirty="0"/>
-              <a:t> as for GET. </a:t>
-            </a:r>
-            <a:r>
-              <a:rPr lang="fi-FI" dirty="0" err="1"/>
-              <a:t>Thus</a:t>
+              <a:t>DELETE: </a:t>
+            </a:r>
+            <a:r>
+              <a:rPr lang="fi-FI" dirty="0" err="1"/>
+              <a:t>delete</a:t>
             </a:r>
             <a:r>
               <a:rPr lang="fi-FI" dirty="0"/>
@@ -13345,657 +13490,32 @@
             </a:r>
             <a:r>
               <a:rPr lang="fi-FI" dirty="0"/>
-              <a:t> http </a:t>
-            </a:r>
-            <a:r>
-              <a:rPr lang="fi-FI" dirty="0" err="1"/>
-              <a:t>method</a:t>
-            </a:r>
-            <a:r>
-              <a:rPr lang="fi-FI" dirty="0"/>
-              <a:t> is </a:t>
-            </a:r>
-            <a:r>
-              <a:rPr lang="fi-FI" dirty="0" err="1"/>
-              <a:t>important</a:t>
-            </a:r>
-            <a:r>
-              <a:rPr lang="fi-FI" dirty="0"/>
-              <a:t> </a:t>
-            </a:r>
-            <a:r>
-              <a:rPr lang="fi-FI" dirty="0" err="1"/>
-              <a:t>part</a:t>
-            </a:r>
-            <a:r>
-              <a:rPr lang="fi-FI" dirty="0"/>
-              <a:t> of </a:t>
-            </a:r>
-            <a:r>
-              <a:rPr lang="fi-FI" dirty="0" err="1"/>
-              <a:t>the</a:t>
-            </a:r>
-            <a:r>
-              <a:rPr lang="fi-FI" dirty="0"/>
-              <a:t> </a:t>
-            </a:r>
-            <a:r>
-              <a:rPr lang="fi-FI" dirty="0" err="1"/>
-              <a:t>routing</a:t>
-            </a:r>
-            <a:r>
-              <a:rPr lang="fi-FI" dirty="0"/>
-              <a:t>.</a:t>
-            </a:r>
+              <a:t> </a:t>
+            </a:r>
+            <a:r>
+              <a:rPr lang="fi-FI" dirty="0" err="1"/>
+              <a:t>resource</a:t>
+            </a:r>
+            <a:r>
+              <a:rPr lang="fi-FI" dirty="0"/>
+              <a:t>(s) </a:t>
+            </a:r>
+            <a:r>
+              <a:rPr lang="fi-FI" dirty="0" err="1"/>
+              <a:t>from</a:t>
+            </a:r>
+            <a:r>
+              <a:rPr lang="fi-FI" dirty="0"/>
+              <a:t> </a:t>
+            </a:r>
+            <a:r>
+              <a:rPr lang="fi-FI" dirty="0" err="1"/>
+              <a:t>backend</a:t>
+            </a:r>
+            <a:endParaRPr lang="fi-FI" dirty="0"/>
           </a:p>
           <a:p>
             <a:pPr lvl="1"/>
-            <a:r>
-              <a:rPr lang="fi-FI" dirty="0"/>
-              <a:t>GET /</a:t>
-            </a:r>
-            <a:r>
-              <a:rPr lang="fi-FI" dirty="0" err="1"/>
-              <a:t>product</a:t>
-            </a:r>
-            <a:r>
-              <a:rPr lang="fi-FI" dirty="0"/>
-              <a:t>/</a:t>
-            </a:r>
-            <a:r>
-              <a:rPr lang="fi-FI" dirty="0" err="1"/>
-              <a:t>cheaperThan</a:t>
-            </a:r>
-            <a:r>
-              <a:rPr lang="fi-FI" dirty="0"/>
-              <a:t>/:</a:t>
-            </a:r>
-            <a:r>
-              <a:rPr lang="fi-FI" dirty="0" err="1"/>
-              <a:t>price</a:t>
-            </a:r>
-            <a:r>
-              <a:rPr lang="fi-FI" dirty="0"/>
-              <a:t>    =&gt; </a:t>
-            </a:r>
-            <a:r>
-              <a:rPr lang="fi-FI" dirty="0" err="1"/>
-              <a:t>you</a:t>
-            </a:r>
-            <a:r>
-              <a:rPr lang="fi-FI" dirty="0"/>
-              <a:t> </a:t>
-            </a:r>
-            <a:r>
-              <a:rPr lang="fi-FI" dirty="0" err="1"/>
-              <a:t>can</a:t>
-            </a:r>
-            <a:r>
-              <a:rPr lang="fi-FI" dirty="0"/>
-              <a:t> </a:t>
-            </a:r>
-            <a:r>
-              <a:rPr lang="fi-FI" dirty="0" err="1"/>
-              <a:t>build</a:t>
-            </a:r>
-            <a:r>
-              <a:rPr lang="fi-FI" dirty="0"/>
-              <a:t> </a:t>
-            </a:r>
-            <a:r>
-              <a:rPr lang="fi-FI" dirty="0" err="1"/>
-              <a:t>endless</a:t>
-            </a:r>
-            <a:r>
-              <a:rPr lang="fi-FI" dirty="0"/>
-              <a:t> </a:t>
-            </a:r>
-            <a:r>
-              <a:rPr lang="fi-FI" dirty="0" err="1"/>
-              <a:t>special</a:t>
-            </a:r>
-            <a:r>
-              <a:rPr lang="fi-FI" dirty="0"/>
-              <a:t> </a:t>
-            </a:r>
-            <a:r>
-              <a:rPr lang="fi-FI" dirty="0" err="1"/>
-              <a:t>URLs</a:t>
-            </a:r>
-            <a:r>
-              <a:rPr lang="fi-FI" dirty="0"/>
-              <a:t> </a:t>
-            </a:r>
-            <a:r>
-              <a:rPr lang="fi-FI" dirty="0" err="1"/>
-              <a:t>too</a:t>
-            </a:r>
-            <a:r>
-              <a:rPr lang="fi-FI" dirty="0"/>
-              <a:t>.	</a:t>
-            </a:r>
-          </a:p>
-          <a:p>
-            <a:r>
-              <a:rPr lang="fi-FI" dirty="0"/>
-              <a:t>HTTP </a:t>
-            </a:r>
-            <a:r>
-              <a:rPr lang="fi-FI" dirty="0" err="1"/>
-              <a:t>Methods</a:t>
-            </a:r>
-            <a:r>
-              <a:rPr lang="fi-FI" dirty="0"/>
-              <a:t> </a:t>
-            </a:r>
-            <a:r>
-              <a:rPr lang="fi-FI" dirty="0" err="1"/>
-              <a:t>we</a:t>
-            </a:r>
-            <a:r>
-              <a:rPr lang="fi-FI" dirty="0"/>
-              <a:t> </a:t>
-            </a:r>
-            <a:r>
-              <a:rPr lang="fi-FI" dirty="0" err="1"/>
-              <a:t>use</a:t>
-            </a:r>
-            <a:r>
-              <a:rPr lang="fi-FI" dirty="0"/>
-              <a:t>:</a:t>
-            </a:r>
-          </a:p>
-          <a:p>
-            <a:pPr lvl="1"/>
-            <a:r>
-              <a:rPr lang="fi-FI" dirty="0"/>
-              <a:t>POST: </a:t>
-            </a:r>
-            <a:r>
-              <a:rPr lang="fi-FI" dirty="0" err="1"/>
-              <a:t>create</a:t>
-            </a:r>
-            <a:r>
-              <a:rPr lang="fi-FI" dirty="0"/>
-              <a:t> </a:t>
-            </a:r>
-            <a:r>
-              <a:rPr lang="fi-FI" dirty="0" err="1"/>
-              <a:t>new</a:t>
-            </a:r>
-            <a:r>
-              <a:rPr lang="fi-FI" dirty="0"/>
-              <a:t> </a:t>
-            </a:r>
-            <a:r>
-              <a:rPr lang="fi-FI" dirty="0" err="1"/>
-              <a:t>resource</a:t>
-            </a:r>
-            <a:r>
-              <a:rPr lang="fi-FI" dirty="0"/>
-              <a:t>(s) to </a:t>
-            </a:r>
-            <a:r>
-              <a:rPr lang="fi-FI" dirty="0" err="1"/>
-              <a:t>the</a:t>
-            </a:r>
-            <a:r>
-              <a:rPr lang="fi-FI" dirty="0"/>
-              <a:t> </a:t>
-            </a:r>
-            <a:r>
-              <a:rPr lang="fi-FI" dirty="0" err="1"/>
-              <a:t>backend</a:t>
-            </a:r>
-            <a:r>
-              <a:rPr lang="fi-FI" dirty="0"/>
-              <a:t> (in case of auto-</a:t>
-            </a:r>
-            <a:r>
-              <a:rPr lang="fi-FI" dirty="0" err="1"/>
-              <a:t>increment</a:t>
-            </a:r>
-            <a:r>
-              <a:rPr lang="fi-FI" dirty="0"/>
-              <a:t> id, id is </a:t>
-            </a:r>
-            <a:r>
-              <a:rPr lang="fi-FI" dirty="0" err="1"/>
-              <a:t>not</a:t>
-            </a:r>
-            <a:r>
-              <a:rPr lang="fi-FI" dirty="0"/>
-              <a:t> </a:t>
-            </a:r>
-            <a:r>
-              <a:rPr lang="fi-FI" dirty="0" err="1"/>
-              <a:t>provided</a:t>
-            </a:r>
-            <a:r>
-              <a:rPr lang="fi-FI" dirty="0"/>
-              <a:t> in </a:t>
-            </a:r>
-            <a:r>
-              <a:rPr lang="fi-FI" dirty="0" err="1"/>
-              <a:t>request</a:t>
-            </a:r>
-            <a:r>
-              <a:rPr lang="fi-FI" dirty="0"/>
-              <a:t>)</a:t>
-            </a:r>
-          </a:p>
-          <a:p>
-            <a:pPr lvl="1"/>
-            <a:r>
-              <a:rPr lang="fi-FI" dirty="0"/>
-              <a:t>PUT: </a:t>
-            </a:r>
-            <a:r>
-              <a:rPr lang="fi-FI" dirty="0" err="1"/>
-              <a:t>update</a:t>
-            </a:r>
-            <a:r>
-              <a:rPr lang="fi-FI" dirty="0"/>
-              <a:t> an </a:t>
-            </a:r>
-            <a:r>
-              <a:rPr lang="fi-FI" dirty="0" err="1"/>
-              <a:t>existing</a:t>
-            </a:r>
-            <a:r>
-              <a:rPr lang="fi-FI" dirty="0"/>
-              <a:t> </a:t>
-            </a:r>
-            <a:r>
-              <a:rPr lang="fi-FI" dirty="0" err="1"/>
-              <a:t>resource</a:t>
-            </a:r>
-            <a:r>
-              <a:rPr lang="fi-FI" dirty="0"/>
-              <a:t> </a:t>
-            </a:r>
-            <a:r>
-              <a:rPr lang="fi-FI" dirty="0" err="1"/>
-              <a:t>by</a:t>
-            </a:r>
-            <a:r>
-              <a:rPr lang="fi-FI" dirty="0"/>
-              <a:t> </a:t>
-            </a:r>
-            <a:r>
-              <a:rPr lang="fi-FI" dirty="0" err="1"/>
-              <a:t>replacing</a:t>
-            </a:r>
-            <a:r>
-              <a:rPr lang="fi-FI" dirty="0"/>
-              <a:t> it </a:t>
-            </a:r>
-            <a:r>
-              <a:rPr lang="fi-FI" dirty="0" err="1"/>
-              <a:t>with</a:t>
-            </a:r>
-            <a:r>
-              <a:rPr lang="fi-FI" dirty="0"/>
-              <a:t> </a:t>
-            </a:r>
-            <a:r>
-              <a:rPr lang="fi-FI" dirty="0" err="1"/>
-              <a:t>the</a:t>
-            </a:r>
-            <a:r>
-              <a:rPr lang="fi-FI" dirty="0"/>
-              <a:t> </a:t>
-            </a:r>
-            <a:r>
-              <a:rPr lang="fi-FI" dirty="0" err="1"/>
-              <a:t>new</a:t>
-            </a:r>
-            <a:r>
-              <a:rPr lang="fi-FI" dirty="0"/>
-              <a:t> version of it (</a:t>
-            </a:r>
-            <a:r>
-              <a:rPr lang="fi-FI" dirty="0" err="1"/>
-              <a:t>even</a:t>
-            </a:r>
-            <a:r>
-              <a:rPr lang="fi-FI" dirty="0"/>
-              <a:t> </a:t>
-            </a:r>
-            <a:r>
-              <a:rPr lang="fi-FI" dirty="0" err="1"/>
-              <a:t>with</a:t>
-            </a:r>
-            <a:r>
-              <a:rPr lang="fi-FI" dirty="0"/>
-              <a:t> auto-</a:t>
-            </a:r>
-            <a:r>
-              <a:rPr lang="fi-FI" dirty="0" err="1"/>
-              <a:t>increment</a:t>
-            </a:r>
-            <a:r>
-              <a:rPr lang="fi-FI" dirty="0"/>
-              <a:t> </a:t>
-            </a:r>
-            <a:r>
-              <a:rPr lang="fi-FI" dirty="0" err="1"/>
-              <a:t>ids</a:t>
-            </a:r>
-            <a:r>
-              <a:rPr lang="fi-FI" dirty="0"/>
-              <a:t>, id is </a:t>
-            </a:r>
-            <a:r>
-              <a:rPr lang="fi-FI" dirty="0" err="1"/>
-              <a:t>needed</a:t>
-            </a:r>
-            <a:r>
-              <a:rPr lang="fi-FI" dirty="0"/>
-              <a:t> and </a:t>
-            </a:r>
-            <a:r>
-              <a:rPr lang="fi-FI" dirty="0" err="1"/>
-              <a:t>provided</a:t>
-            </a:r>
-            <a:r>
-              <a:rPr lang="fi-FI" dirty="0"/>
-              <a:t> in </a:t>
-            </a:r>
-            <a:r>
-              <a:rPr lang="fi-FI" dirty="0" err="1"/>
-              <a:t>the</a:t>
-            </a:r>
-            <a:r>
-              <a:rPr lang="fi-FI" dirty="0"/>
-              <a:t> </a:t>
-            </a:r>
-            <a:r>
-              <a:rPr lang="fi-FI" dirty="0" err="1"/>
-              <a:t>request</a:t>
-            </a:r>
-            <a:r>
-              <a:rPr lang="fi-FI" dirty="0"/>
-              <a:t>, to </a:t>
-            </a:r>
-            <a:r>
-              <a:rPr lang="fi-FI" dirty="0" err="1"/>
-              <a:t>know</a:t>
-            </a:r>
-            <a:r>
-              <a:rPr lang="fi-FI" dirty="0"/>
-              <a:t> </a:t>
-            </a:r>
-            <a:r>
-              <a:rPr lang="fi-FI" dirty="0" err="1"/>
-              <a:t>which</a:t>
-            </a:r>
-            <a:r>
-              <a:rPr lang="fi-FI" dirty="0"/>
-              <a:t> </a:t>
-            </a:r>
-            <a:r>
-              <a:rPr lang="fi-FI" dirty="0" err="1"/>
-              <a:t>resource</a:t>
-            </a:r>
-            <a:r>
-              <a:rPr lang="fi-FI" dirty="0"/>
-              <a:t> to </a:t>
-            </a:r>
-            <a:r>
-              <a:rPr lang="fi-FI" dirty="0" err="1"/>
-              <a:t>update</a:t>
-            </a:r>
-            <a:r>
-              <a:rPr lang="fi-FI" dirty="0"/>
-              <a:t>)</a:t>
-            </a:r>
-          </a:p>
-          <a:p>
-            <a:pPr lvl="1"/>
-            <a:r>
-              <a:rPr lang="fi-FI" dirty="0"/>
-              <a:t>GET: </a:t>
-            </a:r>
-            <a:r>
-              <a:rPr lang="fi-FI" dirty="0" err="1"/>
-              <a:t>fetch</a:t>
-            </a:r>
-            <a:r>
-              <a:rPr lang="fi-FI" dirty="0"/>
-              <a:t> </a:t>
-            </a:r>
-            <a:r>
-              <a:rPr lang="fi-FI" dirty="0" err="1"/>
-              <a:t>the</a:t>
-            </a:r>
-            <a:r>
-              <a:rPr lang="fi-FI" dirty="0"/>
-              <a:t> </a:t>
-            </a:r>
-            <a:r>
-              <a:rPr lang="fi-FI" dirty="0" err="1"/>
-              <a:t>resource</a:t>
-            </a:r>
-            <a:r>
-              <a:rPr lang="fi-FI" dirty="0"/>
-              <a:t>(s) </a:t>
-            </a:r>
-            <a:r>
-              <a:rPr lang="fi-FI" dirty="0" err="1"/>
-              <a:t>from</a:t>
-            </a:r>
-            <a:r>
-              <a:rPr lang="fi-FI" dirty="0"/>
-              <a:t> </a:t>
-            </a:r>
-            <a:r>
-              <a:rPr lang="fi-FI" dirty="0" err="1"/>
-              <a:t>backend</a:t>
-            </a:r>
-            <a:endParaRPr lang="fi-FI" dirty="0"/>
-          </a:p>
-          <a:p>
-            <a:pPr lvl="1"/>
-            <a:r>
-              <a:rPr lang="fi-FI" dirty="0"/>
-              <a:t>DELETE: </a:t>
-            </a:r>
-            <a:r>
-              <a:rPr lang="fi-FI" dirty="0" err="1"/>
-              <a:t>delete</a:t>
-            </a:r>
-            <a:r>
-              <a:rPr lang="fi-FI" dirty="0"/>
-              <a:t> </a:t>
-            </a:r>
-            <a:r>
-              <a:rPr lang="fi-FI" dirty="0" err="1"/>
-              <a:t>the</a:t>
-            </a:r>
-            <a:r>
-              <a:rPr lang="fi-FI" dirty="0"/>
-              <a:t> </a:t>
-            </a:r>
-            <a:r>
-              <a:rPr lang="fi-FI" dirty="0" err="1"/>
-              <a:t>resource</a:t>
-            </a:r>
-            <a:r>
-              <a:rPr lang="fi-FI" dirty="0"/>
-              <a:t>(s) </a:t>
-            </a:r>
-            <a:r>
-              <a:rPr lang="fi-FI" dirty="0" err="1"/>
-              <a:t>from</a:t>
-            </a:r>
-            <a:r>
-              <a:rPr lang="fi-FI" dirty="0"/>
-              <a:t> </a:t>
-            </a:r>
-            <a:r>
-              <a:rPr lang="fi-FI" dirty="0" err="1"/>
-              <a:t>backend</a:t>
-            </a:r>
-            <a:endParaRPr lang="fi-FI" sz="1300" dirty="0"/>
-          </a:p>
-          <a:p>
-            <a:r>
-              <a:rPr lang="fi-FI" sz="1500" dirty="0" err="1"/>
-              <a:t>Use</a:t>
-            </a:r>
-            <a:r>
-              <a:rPr lang="fi-FI" sz="1500" dirty="0"/>
-              <a:t> some </a:t>
-            </a:r>
-            <a:r>
-              <a:rPr lang="fi-FI" sz="1500" dirty="0" err="1"/>
-              <a:t>tool</a:t>
-            </a:r>
-            <a:r>
-              <a:rPr lang="fi-FI" sz="1500" dirty="0"/>
-              <a:t> to </a:t>
-            </a:r>
-            <a:r>
-              <a:rPr lang="fi-FI" sz="1500" dirty="0" err="1"/>
-              <a:t>test</a:t>
-            </a:r>
-            <a:r>
-              <a:rPr lang="fi-FI" sz="1500" dirty="0"/>
-              <a:t> </a:t>
-            </a:r>
-            <a:r>
-              <a:rPr lang="fi-FI" sz="1500" dirty="0" err="1"/>
-              <a:t>your</a:t>
-            </a:r>
-            <a:r>
-              <a:rPr lang="fi-FI" sz="1500" dirty="0"/>
-              <a:t> </a:t>
-            </a:r>
-            <a:r>
-              <a:rPr lang="fi-FI" sz="1500" dirty="0" err="1"/>
-              <a:t>endpoints</a:t>
-            </a:r>
-            <a:r>
-              <a:rPr lang="fi-FI" sz="1500" dirty="0"/>
-              <a:t> </a:t>
-            </a:r>
-            <a:r>
-              <a:rPr lang="fi-FI" sz="1500" dirty="0" err="1"/>
-              <a:t>constantly</a:t>
-            </a:r>
-            <a:r>
-              <a:rPr lang="fi-FI" sz="1500" dirty="0"/>
-              <a:t>. </a:t>
-            </a:r>
-            <a:r>
-              <a:rPr lang="fi-FI" sz="1500" dirty="0" err="1"/>
-              <a:t>Also</a:t>
-            </a:r>
-            <a:r>
-              <a:rPr lang="fi-FI" sz="1500" dirty="0"/>
-              <a:t> </a:t>
-            </a:r>
-            <a:r>
-              <a:rPr lang="fi-FI" sz="1500" dirty="0" err="1"/>
-              <a:t>after</a:t>
-            </a:r>
-            <a:r>
-              <a:rPr lang="fi-FI" sz="1500" dirty="0"/>
-              <a:t> </a:t>
-            </a:r>
-            <a:r>
-              <a:rPr lang="fi-FI" sz="1500" dirty="0" err="1"/>
-              <a:t>you</a:t>
-            </a:r>
-            <a:r>
-              <a:rPr lang="fi-FI" sz="1500" dirty="0"/>
-              <a:t> </a:t>
-            </a:r>
-            <a:r>
-              <a:rPr lang="fi-FI" sz="1500" dirty="0" err="1"/>
-              <a:t>are</a:t>
-            </a:r>
-            <a:r>
-              <a:rPr lang="fi-FI" sz="1500" dirty="0"/>
-              <a:t> ’</a:t>
-            </a:r>
-            <a:r>
-              <a:rPr lang="fi-FI" sz="1500" dirty="0" err="1"/>
-              <a:t>done</a:t>
-            </a:r>
-            <a:r>
-              <a:rPr lang="fi-FI" sz="1500" dirty="0"/>
-              <a:t> </a:t>
-            </a:r>
-            <a:r>
-              <a:rPr lang="fi-FI" sz="1500" dirty="0" err="1"/>
-              <a:t>with</a:t>
-            </a:r>
-            <a:r>
-              <a:rPr lang="fi-FI" sz="1500" dirty="0"/>
-              <a:t> </a:t>
-            </a:r>
-            <a:r>
-              <a:rPr lang="fi-FI" sz="1500" dirty="0" err="1"/>
-              <a:t>backend</a:t>
-            </a:r>
-            <a:r>
-              <a:rPr lang="fi-FI" sz="1500" dirty="0"/>
-              <a:t>’ and </a:t>
-            </a:r>
-            <a:r>
-              <a:rPr lang="fi-FI" sz="1500" dirty="0" err="1"/>
-              <a:t>doing</a:t>
-            </a:r>
-            <a:r>
-              <a:rPr lang="fi-FI" sz="1500" dirty="0"/>
-              <a:t> </a:t>
-            </a:r>
-            <a:r>
-              <a:rPr lang="fi-FI" sz="1500" dirty="0" err="1"/>
-              <a:t>frontend</a:t>
-            </a:r>
-            <a:r>
-              <a:rPr lang="fi-FI" sz="1500" dirty="0"/>
-              <a:t> </a:t>
-            </a:r>
-            <a:r>
-              <a:rPr lang="fi-FI" sz="1500" dirty="0" err="1"/>
-              <a:t>development</a:t>
-            </a:r>
-            <a:r>
-              <a:rPr lang="fi-FI" sz="1500" dirty="0"/>
-              <a:t>. </a:t>
-            </a:r>
-            <a:r>
-              <a:rPr lang="fi-FI" sz="1500" dirty="0" err="1"/>
-              <a:t>Postman</a:t>
-            </a:r>
-            <a:r>
-              <a:rPr lang="fi-FI" sz="1500" dirty="0"/>
-              <a:t> </a:t>
-            </a:r>
-            <a:r>
-              <a:rPr lang="fi-FI" sz="1500" dirty="0" err="1"/>
-              <a:t>or</a:t>
-            </a:r>
-            <a:r>
-              <a:rPr lang="fi-FI" sz="1500" dirty="0"/>
-              <a:t> VS </a:t>
-            </a:r>
-            <a:r>
-              <a:rPr lang="fi-FI" sz="1500" dirty="0" err="1"/>
-              <a:t>Code</a:t>
-            </a:r>
-            <a:r>
-              <a:rPr lang="fi-FI" sz="1500" dirty="0"/>
-              <a:t> REST </a:t>
-            </a:r>
-            <a:r>
-              <a:rPr lang="fi-FI" sz="1500" dirty="0" err="1"/>
-              <a:t>client</a:t>
-            </a:r>
             <a:endParaRPr lang="fi-FI" sz="1500" dirty="0"/>
           </a:p>
         </p:txBody>
@@ -14023,7 +13543,7 @@
           <a:p>
             <a:fld id="{202E1EC2-47B8-044B-A09E-6A63B4D80C87}" type="datetime1">
               <a:rPr lang="fi-FI" smtClean="0"/>
-              <a:t>10.2.2023</a:t>
+              <a:t>3.4.2023</a:t>
             </a:fld>
             <a:endParaRPr lang="en-GB"/>
           </a:p>
@@ -14078,6 +13598,947 @@
             <a:fld id="{76BAB7ED-EDE9-4D4B-9A2D-30E18C47C16E}" type="slidenum">
               <a:rPr lang="en-GB" smtClean="0"/>
               <a:t>8</a:t>
+            </a:fld>
+            <a:endParaRPr lang="en-GB"/>
+          </a:p>
+        </p:txBody>
+      </p:sp>
+    </p:spTree>
+    <p:extLst>
+      <p:ext uri="{BB962C8B-B14F-4D97-AF65-F5344CB8AC3E}">
+        <p14:creationId xmlns:p14="http://schemas.microsoft.com/office/powerpoint/2010/main" val="2080085866"/>
+      </p:ext>
+    </p:extLst>
+  </p:cSld>
+  <p:clrMapOvr>
+    <a:masterClrMapping/>
+  </p:clrMapOvr>
+</p:sld>
+</file>
+
+<file path=ppt/slides/slide9.xml><?xml version="1.0" encoding="utf-8"?>
+<p:sld xmlns:a="http://schemas.openxmlformats.org/drawingml/2006/main" xmlns:r="http://schemas.openxmlformats.org/officeDocument/2006/relationships" xmlns:p="http://schemas.openxmlformats.org/presentationml/2006/main">
+  <p:cSld>
+    <p:spTree>
+      <p:nvGrpSpPr>
+        <p:cNvPr id="1" name=""/>
+        <p:cNvGrpSpPr/>
+        <p:nvPr/>
+      </p:nvGrpSpPr>
+      <p:grpSpPr>
+        <a:xfrm>
+          <a:off x="0" y="0"/>
+          <a:ext cx="0" cy="0"/>
+          <a:chOff x="0" y="0"/>
+          <a:chExt cx="0" cy="0"/>
+        </a:xfrm>
+      </p:grpSpPr>
+      <p:sp>
+        <p:nvSpPr>
+          <p:cNvPr id="8" name="Title 7">
+            <a:extLst>
+              <a:ext uri="{FF2B5EF4-FFF2-40B4-BE49-F238E27FC236}">
+                <a16:creationId xmlns:a16="http://schemas.microsoft.com/office/drawing/2014/main" id="{197044C3-CD23-D844-B780-26FABA91AD0F}"/>
+              </a:ext>
+            </a:extLst>
+          </p:cNvPr>
+          <p:cNvSpPr>
+            <a:spLocks noGrp="1"/>
+          </p:cNvSpPr>
+          <p:nvPr>
+            <p:ph type="title"/>
+          </p:nvPr>
+        </p:nvSpPr>
+        <p:spPr>
+          <a:xfrm>
+            <a:off x="550863" y="549276"/>
+            <a:ext cx="11125200" cy="610054"/>
+          </a:xfrm>
+        </p:spPr>
+        <p:txBody>
+          <a:bodyPr>
+            <a:normAutofit/>
+          </a:bodyPr>
+          <a:lstStyle/>
+          <a:p>
+            <a:r>
+              <a:rPr lang="fi-FI" dirty="0"/>
+              <a:t>REST API </a:t>
+            </a:r>
+            <a:r>
+              <a:rPr lang="fi-FI" dirty="0" err="1"/>
+              <a:t>endpoints</a:t>
+            </a:r>
+            <a:r>
+              <a:rPr lang="fi-FI" dirty="0"/>
+              <a:t> – </a:t>
+            </a:r>
+            <a:r>
+              <a:rPr lang="fi-FI" dirty="0" err="1"/>
+              <a:t>Use</a:t>
+            </a:r>
+            <a:r>
+              <a:rPr lang="fi-FI" dirty="0"/>
+              <a:t> </a:t>
+            </a:r>
+            <a:r>
+              <a:rPr lang="fi-FI" dirty="0" err="1"/>
+              <a:t>the</a:t>
+            </a:r>
+            <a:r>
+              <a:rPr lang="fi-FI" dirty="0"/>
+              <a:t> minimalistic </a:t>
+            </a:r>
+            <a:r>
+              <a:rPr lang="fi-FI" dirty="0" err="1"/>
+              <a:t>URLs</a:t>
+            </a:r>
+            <a:endParaRPr lang="fi-FI" dirty="0"/>
+          </a:p>
+        </p:txBody>
+      </p:sp>
+      <p:sp>
+        <p:nvSpPr>
+          <p:cNvPr id="9" name="Content Placeholder 8">
+            <a:extLst>
+              <a:ext uri="{FF2B5EF4-FFF2-40B4-BE49-F238E27FC236}">
+                <a16:creationId xmlns:a16="http://schemas.microsoft.com/office/drawing/2014/main" id="{ACDE61D8-A75A-F94B-B57A-46F276C03311}"/>
+              </a:ext>
+            </a:extLst>
+          </p:cNvPr>
+          <p:cNvSpPr>
+            <a:spLocks noGrp="1"/>
+          </p:cNvSpPr>
+          <p:nvPr>
+            <p:ph sz="half" idx="2"/>
+          </p:nvPr>
+        </p:nvSpPr>
+        <p:spPr>
+          <a:xfrm>
+            <a:off x="550864" y="1159329"/>
+            <a:ext cx="11336336" cy="4996542"/>
+          </a:xfrm>
+        </p:spPr>
+        <p:txBody>
+          <a:bodyPr>
+            <a:noAutofit/>
+          </a:bodyPr>
+          <a:lstStyle/>
+          <a:p>
+            <a:r>
+              <a:rPr lang="fi-FI" dirty="0" err="1"/>
+              <a:t>Use</a:t>
+            </a:r>
+            <a:r>
+              <a:rPr lang="fi-FI" dirty="0"/>
+              <a:t> </a:t>
+            </a:r>
+            <a:r>
+              <a:rPr lang="fi-FI" dirty="0" err="1"/>
+              <a:t>these</a:t>
+            </a:r>
+            <a:r>
+              <a:rPr lang="fi-FI" dirty="0"/>
+              <a:t> 5 minimalistic URL </a:t>
+            </a:r>
+            <a:r>
+              <a:rPr lang="fi-FI" dirty="0" err="1"/>
+              <a:t>patterns</a:t>
+            </a:r>
+            <a:r>
+              <a:rPr lang="fi-FI" dirty="0"/>
+              <a:t> for </a:t>
+            </a:r>
+            <a:r>
+              <a:rPr lang="fi-FI" dirty="0" err="1"/>
+              <a:t>the</a:t>
+            </a:r>
+            <a:r>
+              <a:rPr lang="fi-FI" dirty="0"/>
+              <a:t> CRUDL </a:t>
+            </a:r>
+            <a:r>
+              <a:rPr lang="fi-FI" dirty="0" err="1"/>
+              <a:t>features</a:t>
+            </a:r>
+            <a:r>
+              <a:rPr lang="fi-FI" dirty="0"/>
+              <a:t> (</a:t>
+            </a:r>
+            <a:r>
+              <a:rPr lang="fi-FI" dirty="0" err="1"/>
+              <a:t>create</a:t>
+            </a:r>
+            <a:r>
+              <a:rPr lang="fi-FI" dirty="0"/>
+              <a:t>, </a:t>
+            </a:r>
+            <a:r>
+              <a:rPr lang="fi-FI" dirty="0" err="1"/>
+              <a:t>read</a:t>
+            </a:r>
+            <a:r>
+              <a:rPr lang="fi-FI" dirty="0"/>
+              <a:t>, </a:t>
+            </a:r>
+            <a:r>
+              <a:rPr lang="fi-FI" dirty="0" err="1"/>
+              <a:t>update</a:t>
+            </a:r>
+            <a:r>
+              <a:rPr lang="fi-FI" dirty="0"/>
+              <a:t>, </a:t>
+            </a:r>
+            <a:r>
+              <a:rPr lang="fi-FI" dirty="0" err="1"/>
+              <a:t>delete</a:t>
+            </a:r>
+            <a:r>
+              <a:rPr lang="fi-FI" dirty="0"/>
+              <a:t>, </a:t>
+            </a:r>
+            <a:r>
+              <a:rPr lang="fi-FI" dirty="0" err="1"/>
+              <a:t>list</a:t>
+            </a:r>
+            <a:r>
+              <a:rPr lang="fi-FI" dirty="0"/>
+              <a:t>)</a:t>
+            </a:r>
+          </a:p>
+          <a:p>
+            <a:pPr lvl="1"/>
+            <a:r>
+              <a:rPr lang="fi-FI" dirty="0"/>
+              <a:t>GET /</a:t>
+            </a:r>
+            <a:r>
+              <a:rPr lang="fi-FI" dirty="0" err="1"/>
+              <a:t>product</a:t>
+            </a:r>
+            <a:r>
+              <a:rPr lang="fi-FI" dirty="0"/>
+              <a:t>                         =&gt; no id </a:t>
+            </a:r>
+            <a:r>
+              <a:rPr lang="fi-FI" dirty="0" err="1"/>
+              <a:t>or</a:t>
+            </a:r>
+            <a:r>
+              <a:rPr lang="fi-FI" dirty="0"/>
+              <a:t> </a:t>
+            </a:r>
+            <a:r>
+              <a:rPr lang="fi-FI" dirty="0" err="1"/>
+              <a:t>name</a:t>
+            </a:r>
+            <a:r>
+              <a:rPr lang="fi-FI" dirty="0"/>
+              <a:t> </a:t>
+            </a:r>
+            <a:r>
+              <a:rPr lang="fi-FI" dirty="0" err="1"/>
+              <a:t>given</a:t>
+            </a:r>
+            <a:r>
+              <a:rPr lang="fi-FI" dirty="0"/>
+              <a:t>, </a:t>
+            </a:r>
+            <a:r>
+              <a:rPr lang="fi-FI" dirty="0" err="1"/>
+              <a:t>thus</a:t>
+            </a:r>
+            <a:r>
+              <a:rPr lang="fi-FI" dirty="0"/>
+              <a:t>: </a:t>
+            </a:r>
+            <a:r>
+              <a:rPr lang="fi-FI" dirty="0" err="1"/>
+              <a:t>get</a:t>
+            </a:r>
+            <a:r>
+              <a:rPr lang="fi-FI" dirty="0"/>
+              <a:t> </a:t>
+            </a:r>
+            <a:r>
+              <a:rPr lang="fi-FI" u="sng" dirty="0" err="1"/>
+              <a:t>all</a:t>
+            </a:r>
+            <a:r>
+              <a:rPr lang="fi-FI" dirty="0"/>
+              <a:t> Products</a:t>
+            </a:r>
+          </a:p>
+          <a:p>
+            <a:pPr lvl="1"/>
+            <a:r>
+              <a:rPr lang="fi-FI" dirty="0"/>
+              <a:t>GET /</a:t>
+            </a:r>
+            <a:r>
+              <a:rPr lang="fi-FI" dirty="0" err="1"/>
+              <a:t>product</a:t>
+            </a:r>
+            <a:r>
+              <a:rPr lang="fi-FI" dirty="0"/>
+              <a:t>/:id                   =&gt; </a:t>
+            </a:r>
+            <a:r>
+              <a:rPr lang="fi-FI" dirty="0" err="1"/>
+              <a:t>now</a:t>
+            </a:r>
+            <a:r>
+              <a:rPr lang="fi-FI" dirty="0"/>
+              <a:t> id </a:t>
+            </a:r>
+            <a:r>
+              <a:rPr lang="fi-FI" dirty="0" err="1"/>
+              <a:t>given</a:t>
+            </a:r>
+            <a:r>
+              <a:rPr lang="fi-FI" dirty="0"/>
+              <a:t>, </a:t>
+            </a:r>
+            <a:r>
+              <a:rPr lang="fi-FI" dirty="0" err="1"/>
+              <a:t>thus</a:t>
+            </a:r>
+            <a:r>
+              <a:rPr lang="fi-FI" dirty="0"/>
+              <a:t> </a:t>
+            </a:r>
+            <a:r>
+              <a:rPr lang="fi-FI" dirty="0" err="1"/>
+              <a:t>get</a:t>
+            </a:r>
+            <a:r>
+              <a:rPr lang="fi-FI" dirty="0"/>
+              <a:t> </a:t>
+            </a:r>
+            <a:r>
+              <a:rPr lang="fi-FI" dirty="0" err="1"/>
+              <a:t>one</a:t>
+            </a:r>
+            <a:r>
+              <a:rPr lang="fi-FI" dirty="0"/>
+              <a:t> </a:t>
+            </a:r>
+            <a:r>
+              <a:rPr lang="fi-FI" dirty="0" err="1"/>
+              <a:t>product</a:t>
+            </a:r>
+            <a:r>
+              <a:rPr lang="fi-FI" dirty="0"/>
+              <a:t> </a:t>
+            </a:r>
+            <a:r>
+              <a:rPr lang="fi-FI" dirty="0" err="1"/>
+              <a:t>by</a:t>
+            </a:r>
+            <a:r>
+              <a:rPr lang="fi-FI" dirty="0"/>
+              <a:t> id</a:t>
+            </a:r>
+          </a:p>
+          <a:p>
+            <a:pPr lvl="1"/>
+            <a:r>
+              <a:rPr lang="fi-FI" dirty="0"/>
+              <a:t>DELETE /</a:t>
+            </a:r>
+            <a:r>
+              <a:rPr lang="fi-FI" dirty="0" err="1"/>
+              <a:t>product</a:t>
+            </a:r>
+            <a:r>
+              <a:rPr lang="fi-FI" dirty="0"/>
+              <a:t>/:id             =&gt; </a:t>
+            </a:r>
+            <a:r>
+              <a:rPr lang="fi-FI" dirty="0" err="1"/>
+              <a:t>notice</a:t>
+            </a:r>
+            <a:r>
+              <a:rPr lang="fi-FI" dirty="0"/>
+              <a:t> </a:t>
+            </a:r>
+            <a:r>
+              <a:rPr lang="fi-FI" dirty="0" err="1"/>
+              <a:t>how</a:t>
+            </a:r>
+            <a:r>
+              <a:rPr lang="fi-FI" dirty="0"/>
+              <a:t> URL </a:t>
+            </a:r>
+            <a:r>
+              <a:rPr lang="fi-FI" dirty="0" err="1"/>
+              <a:t>pattern</a:t>
+            </a:r>
+            <a:r>
+              <a:rPr lang="fi-FI" dirty="0"/>
+              <a:t> is 100% </a:t>
+            </a:r>
+            <a:r>
+              <a:rPr lang="fi-FI" dirty="0" err="1"/>
+              <a:t>same</a:t>
+            </a:r>
+            <a:r>
+              <a:rPr lang="fi-FI" dirty="0"/>
+              <a:t> as for GET. </a:t>
+            </a:r>
+            <a:r>
+              <a:rPr lang="fi-FI" dirty="0" err="1"/>
+              <a:t>Thus</a:t>
+            </a:r>
+            <a:r>
+              <a:rPr lang="fi-FI" dirty="0"/>
+              <a:t> </a:t>
+            </a:r>
+            <a:r>
+              <a:rPr lang="fi-FI" dirty="0" err="1"/>
+              <a:t>the</a:t>
+            </a:r>
+            <a:r>
+              <a:rPr lang="fi-FI" dirty="0"/>
+              <a:t> http </a:t>
+            </a:r>
+            <a:r>
+              <a:rPr lang="fi-FI" dirty="0" err="1"/>
+              <a:t>method</a:t>
+            </a:r>
+            <a:r>
+              <a:rPr lang="fi-FI" dirty="0"/>
+              <a:t> is </a:t>
+            </a:r>
+            <a:r>
+              <a:rPr lang="fi-FI" dirty="0" err="1"/>
+              <a:t>important</a:t>
+            </a:r>
+            <a:r>
+              <a:rPr lang="fi-FI" dirty="0"/>
+              <a:t> </a:t>
+            </a:r>
+            <a:r>
+              <a:rPr lang="fi-FI" dirty="0" err="1"/>
+              <a:t>part</a:t>
+            </a:r>
+            <a:r>
+              <a:rPr lang="fi-FI" dirty="0"/>
+              <a:t> of </a:t>
+            </a:r>
+            <a:r>
+              <a:rPr lang="fi-FI" dirty="0" err="1"/>
+              <a:t>the</a:t>
+            </a:r>
+            <a:r>
+              <a:rPr lang="fi-FI" dirty="0"/>
+              <a:t> </a:t>
+            </a:r>
+            <a:r>
+              <a:rPr lang="fi-FI" dirty="0" err="1"/>
+              <a:t>routing</a:t>
+            </a:r>
+            <a:r>
+              <a:rPr lang="fi-FI" dirty="0"/>
+              <a:t>.</a:t>
+            </a:r>
+          </a:p>
+          <a:p>
+            <a:pPr lvl="1"/>
+            <a:r>
+              <a:rPr lang="fi-FI" dirty="0"/>
+              <a:t>POST /</a:t>
+            </a:r>
+            <a:r>
+              <a:rPr lang="fi-FI" dirty="0" err="1"/>
+              <a:t>product</a:t>
+            </a:r>
+            <a:r>
+              <a:rPr lang="fi-FI" dirty="0"/>
+              <a:t>/	     (And </a:t>
+            </a:r>
+            <a:r>
+              <a:rPr lang="fi-FI" dirty="0" err="1"/>
+              <a:t>object</a:t>
+            </a:r>
+            <a:r>
+              <a:rPr lang="fi-FI" dirty="0"/>
+              <a:t> as JSON in </a:t>
+            </a:r>
+            <a:r>
+              <a:rPr lang="fi-FI" dirty="0" err="1"/>
+              <a:t>the</a:t>
+            </a:r>
+            <a:r>
+              <a:rPr lang="fi-FI" dirty="0"/>
+              <a:t> </a:t>
+            </a:r>
+            <a:r>
+              <a:rPr lang="fi-FI" dirty="0" err="1"/>
+              <a:t>body</a:t>
+            </a:r>
+            <a:r>
+              <a:rPr lang="fi-FI" dirty="0"/>
+              <a:t>, </a:t>
+            </a:r>
+            <a:r>
+              <a:rPr lang="fi-FI" dirty="0" err="1"/>
+              <a:t>without</a:t>
+            </a:r>
+            <a:r>
+              <a:rPr lang="fi-FI" dirty="0"/>
+              <a:t> id, </a:t>
+            </a:r>
+            <a:r>
+              <a:rPr lang="fi-FI" dirty="0" err="1"/>
+              <a:t>if</a:t>
+            </a:r>
+            <a:r>
+              <a:rPr lang="fi-FI" dirty="0"/>
+              <a:t> DB </a:t>
+            </a:r>
+            <a:r>
+              <a:rPr lang="fi-FI" dirty="0" err="1"/>
+              <a:t>does</a:t>
+            </a:r>
+            <a:r>
+              <a:rPr lang="fi-FI" dirty="0"/>
+              <a:t> </a:t>
+            </a:r>
+            <a:r>
+              <a:rPr lang="fi-FI" dirty="0" err="1"/>
+              <a:t>the</a:t>
+            </a:r>
+            <a:r>
+              <a:rPr lang="fi-FI" dirty="0"/>
+              <a:t> </a:t>
+            </a:r>
+            <a:r>
+              <a:rPr lang="fi-FI" dirty="0" err="1"/>
+              <a:t>autoincrement</a:t>
+            </a:r>
+            <a:r>
+              <a:rPr lang="fi-FI" dirty="0"/>
+              <a:t> </a:t>
+            </a:r>
+            <a:r>
+              <a:rPr lang="fi-FI" dirty="0" err="1"/>
+              <a:t>thing</a:t>
+            </a:r>
+            <a:r>
+              <a:rPr lang="fi-FI" dirty="0"/>
+              <a:t>)</a:t>
+            </a:r>
+          </a:p>
+          <a:p>
+            <a:pPr lvl="1"/>
+            <a:r>
+              <a:rPr lang="fi-FI" dirty="0"/>
+              <a:t>PUT /</a:t>
+            </a:r>
+            <a:r>
+              <a:rPr lang="fi-FI" dirty="0" err="1"/>
+              <a:t>product</a:t>
+            </a:r>
+            <a:r>
+              <a:rPr lang="fi-FI" dirty="0"/>
+              <a:t>/	     (And </a:t>
+            </a:r>
+            <a:r>
+              <a:rPr lang="fi-FI" dirty="0" err="1"/>
+              <a:t>object</a:t>
+            </a:r>
+            <a:r>
+              <a:rPr lang="fi-FI" dirty="0"/>
+              <a:t> as JSON in </a:t>
+            </a:r>
+            <a:r>
+              <a:rPr lang="fi-FI" dirty="0" err="1"/>
+              <a:t>the</a:t>
+            </a:r>
+            <a:r>
+              <a:rPr lang="fi-FI" dirty="0"/>
+              <a:t> </a:t>
+            </a:r>
+            <a:r>
+              <a:rPr lang="fi-FI" dirty="0" err="1"/>
+              <a:t>body</a:t>
+            </a:r>
+            <a:r>
+              <a:rPr lang="fi-FI" dirty="0"/>
+              <a:t>, </a:t>
+            </a:r>
+            <a:r>
+              <a:rPr lang="fi-FI" dirty="0" err="1"/>
+              <a:t>with</a:t>
+            </a:r>
+            <a:r>
+              <a:rPr lang="fi-FI" dirty="0"/>
+              <a:t> id)</a:t>
+            </a:r>
+          </a:p>
+          <a:p>
+            <a:pPr lvl="1"/>
+            <a:endParaRPr lang="fi-FI" dirty="0"/>
+          </a:p>
+          <a:p>
+            <a:pPr lvl="1"/>
+            <a:r>
+              <a:rPr lang="fi-FI" dirty="0"/>
+              <a:t>GET /</a:t>
+            </a:r>
+            <a:r>
+              <a:rPr lang="fi-FI" dirty="0" err="1"/>
+              <a:t>product</a:t>
+            </a:r>
+            <a:r>
+              <a:rPr lang="fi-FI" dirty="0"/>
+              <a:t>/</a:t>
+            </a:r>
+            <a:r>
+              <a:rPr lang="fi-FI" dirty="0" err="1"/>
+              <a:t>cheaperThan</a:t>
+            </a:r>
+            <a:r>
+              <a:rPr lang="fi-FI" dirty="0"/>
+              <a:t>/:</a:t>
+            </a:r>
+            <a:r>
+              <a:rPr lang="fi-FI" dirty="0" err="1"/>
+              <a:t>price</a:t>
+            </a:r>
+            <a:r>
+              <a:rPr lang="fi-FI" dirty="0"/>
+              <a:t>    =&gt; </a:t>
+            </a:r>
+            <a:r>
+              <a:rPr lang="fi-FI" dirty="0" err="1"/>
+              <a:t>you</a:t>
+            </a:r>
+            <a:r>
+              <a:rPr lang="fi-FI" dirty="0"/>
+              <a:t> </a:t>
+            </a:r>
+            <a:r>
+              <a:rPr lang="fi-FI" dirty="0" err="1"/>
+              <a:t>can</a:t>
+            </a:r>
+            <a:r>
+              <a:rPr lang="fi-FI" dirty="0"/>
+              <a:t> </a:t>
+            </a:r>
+            <a:r>
+              <a:rPr lang="fi-FI" dirty="0" err="1"/>
+              <a:t>build</a:t>
+            </a:r>
+            <a:r>
+              <a:rPr lang="fi-FI" dirty="0"/>
+              <a:t> </a:t>
+            </a:r>
+            <a:r>
+              <a:rPr lang="fi-FI" dirty="0" err="1"/>
+              <a:t>endless</a:t>
+            </a:r>
+            <a:r>
+              <a:rPr lang="fi-FI" dirty="0"/>
+              <a:t> </a:t>
+            </a:r>
+            <a:r>
+              <a:rPr lang="fi-FI" dirty="0" err="1"/>
+              <a:t>special</a:t>
+            </a:r>
+            <a:r>
+              <a:rPr lang="fi-FI" dirty="0"/>
+              <a:t> </a:t>
+            </a:r>
+            <a:r>
+              <a:rPr lang="fi-FI" dirty="0" err="1"/>
+              <a:t>URLs</a:t>
+            </a:r>
+            <a:r>
+              <a:rPr lang="fi-FI" dirty="0"/>
+              <a:t> </a:t>
+            </a:r>
+            <a:r>
+              <a:rPr lang="fi-FI" dirty="0" err="1"/>
+              <a:t>too</a:t>
+            </a:r>
+            <a:r>
+              <a:rPr lang="fi-FI" dirty="0"/>
+              <a:t>. </a:t>
+            </a:r>
+            <a:r>
+              <a:rPr lang="fi-FI" dirty="0" err="1"/>
+              <a:t>Also</a:t>
+            </a:r>
+            <a:r>
+              <a:rPr lang="fi-FI" dirty="0"/>
+              <a:t> </a:t>
+            </a:r>
+            <a:r>
+              <a:rPr lang="fi-FI" dirty="0" err="1"/>
+              <a:t>deletes</a:t>
+            </a:r>
+            <a:r>
+              <a:rPr lang="fi-FI" dirty="0"/>
+              <a:t> </a:t>
+            </a:r>
+            <a:r>
+              <a:rPr lang="fi-FI" dirty="0" err="1"/>
+              <a:t>based</a:t>
+            </a:r>
+            <a:r>
+              <a:rPr lang="fi-FI" dirty="0"/>
+              <a:t> on some </a:t>
+            </a:r>
+            <a:r>
+              <a:rPr lang="fi-FI" dirty="0" err="1"/>
+              <a:t>facts</a:t>
+            </a:r>
+            <a:r>
+              <a:rPr lang="fi-FI" dirty="0"/>
+              <a:t>.	</a:t>
+            </a:r>
+          </a:p>
+          <a:p>
+            <a:r>
+              <a:rPr lang="fi-FI" sz="1500" dirty="0" err="1"/>
+              <a:t>Use</a:t>
+            </a:r>
+            <a:r>
+              <a:rPr lang="fi-FI" sz="1500" dirty="0"/>
+              <a:t> some </a:t>
+            </a:r>
+            <a:r>
+              <a:rPr lang="fi-FI" sz="1500" dirty="0" err="1"/>
+              <a:t>tool</a:t>
+            </a:r>
+            <a:r>
+              <a:rPr lang="fi-FI" sz="1500" dirty="0"/>
+              <a:t> to </a:t>
+            </a:r>
+            <a:r>
+              <a:rPr lang="fi-FI" sz="1500" dirty="0" err="1"/>
+              <a:t>test</a:t>
+            </a:r>
+            <a:r>
+              <a:rPr lang="fi-FI" sz="1500" dirty="0"/>
+              <a:t> </a:t>
+            </a:r>
+            <a:r>
+              <a:rPr lang="fi-FI" sz="1500" dirty="0" err="1"/>
+              <a:t>your</a:t>
+            </a:r>
+            <a:r>
+              <a:rPr lang="fi-FI" sz="1500" dirty="0"/>
+              <a:t> </a:t>
+            </a:r>
+            <a:r>
+              <a:rPr lang="fi-FI" sz="1500" dirty="0" err="1"/>
+              <a:t>endpoints</a:t>
+            </a:r>
+            <a:r>
+              <a:rPr lang="fi-FI" sz="1500" dirty="0"/>
+              <a:t> </a:t>
+            </a:r>
+            <a:r>
+              <a:rPr lang="fi-FI" sz="1500" dirty="0" err="1"/>
+              <a:t>constantly</a:t>
+            </a:r>
+            <a:r>
+              <a:rPr lang="fi-FI" sz="1500" dirty="0"/>
+              <a:t>. </a:t>
+            </a:r>
+            <a:r>
+              <a:rPr lang="fi-FI" sz="1500" dirty="0" err="1"/>
+              <a:t>Also</a:t>
+            </a:r>
+            <a:r>
+              <a:rPr lang="fi-FI" sz="1500" dirty="0"/>
+              <a:t> </a:t>
+            </a:r>
+            <a:r>
+              <a:rPr lang="fi-FI" sz="1500" dirty="0" err="1"/>
+              <a:t>after</a:t>
+            </a:r>
+            <a:r>
+              <a:rPr lang="fi-FI" sz="1500" dirty="0"/>
+              <a:t> </a:t>
+            </a:r>
+            <a:r>
+              <a:rPr lang="fi-FI" sz="1500" dirty="0" err="1"/>
+              <a:t>you</a:t>
+            </a:r>
+            <a:r>
+              <a:rPr lang="fi-FI" sz="1500" dirty="0"/>
+              <a:t> </a:t>
+            </a:r>
+            <a:r>
+              <a:rPr lang="fi-FI" sz="1500" dirty="0" err="1"/>
+              <a:t>are</a:t>
+            </a:r>
+            <a:r>
+              <a:rPr lang="fi-FI" sz="1500" dirty="0"/>
+              <a:t> ’</a:t>
+            </a:r>
+            <a:r>
+              <a:rPr lang="fi-FI" sz="1500" dirty="0" err="1"/>
+              <a:t>done</a:t>
+            </a:r>
+            <a:r>
+              <a:rPr lang="fi-FI" sz="1500" dirty="0"/>
+              <a:t> </a:t>
+            </a:r>
+            <a:r>
+              <a:rPr lang="fi-FI" sz="1500" dirty="0" err="1"/>
+              <a:t>with</a:t>
+            </a:r>
+            <a:r>
+              <a:rPr lang="fi-FI" sz="1500" dirty="0"/>
+              <a:t> </a:t>
+            </a:r>
+            <a:r>
+              <a:rPr lang="fi-FI" sz="1500" dirty="0" err="1"/>
+              <a:t>backend</a:t>
+            </a:r>
+            <a:r>
+              <a:rPr lang="fi-FI" sz="1500" dirty="0"/>
+              <a:t>’ and </a:t>
+            </a:r>
+            <a:r>
+              <a:rPr lang="fi-FI" sz="1500" dirty="0" err="1"/>
+              <a:t>doing</a:t>
+            </a:r>
+            <a:r>
+              <a:rPr lang="fi-FI" sz="1500" dirty="0"/>
+              <a:t> </a:t>
+            </a:r>
+            <a:r>
+              <a:rPr lang="fi-FI" sz="1500" dirty="0" err="1"/>
+              <a:t>frontend</a:t>
+            </a:r>
+            <a:r>
+              <a:rPr lang="fi-FI" sz="1500" dirty="0"/>
+              <a:t> </a:t>
+            </a:r>
+            <a:r>
+              <a:rPr lang="fi-FI" sz="1500" dirty="0" err="1"/>
+              <a:t>development</a:t>
+            </a:r>
+            <a:r>
+              <a:rPr lang="fi-FI" sz="1500" dirty="0"/>
+              <a:t>. </a:t>
+            </a:r>
+            <a:r>
+              <a:rPr lang="fi-FI" sz="1500" dirty="0" err="1"/>
+              <a:t>Postman</a:t>
+            </a:r>
+            <a:r>
+              <a:rPr lang="fi-FI" sz="1500" dirty="0"/>
+              <a:t> </a:t>
+            </a:r>
+            <a:r>
+              <a:rPr lang="fi-FI" sz="1500" dirty="0" err="1"/>
+              <a:t>or</a:t>
+            </a:r>
+            <a:r>
+              <a:rPr lang="fi-FI" sz="1500" dirty="0"/>
+              <a:t> VS </a:t>
+            </a:r>
+            <a:r>
+              <a:rPr lang="fi-FI" sz="1500" dirty="0" err="1"/>
+              <a:t>Code</a:t>
+            </a:r>
+            <a:r>
+              <a:rPr lang="fi-FI" sz="1500" dirty="0"/>
+              <a:t> REST </a:t>
+            </a:r>
+            <a:r>
+              <a:rPr lang="fi-FI" sz="1500" dirty="0" err="1"/>
+              <a:t>client</a:t>
+            </a:r>
+            <a:endParaRPr lang="fi-FI" sz="1500" dirty="0"/>
+          </a:p>
+        </p:txBody>
+      </p:sp>
+      <p:sp>
+        <p:nvSpPr>
+          <p:cNvPr id="5" name="Date Placeholder 4">
+            <a:extLst>
+              <a:ext uri="{FF2B5EF4-FFF2-40B4-BE49-F238E27FC236}">
+                <a16:creationId xmlns:a16="http://schemas.microsoft.com/office/drawing/2014/main" id="{976244E2-AA76-2742-B2EC-FEC79276155C}"/>
+              </a:ext>
+            </a:extLst>
+          </p:cNvPr>
+          <p:cNvSpPr>
+            <a:spLocks noGrp="1"/>
+          </p:cNvSpPr>
+          <p:nvPr>
+            <p:ph type="dt" sz="half" idx="10"/>
+          </p:nvPr>
+        </p:nvSpPr>
+        <p:spPr/>
+        <p:txBody>
+          <a:bodyPr/>
+          <a:lstStyle/>
+          <a:p>
+            <a:fld id="{202E1EC2-47B8-044B-A09E-6A63B4D80C87}" type="datetime1">
+              <a:rPr lang="fi-FI" smtClean="0"/>
+              <a:t>3.4.2023</a:t>
+            </a:fld>
+            <a:endParaRPr lang="en-GB"/>
+          </a:p>
+        </p:txBody>
+      </p:sp>
+      <p:sp>
+        <p:nvSpPr>
+          <p:cNvPr id="6" name="Footer Placeholder 5">
+            <a:extLst>
+              <a:ext uri="{FF2B5EF4-FFF2-40B4-BE49-F238E27FC236}">
+                <a16:creationId xmlns:a16="http://schemas.microsoft.com/office/drawing/2014/main" id="{588CE607-4137-8840-8FEA-42EAC857E3A3}"/>
+              </a:ext>
+            </a:extLst>
+          </p:cNvPr>
+          <p:cNvSpPr>
+            <a:spLocks noGrp="1"/>
+          </p:cNvSpPr>
+          <p:nvPr>
+            <p:ph type="ftr" sz="quarter" idx="11"/>
+          </p:nvPr>
+        </p:nvSpPr>
+        <p:spPr/>
+        <p:txBody>
+          <a:bodyPr/>
+          <a:lstStyle/>
+          <a:p>
+            <a:endParaRPr lang="en-GB"/>
+          </a:p>
+        </p:txBody>
+      </p:sp>
+      <p:sp>
+        <p:nvSpPr>
+          <p:cNvPr id="7" name="Slide Number Placeholder 6">
+            <a:extLst>
+              <a:ext uri="{FF2B5EF4-FFF2-40B4-BE49-F238E27FC236}">
+                <a16:creationId xmlns:a16="http://schemas.microsoft.com/office/drawing/2014/main" id="{2E133A96-6C73-0844-B8CB-27C2B5F4CFB1}"/>
+              </a:ext>
+            </a:extLst>
+          </p:cNvPr>
+          <p:cNvSpPr>
+            <a:spLocks noGrp="1"/>
+          </p:cNvSpPr>
+          <p:nvPr>
+            <p:ph type="sldNum" sz="quarter" idx="12"/>
+          </p:nvPr>
+        </p:nvSpPr>
+        <p:spPr/>
+        <p:txBody>
+          <a:bodyPr/>
+          <a:lstStyle/>
+          <a:p>
+            <a:fld id="{76BAB7ED-EDE9-4D4B-9A2D-30E18C47C16E}" type="slidenum">
+              <a:rPr lang="en-GB" smtClean="0"/>
+              <a:t>9</a:t>
             </a:fld>
             <a:endParaRPr lang="en-GB"/>
           </a:p>
@@ -14653,12 +15114,12 @@
 </file>
 
 <file path=customXml/item1.xml><?xml version="1.0" encoding="utf-8"?>
-<?mso-contentType ?>
-<FormTemplates xmlns="http://schemas.microsoft.com/sharepoint/v3/contenttype/forms">
-  <Display>DocumentLibraryForm</Display>
-  <Edit>DocumentLibraryForm</Edit>
-  <New>DocumentLibraryForm</New>
-</FormTemplates>
+<p:properties xmlns:p="http://schemas.microsoft.com/office/2006/metadata/properties" xmlns:xsi="http://www.w3.org/2001/XMLSchema-instance" xmlns:pc="http://schemas.microsoft.com/office/infopath/2007/PartnerControls">
+  <documentManagement>
+    <PublishingExpirationDate xmlns="http://schemas.microsoft.com/sharepoint/v3" xsi:nil="true"/>
+    <PublishingStartDate xmlns="http://schemas.microsoft.com/sharepoint/v3" xsi:nil="true"/>
+  </documentManagement>
+</p:properties>
 </file>
 
 <file path=customXml/item2.xml><?xml version="1.0" encoding="utf-8"?>
@@ -14794,18 +15255,26 @@
 </file>
 
 <file path=customXml/item3.xml><?xml version="1.0" encoding="utf-8"?>
-<p:properties xmlns:p="http://schemas.microsoft.com/office/2006/metadata/properties" xmlns:xsi="http://www.w3.org/2001/XMLSchema-instance" xmlns:pc="http://schemas.microsoft.com/office/infopath/2007/PartnerControls">
-  <documentManagement>
-    <PublishingExpirationDate xmlns="http://schemas.microsoft.com/sharepoint/v3" xsi:nil="true"/>
-    <PublishingStartDate xmlns="http://schemas.microsoft.com/sharepoint/v3" xsi:nil="true"/>
-  </documentManagement>
-</p:properties>
+<?mso-contentType ?>
+<FormTemplates xmlns="http://schemas.microsoft.com/sharepoint/v3/contenttype/forms">
+  <Display>DocumentLibraryForm</Display>
+  <Edit>DocumentLibraryForm</Edit>
+  <New>DocumentLibraryForm</New>
+</FormTemplates>
 </file>
 
 <file path=customXml/itemProps1.xml><?xml version="1.0" encoding="utf-8"?>
-<ds:datastoreItem xmlns:ds="http://schemas.openxmlformats.org/officeDocument/2006/customXml" ds:itemID="{D546C03B-CD3A-4EA0-AAA4-0E00E896454E}">
+<ds:datastoreItem xmlns:ds="http://schemas.openxmlformats.org/officeDocument/2006/customXml" ds:itemID="{DED4E12E-7268-4B03-A47B-0755D62B5E31}">
   <ds:schemaRefs>
-    <ds:schemaRef ds:uri="http://schemas.microsoft.com/sharepoint/v3/contenttype/forms"/>
+    <ds:schemaRef ds:uri="http://purl.org/dc/dcmitype/"/>
+    <ds:schemaRef ds:uri="http://schemas.microsoft.com/office/infopath/2007/PartnerControls"/>
+    <ds:schemaRef ds:uri="http://schemas.openxmlformats.org/package/2006/metadata/core-properties"/>
+    <ds:schemaRef ds:uri="http://schemas.microsoft.com/office/2006/documentManagement/types"/>
+    <ds:schemaRef ds:uri="http://purl.org/dc/terms/"/>
+    <ds:schemaRef ds:uri="http://www.w3.org/XML/1998/namespace"/>
+    <ds:schemaRef ds:uri="http://schemas.microsoft.com/sharepoint/v3"/>
+    <ds:schemaRef ds:uri="http://purl.org/dc/elements/1.1/"/>
+    <ds:schemaRef ds:uri="http://schemas.microsoft.com/office/2006/metadata/properties"/>
   </ds:schemaRefs>
 </ds:datastoreItem>
 </file>
@@ -14829,17 +15298,9 @@
 </file>
 
 <file path=customXml/itemProps3.xml><?xml version="1.0" encoding="utf-8"?>
-<ds:datastoreItem xmlns:ds="http://schemas.openxmlformats.org/officeDocument/2006/customXml" ds:itemID="{DED4E12E-7268-4B03-A47B-0755D62B5E31}">
+<ds:datastoreItem xmlns:ds="http://schemas.openxmlformats.org/officeDocument/2006/customXml" ds:itemID="{D546C03B-CD3A-4EA0-AAA4-0E00E896454E}">
   <ds:schemaRefs>
-    <ds:schemaRef ds:uri="http://purl.org/dc/dcmitype/"/>
-    <ds:schemaRef ds:uri="http://schemas.microsoft.com/office/infopath/2007/PartnerControls"/>
-    <ds:schemaRef ds:uri="http://schemas.openxmlformats.org/package/2006/metadata/core-properties"/>
-    <ds:schemaRef ds:uri="http://schemas.microsoft.com/office/2006/documentManagement/types"/>
-    <ds:schemaRef ds:uri="http://purl.org/dc/terms/"/>
-    <ds:schemaRef ds:uri="http://www.w3.org/XML/1998/namespace"/>
-    <ds:schemaRef ds:uri="http://schemas.microsoft.com/sharepoint/v3"/>
-    <ds:schemaRef ds:uri="http://purl.org/dc/elements/1.1/"/>
-    <ds:schemaRef ds:uri="http://schemas.microsoft.com/office/2006/metadata/properties"/>
+    <ds:schemaRef ds:uri="http://schemas.microsoft.com/sharepoint/v3/contenttype/forms"/>
   </ds:schemaRefs>
 </ds:datastoreItem>
 </file>
</xml_diff>